<commit_message>
Resuelto problema de exportación de la imagen de la gráfica en el reporte
</commit_message>
<xml_diff>
--- a/expo/expo.pptx
+++ b/expo/expo.pptx
@@ -3049,7 +3049,29 @@
                 <a:ea typeface="Cambria"/>
                 <a:cs typeface="Times New Roman" panose="02020603050405020304" pitchFamily="18" charset="0"/>
               </a:rPr>
-              <a:t>Desarrollo de un aplicativo informático para el proceso de caracterización estudiantil en las Instituciones de Educación Superior</a:t>
+              <a:t>Desarrollo de </a:t>
+            </a:r>
+            <a:r>
+              <a:rPr lang="es-CO" sz="2600" dirty="0" smtClean="0">
+                <a:solidFill>
+                  <a:srgbClr val="000000"/>
+                </a:solidFill>
+                <a:latin typeface="+mn-lt"/>
+                <a:ea typeface="Cambria"/>
+                <a:cs typeface="Times New Roman" panose="02020603050405020304" pitchFamily="18" charset="0"/>
+              </a:rPr>
+              <a:t>una solución informática </a:t>
+            </a:r>
+            <a:r>
+              <a:rPr lang="es-CO" sz="2600" dirty="0">
+                <a:solidFill>
+                  <a:srgbClr val="000000"/>
+                </a:solidFill>
+                <a:latin typeface="+mn-lt"/>
+                <a:ea typeface="Cambria"/>
+                <a:cs typeface="Times New Roman" panose="02020603050405020304" pitchFamily="18" charset="0"/>
+              </a:rPr>
+              <a:t>para el proceso de caracterización estudiantil en las Instituciones de Educación Superior</a:t>
             </a:r>
             <a:r>
               <a:rPr lang="es-CO" sz="2600" dirty="0">
@@ -3172,7 +3194,7 @@
           <p:cNvPr id="2" name="Título 1">
             <a:extLst>
               <a:ext uri="{FF2B5EF4-FFF2-40B4-BE49-F238E27FC236}">
-                <a16:creationId xmlns="" xmlns:a16="http://schemas.microsoft.com/office/drawing/2014/main" id="{479D511D-23C3-4E2A-8FD0-827C19B8FE62}"/>
+                <a16:creationId xmlns:a16="http://schemas.microsoft.com/office/drawing/2014/main" xmlns="" id="{479D511D-23C3-4E2A-8FD0-827C19B8FE62}"/>
               </a:ext>
             </a:extLst>
           </p:cNvPr>
@@ -3210,7 +3232,7 @@
           <p:cNvPr id="7" name="CuadroTexto 6">
             <a:extLst>
               <a:ext uri="{FF2B5EF4-FFF2-40B4-BE49-F238E27FC236}">
-                <a16:creationId xmlns="" xmlns:a16="http://schemas.microsoft.com/office/drawing/2014/main" id="{9A9A517C-CD63-4999-91D2-533BFA31F83E}"/>
+                <a16:creationId xmlns:a16="http://schemas.microsoft.com/office/drawing/2014/main" xmlns="" id="{9A9A517C-CD63-4999-91D2-533BFA31F83E}"/>
               </a:ext>
             </a:extLst>
           </p:cNvPr>
@@ -3269,7 +3291,7 @@
           <p:cNvPr id="8" name="CuadroTexto 7">
             <a:extLst>
               <a:ext uri="{FF2B5EF4-FFF2-40B4-BE49-F238E27FC236}">
-                <a16:creationId xmlns="" xmlns:a16="http://schemas.microsoft.com/office/drawing/2014/main" id="{89E46AF4-218E-4E1B-B422-59B657A05EE8}"/>
+                <a16:creationId xmlns:a16="http://schemas.microsoft.com/office/drawing/2014/main" xmlns="" id="{89E46AF4-218E-4E1B-B422-59B657A05EE8}"/>
               </a:ext>
             </a:extLst>
           </p:cNvPr>
@@ -3278,8 +3300,8 @@
         </p:nvSpPr>
         <p:spPr>
           <a:xfrm>
-            <a:off x="6113494" y="6100001"/>
-            <a:ext cx="5790175" cy="523220"/>
+            <a:off x="6457242" y="6100001"/>
+            <a:ext cx="5102679" cy="461665"/>
           </a:xfrm>
           <a:prstGeom prst="rect">
             <a:avLst/>
@@ -3294,14 +3316,23 @@
           <a:p>
             <a:pPr algn="just"/>
             <a:r>
-              <a:rPr lang="es-MX" sz="2800" dirty="0"/>
+              <a:rPr lang="es-MX" sz="2400" i="1" dirty="0">
+                <a:latin typeface="Times New Roman" panose="02020603050405020304" pitchFamily="18" charset="0"/>
+                <a:cs typeface="Times New Roman" panose="02020603050405020304" pitchFamily="18" charset="0"/>
+              </a:rPr>
               <a:t>Ilustración 2: </a:t>
             </a:r>
             <a:r>
-              <a:rPr lang="es-MX" sz="2800" dirty="0" smtClean="0"/>
+              <a:rPr lang="es-MX" sz="2400" i="1" dirty="0" smtClean="0">
+                <a:latin typeface="Times New Roman" panose="02020603050405020304" pitchFamily="18" charset="0"/>
+                <a:cs typeface="Times New Roman" panose="02020603050405020304" pitchFamily="18" charset="0"/>
+              </a:rPr>
               <a:t>Modelo Entidad Relación</a:t>
             </a:r>
-            <a:endParaRPr lang="es-MX" sz="2800" dirty="0"/>
+            <a:endParaRPr lang="es-MX" sz="2400" i="1" dirty="0">
+              <a:latin typeface="Times New Roman" panose="02020603050405020304" pitchFamily="18" charset="0"/>
+              <a:cs typeface="Times New Roman" panose="02020603050405020304" pitchFamily="18" charset="0"/>
+            </a:endParaRPr>
           </a:p>
         </p:txBody>
       </p:sp>
@@ -3377,7 +3408,7 @@
           <p:cNvPr id="2" name="Título 1">
             <a:extLst>
               <a:ext uri="{FF2B5EF4-FFF2-40B4-BE49-F238E27FC236}">
-                <a16:creationId xmlns="" xmlns:a16="http://schemas.microsoft.com/office/drawing/2014/main" id="{C970F256-3488-4F4A-A764-07DD68032D5B}"/>
+                <a16:creationId xmlns:a16="http://schemas.microsoft.com/office/drawing/2014/main" xmlns="" id="{C970F256-3488-4F4A-A764-07DD68032D5B}"/>
               </a:ext>
             </a:extLst>
           </p:cNvPr>
@@ -3415,7 +3446,7 @@
           <p:cNvPr id="8" name="Marcador de contenido 2">
             <a:extLst>
               <a:ext uri="{FF2B5EF4-FFF2-40B4-BE49-F238E27FC236}">
-                <a16:creationId xmlns="" xmlns:a16="http://schemas.microsoft.com/office/drawing/2014/main" id="{3FB29320-5129-474A-B682-3F1DD8635B6B}"/>
+                <a16:creationId xmlns:a16="http://schemas.microsoft.com/office/drawing/2014/main" xmlns="" id="{3FB29320-5129-474A-B682-3F1DD8635B6B}"/>
               </a:ext>
             </a:extLst>
           </p:cNvPr>
@@ -3450,14 +3481,7 @@
                 <a:latin typeface="Times New Roman" panose="02020603050405020304" pitchFamily="18" charset="0"/>
                 <a:cs typeface="Times New Roman" panose="02020603050405020304" pitchFamily="18" charset="0"/>
               </a:rPr>
-              <a:t>I</a:t>
-            </a:r>
-            <a:r>
-              <a:rPr lang="es-MX" b="1" dirty="0" smtClean="0">
-                <a:latin typeface="Times New Roman" panose="02020603050405020304" pitchFamily="18" charset="0"/>
-                <a:cs typeface="Times New Roman" panose="02020603050405020304" pitchFamily="18" charset="0"/>
-              </a:rPr>
-              <a:t>II -</a:t>
+              <a:t>III -</a:t>
             </a:r>
             <a:r>
               <a:rPr lang="es-MX" b="1" dirty="0" smtClean="0"/>
@@ -3491,14 +3515,14 @@
           <p:nvPr>
             <p:extLst>
               <p:ext uri="{D42A27DB-BD31-4B8C-83A1-F6EECF244321}">
-                <p14:modId xmlns:p14="http://schemas.microsoft.com/office/powerpoint/2010/main" val="3430796807"/>
+                <p14:modId xmlns:p14="http://schemas.microsoft.com/office/powerpoint/2010/main" val="947218990"/>
               </p:ext>
             </p:extLst>
           </p:nvPr>
         </p:nvGraphicFramePr>
         <p:xfrm>
-          <a:off x="682440" y="1910553"/>
-          <a:ext cx="10671360" cy="4790148"/>
+          <a:off x="1725768" y="1908313"/>
+          <a:ext cx="9177271" cy="4058880"/>
         </p:xfrm>
         <a:graphic>
           <a:graphicData uri="http://schemas.openxmlformats.org/drawingml/2006/table">
@@ -3507,11 +3531,11 @@
                 <a:tableStyleId>{5C22544A-7EE6-4342-B048-85BDC9FD1C3A}</a:tableStyleId>
               </a:tblPr>
               <a:tblGrid>
-                <a:gridCol w="3249250"/>
-                <a:gridCol w="3249250"/>
-                <a:gridCol w="4172860"/>
+                <a:gridCol w="2794325"/>
+                <a:gridCol w="2794325"/>
+                <a:gridCol w="3588621"/>
               </a:tblGrid>
-              <a:tr h="399179">
+              <a:tr h="311053">
                 <a:tc>
                   <a:txBody>
                     <a:bodyPr/>
@@ -3519,12 +3543,12 @@
                     <a:p>
                       <a:pPr algn="ctr" fontAlgn="b"/>
                       <a:r>
-                        <a:rPr lang="es-CO" sz="2300" b="1" u="none" strike="noStrike">
+                        <a:rPr lang="es-CO" sz="2100" b="1" u="none" strike="noStrike" dirty="0">
                           <a:effectLst/>
                         </a:rPr>
                         <a:t>Herramientas</a:t>
                       </a:r>
-                      <a:endParaRPr lang="es-CO" sz="2300" b="1" i="0" u="none" strike="noStrike">
+                      <a:endParaRPr lang="es-CO" sz="2100" b="1" i="0" u="none" strike="noStrike" dirty="0">
                         <a:solidFill>
                           <a:srgbClr val="464646"/>
                         </a:solidFill>
@@ -3533,7 +3557,7 @@
                       </a:endParaRPr>
                     </a:p>
                   </a:txBody>
-                  <a:tcPr marL="19959" marR="19959" marT="19959" marB="0" anchor="b"/>
+                  <a:tcPr marL="18200" marR="18200" marT="18200" marB="0" anchor="b"/>
                 </a:tc>
                 <a:tc>
                   <a:txBody>
@@ -3542,12 +3566,12 @@
                     <a:p>
                       <a:pPr algn="ctr" fontAlgn="b"/>
                       <a:r>
-                        <a:rPr lang="es-CO" sz="2300" b="1" u="none" strike="noStrike">
+                        <a:rPr lang="es-CO" sz="2100" b="1" u="none" strike="noStrike">
                           <a:effectLst/>
                         </a:rPr>
                         <a:t>Lenguajes</a:t>
                       </a:r>
-                      <a:endParaRPr lang="es-CO" sz="2300" b="1" i="0" u="none" strike="noStrike">
+                      <a:endParaRPr lang="es-CO" sz="2100" b="1" i="0" u="none" strike="noStrike">
                         <a:solidFill>
                           <a:srgbClr val="464646"/>
                         </a:solidFill>
@@ -3556,7 +3580,7 @@
                       </a:endParaRPr>
                     </a:p>
                   </a:txBody>
-                  <a:tcPr marL="19959" marR="19959" marT="19959" marB="0" anchor="b"/>
+                  <a:tcPr marL="18200" marR="18200" marT="18200" marB="0" anchor="b"/>
                 </a:tc>
                 <a:tc>
                   <a:txBody>
@@ -3565,12 +3589,12 @@
                     <a:p>
                       <a:pPr algn="ctr" fontAlgn="b"/>
                       <a:r>
-                        <a:rPr lang="es-CO" sz="2300" b="1" u="none" strike="noStrike" dirty="0">
+                        <a:rPr lang="es-CO" sz="2100" b="1" u="none" strike="noStrike" dirty="0">
                           <a:effectLst/>
                         </a:rPr>
                         <a:t>Frameworks</a:t>
                       </a:r>
-                      <a:endParaRPr lang="es-CO" sz="2300" b="1" i="0" u="none" strike="noStrike" dirty="0">
+                      <a:endParaRPr lang="es-CO" sz="2100" b="1" i="0" u="none" strike="noStrike" dirty="0">
                         <a:solidFill>
                           <a:srgbClr val="464646"/>
                         </a:solidFill>
@@ -3579,10 +3603,10 @@
                       </a:endParaRPr>
                     </a:p>
                   </a:txBody>
-                  <a:tcPr marL="19959" marR="19959" marT="19959" marB="0" anchor="b"/>
+                  <a:tcPr marL="18200" marR="18200" marT="18200" marB="0" anchor="b"/>
                 </a:tc>
               </a:tr>
-              <a:tr h="399179">
+              <a:tr h="311053">
                 <a:tc>
                   <a:txBody>
                     <a:bodyPr/>
@@ -3590,12 +3614,12 @@
                     <a:p>
                       <a:pPr algn="ctr" fontAlgn="b"/>
                       <a:r>
-                        <a:rPr lang="es-CO" sz="2300" u="none" strike="noStrike">
+                        <a:rPr lang="es-CO" sz="2100" u="none" strike="noStrike" dirty="0" smtClean="0">
                           <a:effectLst/>
                         </a:rPr>
-                        <a:t>XAMPP</a:t>
+                        <a:t>XAMPP - LAMPP</a:t>
                       </a:r>
-                      <a:endParaRPr lang="es-CO" sz="2300" b="0" i="0" u="none" strike="noStrike">
+                      <a:endParaRPr lang="es-CO" sz="2100" b="0" i="0" u="none" strike="noStrike" dirty="0">
                         <a:solidFill>
                           <a:srgbClr val="464646"/>
                         </a:solidFill>
@@ -3604,7 +3628,7 @@
                       </a:endParaRPr>
                     </a:p>
                   </a:txBody>
-                  <a:tcPr marL="19959" marR="19959" marT="19959" marB="0" anchor="b"/>
+                  <a:tcPr marL="18200" marR="18200" marT="18200" marB="0" anchor="b"/>
                 </a:tc>
                 <a:tc>
                   <a:txBody>
@@ -3613,12 +3637,12 @@
                     <a:p>
                       <a:pPr algn="ctr" fontAlgn="b"/>
                       <a:r>
-                        <a:rPr lang="es-CO" sz="2300" u="none" strike="noStrike">
+                        <a:rPr lang="es-CO" sz="2100" u="none" strike="noStrike">
                           <a:effectLst/>
                         </a:rPr>
                         <a:t>HTML</a:t>
                       </a:r>
-                      <a:endParaRPr lang="es-CO" sz="2300" b="0" i="0" u="none" strike="noStrike">
+                      <a:endParaRPr lang="es-CO" sz="2100" b="0" i="0" u="none" strike="noStrike">
                         <a:solidFill>
                           <a:srgbClr val="464646"/>
                         </a:solidFill>
@@ -3627,7 +3651,7 @@
                       </a:endParaRPr>
                     </a:p>
                   </a:txBody>
-                  <a:tcPr marL="19959" marR="19959" marT="19959" marB="0" anchor="b"/>
+                  <a:tcPr marL="18200" marR="18200" marT="18200" marB="0" anchor="b"/>
                 </a:tc>
                 <a:tc>
                   <a:txBody>
@@ -3636,12 +3660,12 @@
                     <a:p>
                       <a:pPr algn="ctr" fontAlgn="b"/>
                       <a:r>
-                        <a:rPr lang="es-CO" sz="2300" u="none" strike="noStrike">
+                        <a:rPr lang="es-CO" sz="2100" u="none" strike="noStrike">
                           <a:effectLst/>
                         </a:rPr>
                         <a:t>itextpdf-5.5.1</a:t>
                       </a:r>
-                      <a:endParaRPr lang="es-CO" sz="2300" b="0" i="0" u="none" strike="noStrike">
+                      <a:endParaRPr lang="es-CO" sz="2100" b="0" i="0" u="none" strike="noStrike">
                         <a:solidFill>
                           <a:srgbClr val="464646"/>
                         </a:solidFill>
@@ -3650,10 +3674,10 @@
                       </a:endParaRPr>
                     </a:p>
                   </a:txBody>
-                  <a:tcPr marL="19959" marR="19959" marT="19959" marB="0" anchor="b"/>
+                  <a:tcPr marL="18200" marR="18200" marT="18200" marB="0" anchor="b"/>
                 </a:tc>
               </a:tr>
-              <a:tr h="399179">
+              <a:tr h="311053">
                 <a:tc>
                   <a:txBody>
                     <a:bodyPr/>
@@ -3661,12 +3685,12 @@
                     <a:p>
                       <a:pPr algn="ctr" fontAlgn="b"/>
                       <a:r>
-                        <a:rPr lang="es-CO" sz="2300" u="none" strike="noStrike">
+                        <a:rPr lang="es-CO" sz="2100" u="none" strike="noStrike" dirty="0">
                           <a:effectLst/>
                         </a:rPr>
                         <a:t>NetBeans IDE 8.2</a:t>
                       </a:r>
-                      <a:endParaRPr lang="es-CO" sz="2300" b="0" i="0" u="none" strike="noStrike">
+                      <a:endParaRPr lang="es-CO" sz="2100" b="0" i="0" u="none" strike="noStrike" dirty="0">
                         <a:solidFill>
                           <a:srgbClr val="464646"/>
                         </a:solidFill>
@@ -3675,7 +3699,7 @@
                       </a:endParaRPr>
                     </a:p>
                   </a:txBody>
-                  <a:tcPr marL="19959" marR="19959" marT="19959" marB="0" anchor="b"/>
+                  <a:tcPr marL="18200" marR="18200" marT="18200" marB="0" anchor="b"/>
                 </a:tc>
                 <a:tc>
                   <a:txBody>
@@ -3684,12 +3708,12 @@
                     <a:p>
                       <a:pPr algn="ctr" fontAlgn="b"/>
                       <a:r>
-                        <a:rPr lang="es-CO" sz="2300" u="none" strike="noStrike">
+                        <a:rPr lang="es-CO" sz="2100" u="none" strike="noStrike">
                           <a:effectLst/>
                         </a:rPr>
                         <a:t>CSS</a:t>
                       </a:r>
-                      <a:endParaRPr lang="es-CO" sz="2300" b="0" i="0" u="none" strike="noStrike">
+                      <a:endParaRPr lang="es-CO" sz="2100" b="0" i="0" u="none" strike="noStrike">
                         <a:solidFill>
                           <a:srgbClr val="464646"/>
                         </a:solidFill>
@@ -3698,7 +3722,7 @@
                       </a:endParaRPr>
                     </a:p>
                   </a:txBody>
-                  <a:tcPr marL="19959" marR="19959" marT="19959" marB="0" anchor="b"/>
+                  <a:tcPr marL="18200" marR="18200" marT="18200" marB="0" anchor="b"/>
                 </a:tc>
                 <a:tc>
                   <a:txBody>
@@ -3707,12 +3731,12 @@
                     <a:p>
                       <a:pPr algn="ctr" fontAlgn="b"/>
                       <a:r>
-                        <a:rPr lang="es-CO" sz="2300" u="none" strike="noStrike">
+                        <a:rPr lang="es-CO" sz="2100" u="none" strike="noStrike">
                           <a:effectLst/>
                         </a:rPr>
                         <a:t>jcommon-1.0.23</a:t>
                       </a:r>
-                      <a:endParaRPr lang="es-CO" sz="2300" b="0" i="0" u="none" strike="noStrike">
+                      <a:endParaRPr lang="es-CO" sz="2100" b="0" i="0" u="none" strike="noStrike">
                         <a:solidFill>
                           <a:srgbClr val="464646"/>
                         </a:solidFill>
@@ -3721,10 +3745,10 @@
                       </a:endParaRPr>
                     </a:p>
                   </a:txBody>
-                  <a:tcPr marL="19959" marR="19959" marT="19959" marB="0" anchor="b"/>
+                  <a:tcPr marL="18200" marR="18200" marT="18200" marB="0" anchor="b"/>
                 </a:tc>
               </a:tr>
-              <a:tr h="399179">
+              <a:tr h="311053">
                 <a:tc>
                   <a:txBody>
                     <a:bodyPr/>
@@ -3732,12 +3756,12 @@
                     <a:p>
                       <a:pPr algn="ctr" fontAlgn="b"/>
                       <a:r>
-                        <a:rPr lang="es-CO" sz="2300" u="none" strike="noStrike">
+                        <a:rPr lang="es-CO" sz="2100" u="none" strike="noStrike">
                           <a:effectLst/>
                         </a:rPr>
                         <a:t>Sublime Text 3</a:t>
                       </a:r>
-                      <a:endParaRPr lang="es-CO" sz="2300" b="0" i="0" u="none" strike="noStrike">
+                      <a:endParaRPr lang="es-CO" sz="2100" b="0" i="0" u="none" strike="noStrike">
                         <a:solidFill>
                           <a:srgbClr val="464646"/>
                         </a:solidFill>
@@ -3746,7 +3770,7 @@
                       </a:endParaRPr>
                     </a:p>
                   </a:txBody>
-                  <a:tcPr marL="19959" marR="19959" marT="19959" marB="0" anchor="b"/>
+                  <a:tcPr marL="18200" marR="18200" marT="18200" marB="0" anchor="b"/>
                 </a:tc>
                 <a:tc>
                   <a:txBody>
@@ -3755,12 +3779,12 @@
                     <a:p>
                       <a:pPr algn="ctr" fontAlgn="b"/>
                       <a:r>
-                        <a:rPr lang="es-CO" sz="2300" u="none" strike="noStrike">
+                        <a:rPr lang="es-CO" sz="2100" u="none" strike="noStrike">
                           <a:effectLst/>
                         </a:rPr>
                         <a:t>JS</a:t>
                       </a:r>
-                      <a:endParaRPr lang="es-CO" sz="2300" b="0" i="0" u="none" strike="noStrike">
+                      <a:endParaRPr lang="es-CO" sz="2100" b="0" i="0" u="none" strike="noStrike">
                         <a:solidFill>
                           <a:srgbClr val="464646"/>
                         </a:solidFill>
@@ -3769,7 +3793,7 @@
                       </a:endParaRPr>
                     </a:p>
                   </a:txBody>
-                  <a:tcPr marL="19959" marR="19959" marT="19959" marB="0" anchor="b"/>
+                  <a:tcPr marL="18200" marR="18200" marT="18200" marB="0" anchor="b"/>
                 </a:tc>
                 <a:tc>
                   <a:txBody>
@@ -3778,12 +3802,12 @@
                     <a:p>
                       <a:pPr algn="ctr" fontAlgn="b"/>
                       <a:r>
-                        <a:rPr lang="es-CO" sz="2300" u="none" strike="noStrike" dirty="0">
+                        <a:rPr lang="es-CO" sz="2100" u="none" strike="noStrike" dirty="0">
                           <a:effectLst/>
                         </a:rPr>
                         <a:t>jfreechart-1.0.19</a:t>
                       </a:r>
-                      <a:endParaRPr lang="es-CO" sz="2300" b="0" i="0" u="none" strike="noStrike" dirty="0">
+                      <a:endParaRPr lang="es-CO" sz="2100" b="0" i="0" u="none" strike="noStrike" dirty="0">
                         <a:solidFill>
                           <a:srgbClr val="464646"/>
                         </a:solidFill>
@@ -3792,10 +3816,10 @@
                       </a:endParaRPr>
                     </a:p>
                   </a:txBody>
-                  <a:tcPr marL="19959" marR="19959" marT="19959" marB="0" anchor="b"/>
+                  <a:tcPr marL="18200" marR="18200" marT="18200" marB="0" anchor="b"/>
                 </a:tc>
               </a:tr>
-              <a:tr h="399179">
+              <a:tr h="311053">
                 <a:tc>
                   <a:txBody>
                     <a:bodyPr/>
@@ -3803,12 +3827,12 @@
                     <a:p>
                       <a:pPr algn="ctr" fontAlgn="b"/>
                       <a:r>
-                        <a:rPr lang="es-CO" sz="2300" u="none" strike="noStrike">
+                        <a:rPr lang="es-CO" sz="2100" u="none" strike="noStrike">
                           <a:effectLst/>
                         </a:rPr>
                         <a:t>Apache Tomcat 9</a:t>
                       </a:r>
-                      <a:endParaRPr lang="es-CO" sz="2300" b="0" i="0" u="none" strike="noStrike">
+                      <a:endParaRPr lang="es-CO" sz="2100" b="0" i="0" u="none" strike="noStrike">
                         <a:solidFill>
                           <a:srgbClr val="464646"/>
                         </a:solidFill>
@@ -3817,7 +3841,7 @@
                       </a:endParaRPr>
                     </a:p>
                   </a:txBody>
-                  <a:tcPr marL="19959" marR="19959" marT="19959" marB="0" anchor="b"/>
+                  <a:tcPr marL="18200" marR="18200" marT="18200" marB="0" anchor="b"/>
                 </a:tc>
                 <a:tc>
                   <a:txBody>
@@ -3826,12 +3850,12 @@
                     <a:p>
                       <a:pPr algn="ctr" fontAlgn="b"/>
                       <a:r>
-                        <a:rPr lang="es-CO" sz="2300" u="none" strike="noStrike">
+                        <a:rPr lang="es-CO" sz="2100" u="none" strike="noStrike">
                           <a:effectLst/>
                         </a:rPr>
                         <a:t>SQL</a:t>
                       </a:r>
-                      <a:endParaRPr lang="es-CO" sz="2300" b="0" i="0" u="none" strike="noStrike">
+                      <a:endParaRPr lang="es-CO" sz="2100" b="0" i="0" u="none" strike="noStrike">
                         <a:solidFill>
                           <a:srgbClr val="464646"/>
                         </a:solidFill>
@@ -3840,7 +3864,7 @@
                       </a:endParaRPr>
                     </a:p>
                   </a:txBody>
-                  <a:tcPr marL="19959" marR="19959" marT="19959" marB="0" anchor="b"/>
+                  <a:tcPr marL="18200" marR="18200" marT="18200" marB="0" anchor="b"/>
                 </a:tc>
                 <a:tc>
                   <a:txBody>
@@ -3849,12 +3873,12 @@
                     <a:p>
                       <a:pPr algn="ctr" fontAlgn="b"/>
                       <a:r>
-                        <a:rPr lang="es-CO" sz="2300" u="none" strike="noStrike">
+                        <a:rPr lang="es-CO" sz="2100" u="none" strike="noStrike">
                           <a:effectLst/>
                         </a:rPr>
                         <a:t>mysql-connector-java-5.1.23-bin</a:t>
                       </a:r>
-                      <a:endParaRPr lang="es-CO" sz="2300" b="0" i="0" u="none" strike="noStrike">
+                      <a:endParaRPr lang="es-CO" sz="2100" b="0" i="0" u="none" strike="noStrike">
                         <a:solidFill>
                           <a:srgbClr val="464646"/>
                         </a:solidFill>
@@ -3863,10 +3887,10 @@
                       </a:endParaRPr>
                     </a:p>
                   </a:txBody>
-                  <a:tcPr marL="19959" marR="19959" marT="19959" marB="0" anchor="b"/>
+                  <a:tcPr marL="18200" marR="18200" marT="18200" marB="0" anchor="b"/>
                 </a:tc>
               </a:tr>
-              <a:tr h="399179">
+              <a:tr h="311053">
                 <a:tc>
                   <a:txBody>
                     <a:bodyPr/>
@@ -3874,12 +3898,12 @@
                     <a:p>
                       <a:pPr algn="ctr" fontAlgn="b"/>
                       <a:r>
-                        <a:rPr lang="es-CO" sz="2300" u="none" strike="noStrike">
+                        <a:rPr lang="es-CO" sz="2100" u="none" strike="noStrike">
                           <a:effectLst/>
                         </a:rPr>
                         <a:t>MySQL</a:t>
                       </a:r>
-                      <a:endParaRPr lang="es-CO" sz="2300" b="0" i="0" u="none" strike="noStrike">
+                      <a:endParaRPr lang="es-CO" sz="2100" b="0" i="0" u="none" strike="noStrike">
                         <a:solidFill>
                           <a:srgbClr val="464646"/>
                         </a:solidFill>
@@ -3888,7 +3912,7 @@
                       </a:endParaRPr>
                     </a:p>
                   </a:txBody>
-                  <a:tcPr marL="19959" marR="19959" marT="19959" marB="0" anchor="b"/>
+                  <a:tcPr marL="18200" marR="18200" marT="18200" marB="0" anchor="b"/>
                 </a:tc>
                 <a:tc>
                   <a:txBody>
@@ -3897,12 +3921,12 @@
                     <a:p>
                       <a:pPr algn="ctr" fontAlgn="b"/>
                       <a:r>
-                        <a:rPr lang="es-CO" sz="2300" u="none" strike="noStrike">
+                        <a:rPr lang="es-CO" sz="2100" u="none" strike="noStrike">
                           <a:effectLst/>
                         </a:rPr>
                         <a:t>JAVA</a:t>
                       </a:r>
-                      <a:endParaRPr lang="es-CO" sz="2300" b="0" i="0" u="none" strike="noStrike">
+                      <a:endParaRPr lang="es-CO" sz="2100" b="0" i="0" u="none" strike="noStrike">
                         <a:solidFill>
                           <a:srgbClr val="464646"/>
                         </a:solidFill>
@@ -3911,7 +3935,7 @@
                       </a:endParaRPr>
                     </a:p>
                   </a:txBody>
-                  <a:tcPr marL="19959" marR="19959" marT="19959" marB="0" anchor="b"/>
+                  <a:tcPr marL="18200" marR="18200" marT="18200" marB="0" anchor="b"/>
                 </a:tc>
                 <a:tc>
                   <a:txBody>
@@ -3920,12 +3944,12 @@
                     <a:p>
                       <a:pPr algn="ctr" fontAlgn="b"/>
                       <a:r>
-                        <a:rPr lang="es-CO" sz="2300" u="none" strike="noStrike">
+                        <a:rPr lang="es-CO" sz="2100" u="none" strike="noStrike">
                           <a:effectLst/>
                         </a:rPr>
                         <a:t>bootstrap3-3-7</a:t>
                       </a:r>
-                      <a:endParaRPr lang="es-CO" sz="2300" b="0" i="0" u="none" strike="noStrike">
+                      <a:endParaRPr lang="es-CO" sz="2100" b="0" i="0" u="none" strike="noStrike">
                         <a:solidFill>
                           <a:srgbClr val="464646"/>
                         </a:solidFill>
@@ -3934,10 +3958,10 @@
                       </a:endParaRPr>
                     </a:p>
                   </a:txBody>
-                  <a:tcPr marL="19959" marR="19959" marT="19959" marB="0" anchor="b"/>
+                  <a:tcPr marL="18200" marR="18200" marT="18200" marB="0" anchor="b"/>
                 </a:tc>
               </a:tr>
-              <a:tr h="399179">
+              <a:tr h="311053">
                 <a:tc>
                   <a:txBody>
                     <a:bodyPr/>
@@ -3945,12 +3969,12 @@
                     <a:p>
                       <a:pPr algn="ctr" fontAlgn="b"/>
                       <a:r>
-                        <a:rPr lang="es-CO" sz="2300" u="none" strike="noStrike">
+                        <a:rPr lang="es-CO" sz="2100" u="none" strike="noStrike">
                           <a:effectLst/>
                         </a:rPr>
                         <a:t>JRE</a:t>
                       </a:r>
-                      <a:endParaRPr lang="es-CO" sz="2300" b="0" i="0" u="none" strike="noStrike">
+                      <a:endParaRPr lang="es-CO" sz="2100" b="0" i="0" u="none" strike="noStrike">
                         <a:solidFill>
                           <a:srgbClr val="464646"/>
                         </a:solidFill>
@@ -3959,7 +3983,7 @@
                       </a:endParaRPr>
                     </a:p>
                   </a:txBody>
-                  <a:tcPr marL="19959" marR="19959" marT="19959" marB="0" anchor="b"/>
+                  <a:tcPr marL="18200" marR="18200" marT="18200" marB="0" anchor="b"/>
                 </a:tc>
                 <a:tc>
                   <a:txBody>
@@ -3968,12 +3992,12 @@
                     <a:p>
                       <a:pPr algn="ctr" fontAlgn="b"/>
                       <a:r>
-                        <a:rPr lang="es-CO" sz="2300" u="none" strike="noStrike">
+                        <a:rPr lang="es-CO" sz="2100" u="none" strike="noStrike">
                           <a:effectLst/>
                         </a:rPr>
                         <a:t> </a:t>
                       </a:r>
-                      <a:endParaRPr lang="es-CO" sz="2300" b="0" i="0" u="none" strike="noStrike">
+                      <a:endParaRPr lang="es-CO" sz="2100" b="0" i="0" u="none" strike="noStrike">
                         <a:solidFill>
                           <a:srgbClr val="464646"/>
                         </a:solidFill>
@@ -3982,7 +4006,7 @@
                       </a:endParaRPr>
                     </a:p>
                   </a:txBody>
-                  <a:tcPr marL="19959" marR="19959" marT="19959" marB="0" anchor="b"/>
+                  <a:tcPr marL="18200" marR="18200" marT="18200" marB="0" anchor="b"/>
                 </a:tc>
                 <a:tc>
                   <a:txBody>
@@ -3991,12 +4015,12 @@
                     <a:p>
                       <a:pPr algn="ctr" fontAlgn="b"/>
                       <a:r>
-                        <a:rPr lang="es-CO" sz="2300" u="none" strike="noStrike">
+                        <a:rPr lang="es-CO" sz="2100" u="none" strike="noStrike">
                           <a:effectLst/>
                         </a:rPr>
                         <a:t>bootstrap4-0-0</a:t>
                       </a:r>
-                      <a:endParaRPr lang="es-CO" sz="2300" b="0" i="0" u="none" strike="noStrike">
+                      <a:endParaRPr lang="es-CO" sz="2100" b="0" i="0" u="none" strike="noStrike">
                         <a:solidFill>
                           <a:srgbClr val="464646"/>
                         </a:solidFill>
@@ -4005,10 +4029,10 @@
                       </a:endParaRPr>
                     </a:p>
                   </a:txBody>
-                  <a:tcPr marL="19959" marR="19959" marT="19959" marB="0" anchor="b"/>
+                  <a:tcPr marL="18200" marR="18200" marT="18200" marB="0" anchor="b"/>
                 </a:tc>
               </a:tr>
-              <a:tr h="399179">
+              <a:tr h="311053">
                 <a:tc>
                   <a:txBody>
                     <a:bodyPr/>
@@ -4016,12 +4040,12 @@
                     <a:p>
                       <a:pPr algn="ctr" fontAlgn="b"/>
                       <a:r>
-                        <a:rPr lang="es-CO" sz="2300" u="none" strike="noStrike">
+                        <a:rPr lang="es-CO" sz="2100" u="none" strike="noStrike">
                           <a:effectLst/>
                         </a:rPr>
                         <a:t>JDK</a:t>
                       </a:r>
-                      <a:endParaRPr lang="es-CO" sz="2300" b="0" i="0" u="none" strike="noStrike">
+                      <a:endParaRPr lang="es-CO" sz="2100" b="0" i="0" u="none" strike="noStrike">
                         <a:solidFill>
                           <a:srgbClr val="464646"/>
                         </a:solidFill>
@@ -4030,7 +4054,7 @@
                       </a:endParaRPr>
                     </a:p>
                   </a:txBody>
-                  <a:tcPr marL="19959" marR="19959" marT="19959" marB="0" anchor="b"/>
+                  <a:tcPr marL="18200" marR="18200" marT="18200" marB="0" anchor="b"/>
                 </a:tc>
                 <a:tc>
                   <a:txBody>
@@ -4039,12 +4063,12 @@
                     <a:p>
                       <a:pPr algn="ctr" fontAlgn="b"/>
                       <a:r>
-                        <a:rPr lang="es-CO" sz="2300" u="none" strike="noStrike">
+                        <a:rPr lang="es-CO" sz="2100" u="none" strike="noStrike" dirty="0">
                           <a:effectLst/>
                         </a:rPr>
                         <a:t> </a:t>
                       </a:r>
-                      <a:endParaRPr lang="es-CO" sz="2300" b="0" i="0" u="none" strike="noStrike">
+                      <a:endParaRPr lang="es-CO" sz="2100" b="0" i="0" u="none" strike="noStrike" dirty="0">
                         <a:solidFill>
                           <a:srgbClr val="464646"/>
                         </a:solidFill>
@@ -4053,7 +4077,7 @@
                       </a:endParaRPr>
                     </a:p>
                   </a:txBody>
-                  <a:tcPr marL="19959" marR="19959" marT="19959" marB="0" anchor="b"/>
+                  <a:tcPr marL="18200" marR="18200" marT="18200" marB="0" anchor="b"/>
                 </a:tc>
                 <a:tc>
                   <a:txBody>
@@ -4062,12 +4086,12 @@
                     <a:p>
                       <a:pPr algn="ctr" fontAlgn="b"/>
                       <a:r>
-                        <a:rPr lang="es-CO" sz="2300" u="none" strike="noStrike">
+                        <a:rPr lang="es-CO" sz="2100" u="none" strike="noStrike">
                           <a:effectLst/>
                         </a:rPr>
                         <a:t>jquery3-2-1</a:t>
                       </a:r>
-                      <a:endParaRPr lang="es-CO" sz="2300" b="0" i="0" u="none" strike="noStrike">
+                      <a:endParaRPr lang="es-CO" sz="2100" b="0" i="0" u="none" strike="noStrike">
                         <a:solidFill>
                           <a:srgbClr val="464646"/>
                         </a:solidFill>
@@ -4076,10 +4100,10 @@
                       </a:endParaRPr>
                     </a:p>
                   </a:txBody>
-                  <a:tcPr marL="19959" marR="19959" marT="19959" marB="0" anchor="b"/>
+                  <a:tcPr marL="18200" marR="18200" marT="18200" marB="0" anchor="b"/>
                 </a:tc>
               </a:tr>
-              <a:tr h="399179">
+              <a:tr h="311053">
                 <a:tc>
                   <a:txBody>
                     <a:bodyPr/>
@@ -4087,12 +4111,12 @@
                     <a:p>
                       <a:pPr algn="ctr" fontAlgn="b"/>
                       <a:r>
-                        <a:rPr lang="es-CO" sz="2300" u="none" strike="noStrike">
+                        <a:rPr lang="es-CO" sz="2100" u="none" strike="noStrike">
                           <a:effectLst/>
                         </a:rPr>
                         <a:t>Terminator - bash</a:t>
                       </a:r>
-                      <a:endParaRPr lang="es-CO" sz="2300" b="0" i="0" u="none" strike="noStrike">
+                      <a:endParaRPr lang="es-CO" sz="2100" b="0" i="0" u="none" strike="noStrike">
                         <a:solidFill>
                           <a:srgbClr val="464646"/>
                         </a:solidFill>
@@ -4101,7 +4125,7 @@
                       </a:endParaRPr>
                     </a:p>
                   </a:txBody>
-                  <a:tcPr marL="19959" marR="19959" marT="19959" marB="0" anchor="b"/>
+                  <a:tcPr marL="18200" marR="18200" marT="18200" marB="0" anchor="b"/>
                 </a:tc>
                 <a:tc>
                   <a:txBody>
@@ -4110,12 +4134,12 @@
                     <a:p>
                       <a:pPr algn="ctr" fontAlgn="b"/>
                       <a:r>
-                        <a:rPr lang="es-CO" sz="2300" u="none" strike="noStrike">
+                        <a:rPr lang="es-CO" sz="2100" u="none" strike="noStrike">
                           <a:effectLst/>
                         </a:rPr>
                         <a:t> </a:t>
                       </a:r>
-                      <a:endParaRPr lang="es-CO" sz="2300" b="0" i="0" u="none" strike="noStrike">
+                      <a:endParaRPr lang="es-CO" sz="2100" b="0" i="0" u="none" strike="noStrike">
                         <a:solidFill>
                           <a:srgbClr val="464646"/>
                         </a:solidFill>
@@ -4124,7 +4148,7 @@
                       </a:endParaRPr>
                     </a:p>
                   </a:txBody>
-                  <a:tcPr marL="19959" marR="19959" marT="19959" marB="0" anchor="b"/>
+                  <a:tcPr marL="18200" marR="18200" marT="18200" marB="0" anchor="b"/>
                 </a:tc>
                 <a:tc>
                   <a:txBody>
@@ -4133,12 +4157,12 @@
                     <a:p>
                       <a:pPr algn="ctr" fontAlgn="b"/>
                       <a:r>
-                        <a:rPr lang="es-CO" sz="2300" u="none" strike="noStrike">
+                        <a:rPr lang="es-CO" sz="2100" u="none" strike="noStrike">
                           <a:effectLst/>
                         </a:rPr>
                         <a:t>jquery3-3-1</a:t>
                       </a:r>
-                      <a:endParaRPr lang="es-CO" sz="2300" b="0" i="0" u="none" strike="noStrike">
+                      <a:endParaRPr lang="es-CO" sz="2100" b="0" i="0" u="none" strike="noStrike">
                         <a:solidFill>
                           <a:srgbClr val="464646"/>
                         </a:solidFill>
@@ -4147,10 +4171,10 @@
                       </a:endParaRPr>
                     </a:p>
                   </a:txBody>
-                  <a:tcPr marL="19959" marR="19959" marT="19959" marB="0" anchor="b"/>
+                  <a:tcPr marL="18200" marR="18200" marT="18200" marB="0" anchor="b"/>
                 </a:tc>
               </a:tr>
-              <a:tr h="399179">
+              <a:tr h="311053">
                 <a:tc>
                   <a:txBody>
                     <a:bodyPr/>
@@ -4158,12 +4182,24 @@
                     <a:p>
                       <a:pPr algn="ctr" fontAlgn="b"/>
                       <a:r>
-                        <a:rPr lang="es-CO" sz="2300" u="none" strike="noStrike">
+                        <a:rPr lang="es-CO" sz="2100" u="none" strike="noStrike" dirty="0" smtClean="0">
+                          <a:effectLst/>
+                        </a:rPr>
+                        <a:t>GIT</a:t>
+                      </a:r>
+                      <a:r>
+                        <a:rPr lang="es-CO" sz="2100" u="none" strike="noStrike" baseline="0" dirty="0" smtClean="0">
+                          <a:effectLst/>
+                        </a:rPr>
+                        <a:t> - </a:t>
+                      </a:r>
+                      <a:r>
+                        <a:rPr lang="es-CO" sz="2100" u="none" strike="noStrike" dirty="0" smtClean="0">
                           <a:effectLst/>
                         </a:rPr>
                         <a:t>GitHub</a:t>
                       </a:r>
-                      <a:endParaRPr lang="es-CO" sz="2300" b="0" i="0" u="none" strike="noStrike">
+                      <a:endParaRPr lang="es-CO" sz="2100" b="0" i="0" u="none" strike="noStrike" dirty="0">
                         <a:solidFill>
                           <a:srgbClr val="464646"/>
                         </a:solidFill>
@@ -4172,7 +4208,7 @@
                       </a:endParaRPr>
                     </a:p>
                   </a:txBody>
-                  <a:tcPr marL="19959" marR="19959" marT="19959" marB="0" anchor="b"/>
+                  <a:tcPr marL="18200" marR="18200" marT="18200" marB="0" anchor="b"/>
                 </a:tc>
                 <a:tc>
                   <a:txBody>
@@ -4181,12 +4217,12 @@
                     <a:p>
                       <a:pPr algn="ctr" fontAlgn="b"/>
                       <a:r>
-                        <a:rPr lang="es-CO" sz="2300" u="none" strike="noStrike">
+                        <a:rPr lang="es-CO" sz="2100" u="none" strike="noStrike">
                           <a:effectLst/>
                         </a:rPr>
                         <a:t> </a:t>
                       </a:r>
-                      <a:endParaRPr lang="es-CO" sz="2300" b="0" i="0" u="none" strike="noStrike">
+                      <a:endParaRPr lang="es-CO" sz="2100" b="0" i="0" u="none" strike="noStrike">
                         <a:solidFill>
                           <a:srgbClr val="464646"/>
                         </a:solidFill>
@@ -4195,7 +4231,7 @@
                       </a:endParaRPr>
                     </a:p>
                   </a:txBody>
-                  <a:tcPr marL="19959" marR="19959" marT="19959" marB="0" anchor="b"/>
+                  <a:tcPr marL="18200" marR="18200" marT="18200" marB="0" anchor="b"/>
                 </a:tc>
                 <a:tc>
                   <a:txBody>
@@ -4204,12 +4240,12 @@
                     <a:p>
                       <a:pPr algn="ctr" fontAlgn="b"/>
                       <a:r>
-                        <a:rPr lang="es-CO" sz="2300" u="none" strike="noStrike">
+                        <a:rPr lang="es-CO" sz="2100" u="none" strike="noStrike">
                           <a:effectLst/>
                         </a:rPr>
                         <a:t>Grayscale v5.0.2</a:t>
                       </a:r>
-                      <a:endParaRPr lang="es-CO" sz="2300" b="0" i="0" u="none" strike="noStrike">
+                      <a:endParaRPr lang="es-CO" sz="2100" b="0" i="0" u="none" strike="noStrike">
                         <a:solidFill>
                           <a:srgbClr val="464646"/>
                         </a:solidFill>
@@ -4218,10 +4254,10 @@
                       </a:endParaRPr>
                     </a:p>
                   </a:txBody>
-                  <a:tcPr marL="19959" marR="19959" marT="19959" marB="0" anchor="b"/>
+                  <a:tcPr marL="18200" marR="18200" marT="18200" marB="0" anchor="b"/>
                 </a:tc>
               </a:tr>
-              <a:tr h="399179">
+              <a:tr h="311053">
                 <a:tc>
                   <a:txBody>
                     <a:bodyPr/>
@@ -4229,12 +4265,12 @@
                     <a:p>
                       <a:pPr algn="ctr" fontAlgn="b"/>
                       <a:r>
-                        <a:rPr lang="es-CO" sz="2300" u="none" strike="noStrike">
+                        <a:rPr lang="es-CO" sz="2100" u="none" strike="noStrike">
                           <a:effectLst/>
                         </a:rPr>
                         <a:t>Mozilla Firefox</a:t>
                       </a:r>
-                      <a:endParaRPr lang="es-CO" sz="2300" b="0" i="0" u="none" strike="noStrike">
+                      <a:endParaRPr lang="es-CO" sz="2100" b="0" i="0" u="none" strike="noStrike">
                         <a:solidFill>
                           <a:srgbClr val="464646"/>
                         </a:solidFill>
@@ -4243,7 +4279,7 @@
                       </a:endParaRPr>
                     </a:p>
                   </a:txBody>
-                  <a:tcPr marL="19959" marR="19959" marT="19959" marB="0" anchor="b"/>
+                  <a:tcPr marL="18200" marR="18200" marT="18200" marB="0" anchor="b"/>
                 </a:tc>
                 <a:tc>
                   <a:txBody>
@@ -4252,12 +4288,12 @@
                     <a:p>
                       <a:pPr algn="ctr" fontAlgn="b"/>
                       <a:r>
-                        <a:rPr lang="es-CO" sz="2300" u="none" strike="noStrike">
+                        <a:rPr lang="es-CO" sz="2100" u="none" strike="noStrike">
                           <a:effectLst/>
                         </a:rPr>
                         <a:t> </a:t>
                       </a:r>
-                      <a:endParaRPr lang="es-CO" sz="2300" b="0" i="0" u="none" strike="noStrike">
+                      <a:endParaRPr lang="es-CO" sz="2100" b="0" i="0" u="none" strike="noStrike">
                         <a:solidFill>
                           <a:srgbClr val="464646"/>
                         </a:solidFill>
@@ -4266,7 +4302,7 @@
                       </a:endParaRPr>
                     </a:p>
                   </a:txBody>
-                  <a:tcPr marL="19959" marR="19959" marT="19959" marB="0" anchor="b"/>
+                  <a:tcPr marL="18200" marR="18200" marT="18200" marB="0" anchor="b"/>
                 </a:tc>
                 <a:tc>
                   <a:txBody>
@@ -4275,12 +4311,18 @@
                     <a:p>
                       <a:pPr algn="ctr" fontAlgn="b"/>
                       <a:r>
-                        <a:rPr lang="es-CO" sz="2300" u="none" strike="noStrike">
+                        <a:rPr lang="es-CO" sz="2100" u="none" strike="noStrike" dirty="0">
                           <a:effectLst/>
                         </a:rPr>
                         <a:t> </a:t>
                       </a:r>
-                      <a:endParaRPr lang="es-CO" sz="2300" b="0" i="0" u="none" strike="noStrike">
+                      <a:r>
+                        <a:rPr lang="es-CO" sz="2100" u="none" strike="noStrike" dirty="0" smtClean="0">
+                          <a:effectLst/>
+                        </a:rPr>
+                        <a:t>Google Fonts</a:t>
+                      </a:r>
+                      <a:endParaRPr lang="es-CO" sz="2100" b="0" i="0" u="none" strike="noStrike" dirty="0">
                         <a:solidFill>
                           <a:srgbClr val="464646"/>
                         </a:solidFill>
@@ -4289,10 +4331,10 @@
                       </a:endParaRPr>
                     </a:p>
                   </a:txBody>
-                  <a:tcPr marL="19959" marR="19959" marT="19959" marB="0" anchor="b"/>
+                  <a:tcPr marL="18200" marR="18200" marT="18200" marB="0" anchor="b"/>
                 </a:tc>
               </a:tr>
-              <a:tr h="399179">
+              <a:tr h="311053">
                 <a:tc>
                   <a:txBody>
                     <a:bodyPr/>
@@ -4300,12 +4342,12 @@
                     <a:p>
                       <a:pPr algn="ctr" fontAlgn="b"/>
                       <a:r>
-                        <a:rPr lang="es-CO" sz="2300" u="none" strike="noStrike">
+                        <a:rPr lang="es-CO" sz="2100" u="none" strike="noStrike">
                           <a:effectLst/>
                         </a:rPr>
                         <a:t>Google Chrome</a:t>
                       </a:r>
-                      <a:endParaRPr lang="es-CO" sz="2300" b="0" i="0" u="none" strike="noStrike">
+                      <a:endParaRPr lang="es-CO" sz="2100" b="0" i="0" u="none" strike="noStrike">
                         <a:solidFill>
                           <a:srgbClr val="464646"/>
                         </a:solidFill>
@@ -4314,7 +4356,7 @@
                       </a:endParaRPr>
                     </a:p>
                   </a:txBody>
-                  <a:tcPr marL="19959" marR="19959" marT="19959" marB="0" anchor="b"/>
+                  <a:tcPr marL="18200" marR="18200" marT="18200" marB="0" anchor="b"/>
                 </a:tc>
                 <a:tc>
                   <a:txBody>
@@ -4323,12 +4365,12 @@
                     <a:p>
                       <a:pPr algn="ctr" fontAlgn="b"/>
                       <a:r>
-                        <a:rPr lang="es-CO" sz="2300" u="none" strike="noStrike">
+                        <a:rPr lang="es-CO" sz="2100" u="none" strike="noStrike">
                           <a:effectLst/>
                         </a:rPr>
                         <a:t> </a:t>
                       </a:r>
-                      <a:endParaRPr lang="es-CO" sz="2300" b="0" i="0" u="none" strike="noStrike">
+                      <a:endParaRPr lang="es-CO" sz="2100" b="0" i="0" u="none" strike="noStrike">
                         <a:solidFill>
                           <a:srgbClr val="464646"/>
                         </a:solidFill>
@@ -4337,7 +4379,7 @@
                       </a:endParaRPr>
                     </a:p>
                   </a:txBody>
-                  <a:tcPr marL="19959" marR="19959" marT="19959" marB="0" anchor="b"/>
+                  <a:tcPr marL="18200" marR="18200" marT="18200" marB="0" anchor="b"/>
                 </a:tc>
                 <a:tc>
                   <a:txBody>
@@ -4346,12 +4388,12 @@
                     <a:p>
                       <a:pPr algn="ctr" fontAlgn="b"/>
                       <a:r>
-                        <a:rPr lang="es-CO" sz="2300" u="none" strike="noStrike" dirty="0">
+                        <a:rPr lang="es-CO" sz="2100" u="none" strike="noStrike" dirty="0">
                           <a:effectLst/>
                         </a:rPr>
                         <a:t> </a:t>
                       </a:r>
-                      <a:endParaRPr lang="es-CO" sz="2300" b="0" i="0" u="none" strike="noStrike" dirty="0">
+                      <a:endParaRPr lang="es-CO" sz="2100" b="0" i="0" u="none" strike="noStrike" dirty="0">
                         <a:solidFill>
                           <a:srgbClr val="464646"/>
                         </a:solidFill>
@@ -4360,13 +4402,52 @@
                       </a:endParaRPr>
                     </a:p>
                   </a:txBody>
-                  <a:tcPr marL="19959" marR="19959" marT="19959" marB="0" anchor="b"/>
+                  <a:tcPr marL="18200" marR="18200" marT="18200" marB="0" anchor="b"/>
                 </a:tc>
               </a:tr>
             </a:tbl>
           </a:graphicData>
         </a:graphic>
       </p:graphicFrame>
+      <p:sp>
+        <p:nvSpPr>
+          <p:cNvPr id="5" name="CuadroTexto 4">
+            <a:extLst>
+              <a:ext uri="{FF2B5EF4-FFF2-40B4-BE49-F238E27FC236}">
+                <a16:creationId xmlns:a16="http://schemas.microsoft.com/office/drawing/2014/main" xmlns="" id="{BC049DBC-6933-4F01-99CD-12D18B825504}"/>
+              </a:ext>
+            </a:extLst>
+          </p:cNvPr>
+          <p:cNvSpPr txBox="1"/>
+          <p:nvPr/>
+        </p:nvSpPr>
+        <p:spPr>
+          <a:xfrm>
+            <a:off x="1856488" y="6298550"/>
+            <a:ext cx="7826373" cy="461665"/>
+          </a:xfrm>
+          <a:prstGeom prst="rect">
+            <a:avLst/>
+          </a:prstGeom>
+          <a:noFill/>
+        </p:spPr>
+        <p:txBody>
+          <a:bodyPr wrap="none" rtlCol="0">
+            <a:spAutoFit/>
+          </a:bodyPr>
+          <a:lstStyle/>
+          <a:p>
+            <a:pPr algn="just"/>
+            <a:r>
+              <a:rPr lang="es-MX" sz="2400" i="1" dirty="0" smtClean="0">
+                <a:latin typeface="Times New Roman" panose="02020603050405020304" pitchFamily="18" charset="0"/>
+                <a:cs typeface="Times New Roman" panose="02020603050405020304" pitchFamily="18" charset="0"/>
+              </a:rPr>
+              <a:t>Tabla 2: Herramientas usadas para el desarrollo del proyecto</a:t>
+            </a:r>
+          </a:p>
+        </p:txBody>
+      </p:sp>
     </p:spTree>
     <p:extLst>
       <p:ext uri="{BB962C8B-B14F-4D97-AF65-F5344CB8AC3E}">
@@ -4409,7 +4490,7 @@
           <p:cNvPr id="2" name="Título 1">
             <a:extLst>
               <a:ext uri="{FF2B5EF4-FFF2-40B4-BE49-F238E27FC236}">
-                <a16:creationId xmlns="" xmlns:a16="http://schemas.microsoft.com/office/drawing/2014/main" id="{C7865A72-DE1F-466B-A5F8-4414A393198E}"/>
+                <a16:creationId xmlns:a16="http://schemas.microsoft.com/office/drawing/2014/main" xmlns="" id="{C7865A72-DE1F-466B-A5F8-4414A393198E}"/>
               </a:ext>
             </a:extLst>
           </p:cNvPr>
@@ -4447,7 +4528,7 @@
           <p:cNvPr id="6" name="CuadroTexto 5">
             <a:extLst>
               <a:ext uri="{FF2B5EF4-FFF2-40B4-BE49-F238E27FC236}">
-                <a16:creationId xmlns="" xmlns:a16="http://schemas.microsoft.com/office/drawing/2014/main" id="{9175FBDA-696B-46FE-97CD-48084F55349C}"/>
+                <a16:creationId xmlns:a16="http://schemas.microsoft.com/office/drawing/2014/main" xmlns="" id="{9175FBDA-696B-46FE-97CD-48084F55349C}"/>
               </a:ext>
             </a:extLst>
           </p:cNvPr>
@@ -4532,7 +4613,7 @@
           <p:cNvPr id="2" name="Título 1">
             <a:extLst>
               <a:ext uri="{FF2B5EF4-FFF2-40B4-BE49-F238E27FC236}">
-                <a16:creationId xmlns="" xmlns:a16="http://schemas.microsoft.com/office/drawing/2014/main" id="{66349900-D031-47AB-BEDC-4E081B677983}"/>
+                <a16:creationId xmlns:a16="http://schemas.microsoft.com/office/drawing/2014/main" xmlns="" id="{66349900-D031-47AB-BEDC-4E081B677983}"/>
               </a:ext>
             </a:extLst>
           </p:cNvPr>
@@ -4562,7 +4643,7 @@
                   <a:schemeClr val="bg1"/>
                 </a:solidFill>
               </a:rPr>
-              <a:t>Aplicación  Administrador</a:t>
+              <a:t>Aplicación  administrador</a:t>
             </a:r>
             <a:endParaRPr lang="es-MX" b="1" dirty="0">
               <a:solidFill>
@@ -4611,10 +4692,10 @@
       </p:grpSpPr>
       <p:sp>
         <p:nvSpPr>
-          <p:cNvPr id="7" name="Título 1">
+          <p:cNvPr id="4" name="Título 1">
             <a:extLst>
               <a:ext uri="{FF2B5EF4-FFF2-40B4-BE49-F238E27FC236}">
-                <a16:creationId xmlns="" xmlns:a16="http://schemas.microsoft.com/office/drawing/2014/main" id="{C3BE746C-55A6-4A5A-8369-4059474DFBF3}"/>
+                <a16:creationId xmlns:a16="http://schemas.microsoft.com/office/drawing/2014/main" xmlns="" id="{66349900-D031-47AB-BEDC-4E081B677983}"/>
               </a:ext>
             </a:extLst>
           </p:cNvPr>
@@ -4639,13 +4720,18 @@
           <a:p>
             <a:pPr algn="ctr"/>
             <a:r>
-              <a:rPr lang="es-MX" b="1" dirty="0">
+              <a:rPr lang="es-MX" b="1" dirty="0" smtClean="0">
                 <a:solidFill>
                   <a:schemeClr val="bg1"/>
                 </a:solidFill>
               </a:rPr>
-              <a:t>Aplicación – administrador (2/2)</a:t>
-            </a:r>
+              <a:t>Aplicación  administrador</a:t>
+            </a:r>
+            <a:endParaRPr lang="es-MX" b="1" dirty="0">
+              <a:solidFill>
+                <a:schemeClr val="bg1"/>
+              </a:solidFill>
+            </a:endParaRPr>
           </a:p>
         </p:txBody>
       </p:sp>
@@ -4691,7 +4777,7 @@
           <p:cNvPr id="2" name="Título 1">
             <a:extLst>
               <a:ext uri="{FF2B5EF4-FFF2-40B4-BE49-F238E27FC236}">
-                <a16:creationId xmlns="" xmlns:a16="http://schemas.microsoft.com/office/drawing/2014/main" id="{20E3E2B8-98E6-4853-BD73-B594159DA5C1}"/>
+                <a16:creationId xmlns:a16="http://schemas.microsoft.com/office/drawing/2014/main" xmlns="" id="{20E3E2B8-98E6-4853-BD73-B594159DA5C1}"/>
               </a:ext>
             </a:extLst>
           </p:cNvPr>
@@ -4779,7 +4865,7 @@
           <p:cNvPr id="2" name="Título 1">
             <a:extLst>
               <a:ext uri="{FF2B5EF4-FFF2-40B4-BE49-F238E27FC236}">
-                <a16:creationId xmlns="" xmlns:a16="http://schemas.microsoft.com/office/drawing/2014/main" id="{7D1C18C5-A4E6-4F7D-8261-614125ADA2DD}"/>
+                <a16:creationId xmlns:a16="http://schemas.microsoft.com/office/drawing/2014/main" xmlns="" id="{7D1C18C5-A4E6-4F7D-8261-614125ADA2DD}"/>
               </a:ext>
             </a:extLst>
           </p:cNvPr>
@@ -4822,7 +4908,7 @@
           <p:cNvPr id="3" name="Marcador de contenido 2">
             <a:extLst>
               <a:ext uri="{FF2B5EF4-FFF2-40B4-BE49-F238E27FC236}">
-                <a16:creationId xmlns="" xmlns:a16="http://schemas.microsoft.com/office/drawing/2014/main" id="{0401B7CA-63E0-4B3B-B133-07C0E4316296}"/>
+                <a16:creationId xmlns:a16="http://schemas.microsoft.com/office/drawing/2014/main" xmlns="" id="{0401B7CA-63E0-4B3B-B133-07C0E4316296}"/>
               </a:ext>
             </a:extLst>
           </p:cNvPr>
@@ -4898,7 +4984,7 @@
           <p:cNvPr id="2" name="Título 1">
             <a:extLst>
               <a:ext uri="{FF2B5EF4-FFF2-40B4-BE49-F238E27FC236}">
-                <a16:creationId xmlns="" xmlns:a16="http://schemas.microsoft.com/office/drawing/2014/main" id="{F3C1574D-8292-4410-B1E4-1EBE9DF828D1}"/>
+                <a16:creationId xmlns:a16="http://schemas.microsoft.com/office/drawing/2014/main" xmlns="" id="{F3C1574D-8292-4410-B1E4-1EBE9DF828D1}"/>
               </a:ext>
             </a:extLst>
           </p:cNvPr>
@@ -4944,7 +5030,7 @@
           <p:cNvPr id="3" name="Marcador de contenido 2">
             <a:extLst>
               <a:ext uri="{FF2B5EF4-FFF2-40B4-BE49-F238E27FC236}">
-                <a16:creationId xmlns="" xmlns:a16="http://schemas.microsoft.com/office/drawing/2014/main" id="{FF0FB3A2-B486-4D36-B284-27C22DD5AB74}"/>
+                <a16:creationId xmlns:a16="http://schemas.microsoft.com/office/drawing/2014/main" xmlns="" id="{FF0FB3A2-B486-4D36-B284-27C22DD5AB74}"/>
               </a:ext>
             </a:extLst>
           </p:cNvPr>
@@ -5053,12 +5139,14 @@
         </p:nvSpPr>
         <p:spPr>
           <a:xfrm>
-            <a:off x="508996" y="1571222"/>
-            <a:ext cx="5312255" cy="4649273"/>
+            <a:off x="334851" y="3181082"/>
+            <a:ext cx="7250805" cy="3541690"/>
           </a:xfrm>
         </p:spPr>
         <p:txBody>
-          <a:bodyPr/>
+          <a:bodyPr>
+            <a:normAutofit/>
+          </a:bodyPr>
           <a:lstStyle/>
           <a:p>
             <a:pPr marL="0" indent="0" algn="just">
@@ -5071,12 +5159,96 @@
               <a:buNone/>
             </a:pPr>
             <a:r>
-              <a:rPr lang="es-CO" b="1" dirty="0"/>
-              <a:t>La implementación </a:t>
-            </a:r>
-            <a:r>
               <a:rPr lang="es-CO" b="1" dirty="0" smtClean="0"/>
-              <a:t>de:</a:t>
+              <a:t>El desarrollo de:</a:t>
+            </a:r>
+          </a:p>
+          <a:p>
+            <a:pPr marL="0" indent="0" algn="just">
+              <a:lnSpc>
+                <a:spcPct val="100000"/>
+              </a:lnSpc>
+              <a:spcBef>
+                <a:spcPts val="0"/>
+              </a:spcBef>
+              <a:buNone/>
+            </a:pPr>
+            <a:endParaRPr lang="es-CO" dirty="0" smtClean="0"/>
+          </a:p>
+          <a:p>
+            <a:pPr algn="just">
+              <a:lnSpc>
+                <a:spcPct val="100000"/>
+              </a:lnSpc>
+              <a:spcBef>
+                <a:spcPts val="0"/>
+              </a:spcBef>
+            </a:pPr>
+            <a:r>
+              <a:rPr lang="es-CO" dirty="0" smtClean="0"/>
+              <a:t>Bases </a:t>
+            </a:r>
+            <a:r>
+              <a:rPr lang="es-CO" dirty="0"/>
+              <a:t>de </a:t>
+            </a:r>
+            <a:r>
+              <a:rPr lang="es-CO" dirty="0" smtClean="0"/>
+              <a:t>datos</a:t>
+            </a:r>
+          </a:p>
+          <a:p>
+            <a:pPr algn="just">
+              <a:lnSpc>
+                <a:spcPct val="100000"/>
+              </a:lnSpc>
+              <a:spcBef>
+                <a:spcPts val="0"/>
+              </a:spcBef>
+            </a:pPr>
+            <a:r>
+              <a:rPr lang="es-CO" dirty="0"/>
+              <a:t>Sistemas </a:t>
+            </a:r>
+            <a:r>
+              <a:rPr lang="es-CO" dirty="0" smtClean="0"/>
+              <a:t>web</a:t>
+            </a:r>
+          </a:p>
+          <a:p>
+            <a:pPr algn="just">
+              <a:lnSpc>
+                <a:spcPct val="100000"/>
+              </a:lnSpc>
+              <a:spcBef>
+                <a:spcPts val="0"/>
+              </a:spcBef>
+            </a:pPr>
+            <a:r>
+              <a:rPr lang="es-CO" dirty="0" smtClean="0"/>
+              <a:t>Aplicaciones móviles</a:t>
+            </a:r>
+          </a:p>
+          <a:p>
+            <a:pPr algn="just">
+              <a:lnSpc>
+                <a:spcPct val="100000"/>
+              </a:lnSpc>
+              <a:spcBef>
+                <a:spcPts val="0"/>
+              </a:spcBef>
+            </a:pPr>
+            <a:r>
+              <a:rPr lang="es-CO" dirty="0" smtClean="0"/>
+              <a:t>Programas </a:t>
+            </a:r>
+            <a:r>
+              <a:rPr lang="es-CO" dirty="0"/>
+              <a:t>de </a:t>
+            </a:r>
+            <a:r>
+              <a:rPr lang="es-CO" dirty="0" smtClean="0"/>
+              <a:t>escritorio</a:t>
             </a:r>
           </a:p>
           <a:p>
@@ -5091,89 +5263,6 @@
             <a:endParaRPr lang="es-CO" dirty="0" smtClean="0"/>
           </a:p>
           <a:p>
-            <a:pPr algn="just">
-              <a:lnSpc>
-                <a:spcPct val="100000"/>
-              </a:lnSpc>
-              <a:spcBef>
-                <a:spcPts val="0"/>
-              </a:spcBef>
-            </a:pPr>
-            <a:r>
-              <a:rPr lang="es-CO" dirty="0" smtClean="0"/>
-              <a:t>Bases </a:t>
-            </a:r>
-            <a:r>
-              <a:rPr lang="es-CO" dirty="0"/>
-              <a:t>de </a:t>
-            </a:r>
-            <a:r>
-              <a:rPr lang="es-CO" dirty="0" smtClean="0"/>
-              <a:t>datos</a:t>
-            </a:r>
-          </a:p>
-          <a:p>
-            <a:pPr algn="just">
-              <a:lnSpc>
-                <a:spcPct val="100000"/>
-              </a:lnSpc>
-              <a:spcBef>
-                <a:spcPts val="0"/>
-              </a:spcBef>
-            </a:pPr>
-            <a:r>
-              <a:rPr lang="es-CO" dirty="0" smtClean="0"/>
-              <a:t>Aplicaciones móviles</a:t>
-            </a:r>
-          </a:p>
-          <a:p>
-            <a:pPr algn="just">
-              <a:lnSpc>
-                <a:spcPct val="100000"/>
-              </a:lnSpc>
-              <a:spcBef>
-                <a:spcPts val="0"/>
-              </a:spcBef>
-            </a:pPr>
-            <a:r>
-              <a:rPr lang="es-CO" dirty="0" smtClean="0"/>
-              <a:t>Sistemas web</a:t>
-            </a:r>
-          </a:p>
-          <a:p>
-            <a:pPr algn="just">
-              <a:lnSpc>
-                <a:spcPct val="100000"/>
-              </a:lnSpc>
-              <a:spcBef>
-                <a:spcPts val="0"/>
-              </a:spcBef>
-            </a:pPr>
-            <a:r>
-              <a:rPr lang="es-CO" dirty="0" smtClean="0"/>
-              <a:t>Programas </a:t>
-            </a:r>
-            <a:r>
-              <a:rPr lang="es-CO" dirty="0"/>
-              <a:t>de </a:t>
-            </a:r>
-            <a:r>
-              <a:rPr lang="es-CO" dirty="0" smtClean="0"/>
-              <a:t>escritorio</a:t>
-            </a:r>
-          </a:p>
-          <a:p>
-            <a:pPr algn="just">
-              <a:lnSpc>
-                <a:spcPct val="100000"/>
-              </a:lnSpc>
-              <a:spcBef>
-                <a:spcPts val="0"/>
-              </a:spcBef>
-            </a:pPr>
-            <a:endParaRPr lang="es-CO" dirty="0" smtClean="0"/>
-          </a:p>
-          <a:p>
             <a:pPr marL="0" indent="0" algn="just">
               <a:lnSpc>
                 <a:spcPct val="100000"/>
@@ -5185,7 +5274,7 @@
             </a:pPr>
             <a:r>
               <a:rPr lang="es-CO" dirty="0" smtClean="0"/>
-              <a:t>Facilitan La gestión, de grandes cantidades de información.</a:t>
+              <a:t>Facilitan La gestión de esta información.</a:t>
             </a:r>
             <a:endParaRPr lang="es-CO" dirty="0"/>
           </a:p>
@@ -5193,14 +5282,16 @@
       </p:sp>
       <p:pic>
         <p:nvPicPr>
-          <p:cNvPr id="4" name="Imagen 3"/>
+          <p:cNvPr id="4" name="Imagen 3">
+            <a:hlinkClick r:id="rId2"/>
+          </p:cNvPr>
           <p:cNvPicPr>
             <a:picLocks noChangeAspect="1"/>
           </p:cNvPicPr>
           <p:nvPr/>
         </p:nvPicPr>
         <p:blipFill>
-          <a:blip r:embed="rId2">
+          <a:blip r:embed="rId3">
             <a:extLst>
               <a:ext uri="{28A0092B-C50C-407E-A947-70E740481C1C}">
                 <a14:useLocalDpi xmlns:a14="http://schemas.microsoft.com/office/drawing/2010/main" val="0"/>
@@ -5213,14 +5304,283 @@
         </p:blipFill>
         <p:spPr>
           <a:xfrm>
-            <a:off x="6407998" y="2469926"/>
-            <a:ext cx="5521147" cy="3312688"/>
+            <a:off x="5602310" y="2611593"/>
+            <a:ext cx="5888953" cy="3533372"/>
           </a:xfrm>
           <a:prstGeom prst="rect">
             <a:avLst/>
           </a:prstGeom>
         </p:spPr>
       </p:pic>
+      <p:cxnSp>
+        <p:nvCxnSpPr>
+          <p:cNvPr id="13" name="Conector recto de flecha 12"/>
+          <p:cNvCxnSpPr/>
+          <p:nvPr/>
+        </p:nvCxnSpPr>
+        <p:spPr>
+          <a:xfrm flipV="1">
+            <a:off x="2550017" y="3181082"/>
+            <a:ext cx="4005329" cy="1532586"/>
+          </a:xfrm>
+          <a:prstGeom prst="straightConnector1">
+            <a:avLst/>
+          </a:prstGeom>
+          <a:ln>
+            <a:tailEnd type="triangle"/>
+          </a:ln>
+        </p:spPr>
+        <p:style>
+          <a:lnRef idx="1">
+            <a:schemeClr val="accent1"/>
+          </a:lnRef>
+          <a:fillRef idx="0">
+            <a:schemeClr val="accent1"/>
+          </a:fillRef>
+          <a:effectRef idx="0">
+            <a:schemeClr val="accent1"/>
+          </a:effectRef>
+          <a:fontRef idx="minor">
+            <a:schemeClr val="tx1"/>
+          </a:fontRef>
+        </p:style>
+      </p:cxnSp>
+      <p:cxnSp>
+        <p:nvCxnSpPr>
+          <p:cNvPr id="15" name="Conector recto de flecha 14"/>
+          <p:cNvCxnSpPr/>
+          <p:nvPr/>
+        </p:nvCxnSpPr>
+        <p:spPr>
+          <a:xfrm flipV="1">
+            <a:off x="3657600" y="4378279"/>
+            <a:ext cx="2421228" cy="824786"/>
+          </a:xfrm>
+          <a:prstGeom prst="straightConnector1">
+            <a:avLst/>
+          </a:prstGeom>
+          <a:ln>
+            <a:tailEnd type="triangle"/>
+          </a:ln>
+        </p:spPr>
+        <p:style>
+          <a:lnRef idx="1">
+            <a:schemeClr val="accent1"/>
+          </a:lnRef>
+          <a:fillRef idx="0">
+            <a:schemeClr val="accent1"/>
+          </a:fillRef>
+          <a:effectRef idx="0">
+            <a:schemeClr val="accent1"/>
+          </a:effectRef>
+          <a:fontRef idx="minor">
+            <a:schemeClr val="tx1"/>
+          </a:fontRef>
+        </p:style>
+      </p:cxnSp>
+      <p:cxnSp>
+        <p:nvCxnSpPr>
+          <p:cNvPr id="20" name="Conector recto de flecha 19"/>
+          <p:cNvCxnSpPr/>
+          <p:nvPr/>
+        </p:nvCxnSpPr>
+        <p:spPr>
+          <a:xfrm flipV="1">
+            <a:off x="3960253" y="5602310"/>
+            <a:ext cx="2324637" cy="12879"/>
+          </a:xfrm>
+          <a:prstGeom prst="straightConnector1">
+            <a:avLst/>
+          </a:prstGeom>
+          <a:ln>
+            <a:tailEnd type="triangle"/>
+          </a:ln>
+        </p:spPr>
+        <p:style>
+          <a:lnRef idx="1">
+            <a:schemeClr val="accent1"/>
+          </a:lnRef>
+          <a:fillRef idx="0">
+            <a:schemeClr val="accent1"/>
+          </a:fillRef>
+          <a:effectRef idx="0">
+            <a:schemeClr val="accent1"/>
+          </a:effectRef>
+          <a:fontRef idx="minor">
+            <a:schemeClr val="tx1"/>
+          </a:fontRef>
+        </p:style>
+      </p:cxnSp>
+      <p:sp>
+        <p:nvSpPr>
+          <p:cNvPr id="28" name="Forma libre 27"/>
+          <p:cNvSpPr/>
+          <p:nvPr/>
+        </p:nvSpPr>
+        <p:spPr>
+          <a:xfrm>
+            <a:off x="2846231" y="2418838"/>
+            <a:ext cx="7598535" cy="1831190"/>
+          </a:xfrm>
+          <a:custGeom>
+            <a:avLst/>
+            <a:gdLst>
+              <a:gd name="connsiteX0" fmla="*/ 0 w 7598535"/>
+              <a:gd name="connsiteY0" fmla="*/ 1831190 h 1831190"/>
+              <a:gd name="connsiteX1" fmla="*/ 3863662 w 7598535"/>
+              <a:gd name="connsiteY1" fmla="*/ 2390 h 1831190"/>
+              <a:gd name="connsiteX2" fmla="*/ 7598535 w 7598535"/>
+              <a:gd name="connsiteY2" fmla="*/ 1431945 h 1831190"/>
+            </a:gdLst>
+            <a:ahLst/>
+            <a:cxnLst>
+              <a:cxn ang="0">
+                <a:pos x="connsiteX0" y="connsiteY0"/>
+              </a:cxn>
+              <a:cxn ang="0">
+                <a:pos x="connsiteX1" y="connsiteY1"/>
+              </a:cxn>
+              <a:cxn ang="0">
+                <a:pos x="connsiteX2" y="connsiteY2"/>
+              </a:cxn>
+            </a:cxnLst>
+            <a:rect l="l" t="t" r="r" b="b"/>
+            <a:pathLst>
+              <a:path w="7598535" h="1831190">
+                <a:moveTo>
+                  <a:pt x="0" y="1831190"/>
+                </a:moveTo>
+                <a:cubicBezTo>
+                  <a:pt x="1298620" y="950060"/>
+                  <a:pt x="2597240" y="68931"/>
+                  <a:pt x="3863662" y="2390"/>
+                </a:cubicBezTo>
+                <a:cubicBezTo>
+                  <a:pt x="5130085" y="-64151"/>
+                  <a:pt x="7122017" y="1279545"/>
+                  <a:pt x="7598535" y="1431945"/>
+                </a:cubicBezTo>
+              </a:path>
+            </a:pathLst>
+          </a:custGeom>
+          <a:noFill/>
+        </p:spPr>
+        <p:style>
+          <a:lnRef idx="2">
+            <a:schemeClr val="accent1">
+              <a:shade val="50000"/>
+            </a:schemeClr>
+          </a:lnRef>
+          <a:fillRef idx="1">
+            <a:schemeClr val="accent1"/>
+          </a:fillRef>
+          <a:effectRef idx="0">
+            <a:schemeClr val="accent1"/>
+          </a:effectRef>
+          <a:fontRef idx="minor">
+            <a:schemeClr val="lt1"/>
+          </a:fontRef>
+        </p:style>
+        <p:txBody>
+          <a:bodyPr rtlCol="0" anchor="ctr"/>
+          <a:lstStyle/>
+          <a:p>
+            <a:pPr algn="ctr"/>
+            <a:endParaRPr lang="es-CO"/>
+          </a:p>
+        </p:txBody>
+      </p:sp>
+      <p:sp>
+        <p:nvSpPr>
+          <p:cNvPr id="29" name="CuadroTexto 28">
+            <a:extLst>
+              <a:ext uri="{FF2B5EF4-FFF2-40B4-BE49-F238E27FC236}">
+                <a16:creationId xmlns:a16="http://schemas.microsoft.com/office/drawing/2014/main" xmlns="" id="{BC049DBC-6933-4F01-99CD-12D18B825504}"/>
+              </a:ext>
+            </a:extLst>
+          </p:cNvPr>
+          <p:cNvSpPr txBox="1"/>
+          <p:nvPr/>
+        </p:nvSpPr>
+        <p:spPr>
+          <a:xfrm>
+            <a:off x="6527196" y="6182641"/>
+            <a:ext cx="4976042" cy="461665"/>
+          </a:xfrm>
+          <a:prstGeom prst="rect">
+            <a:avLst/>
+          </a:prstGeom>
+          <a:noFill/>
+        </p:spPr>
+        <p:txBody>
+          <a:bodyPr wrap="none" rtlCol="0">
+            <a:spAutoFit/>
+          </a:bodyPr>
+          <a:lstStyle/>
+          <a:p>
+            <a:pPr algn="just"/>
+            <a:r>
+              <a:rPr lang="es-MX" sz="2400" i="1" dirty="0">
+                <a:latin typeface="Times New Roman" panose="02020603050405020304" pitchFamily="18" charset="0"/>
+                <a:cs typeface="Times New Roman" panose="02020603050405020304" pitchFamily="18" charset="0"/>
+              </a:rPr>
+              <a:t>Ilustración 1: </a:t>
+            </a:r>
+            <a:r>
+              <a:rPr lang="es-MX" sz="2400" i="1" dirty="0" smtClean="0">
+                <a:latin typeface="Times New Roman" panose="02020603050405020304" pitchFamily="18" charset="0"/>
+                <a:cs typeface="Times New Roman" panose="02020603050405020304" pitchFamily="18" charset="0"/>
+              </a:rPr>
+              <a:t>Modelo Cliente-servidor</a:t>
+            </a:r>
+            <a:endParaRPr lang="es-MX" sz="2400" i="1" dirty="0">
+              <a:latin typeface="Times New Roman" panose="02020603050405020304" pitchFamily="18" charset="0"/>
+              <a:cs typeface="Times New Roman" panose="02020603050405020304" pitchFamily="18" charset="0"/>
+            </a:endParaRPr>
+          </a:p>
+        </p:txBody>
+      </p:sp>
+      <p:sp>
+        <p:nvSpPr>
+          <p:cNvPr id="30" name="Rectángulo 29"/>
+          <p:cNvSpPr/>
+          <p:nvPr/>
+        </p:nvSpPr>
+        <p:spPr>
+          <a:xfrm>
+            <a:off x="334851" y="1391385"/>
+            <a:ext cx="11156412" cy="954107"/>
+          </a:xfrm>
+          <a:prstGeom prst="rect">
+            <a:avLst/>
+          </a:prstGeom>
+        </p:spPr>
+        <p:txBody>
+          <a:bodyPr wrap="square">
+            <a:spAutoFit/>
+          </a:bodyPr>
+          <a:lstStyle/>
+          <a:p>
+            <a:r>
+              <a:rPr lang="es-CO" sz="2800" dirty="0"/>
+              <a:t>A través del proceso de </a:t>
+            </a:r>
+            <a:r>
+              <a:rPr lang="es-CO" sz="2800" b="1" dirty="0"/>
+              <a:t>caracterización estudiantil</a:t>
+            </a:r>
+            <a:r>
+              <a:rPr lang="es-CO" sz="2800" dirty="0"/>
+              <a:t>, se obtiene una gran cantidad de información </a:t>
+            </a:r>
+            <a:r>
+              <a:rPr lang="es-CO" sz="2800" dirty="0" smtClean="0"/>
+              <a:t>sobre los estudiantes.</a:t>
+            </a:r>
+            <a:endParaRPr lang="es-CO" sz="2800" dirty="0"/>
+          </a:p>
+        </p:txBody>
+      </p:sp>
     </p:spTree>
     <p:extLst>
       <p:ext uri="{BB962C8B-B14F-4D97-AF65-F5344CB8AC3E}">
@@ -5263,7 +5623,7 @@
           <p:cNvPr id="2" name="Título 1">
             <a:extLst>
               <a:ext uri="{FF2B5EF4-FFF2-40B4-BE49-F238E27FC236}">
-                <a16:creationId xmlns="" xmlns:a16="http://schemas.microsoft.com/office/drawing/2014/main" id="{4320CD7B-E404-4AFB-849D-09CBCEF81671}"/>
+                <a16:creationId xmlns:a16="http://schemas.microsoft.com/office/drawing/2014/main" xmlns="" id="{4320CD7B-E404-4AFB-849D-09CBCEF81671}"/>
               </a:ext>
             </a:extLst>
           </p:cNvPr>
@@ -5301,7 +5661,7 @@
           <p:cNvPr id="3" name="Marcador de contenido 2">
             <a:extLst>
               <a:ext uri="{FF2B5EF4-FFF2-40B4-BE49-F238E27FC236}">
-                <a16:creationId xmlns="" xmlns:a16="http://schemas.microsoft.com/office/drawing/2014/main" id="{F27ED2C7-5D3D-48D6-995C-A170B4F5C4EE}"/>
+                <a16:creationId xmlns:a16="http://schemas.microsoft.com/office/drawing/2014/main" xmlns="" id="{F27ED2C7-5D3D-48D6-995C-A170B4F5C4EE}"/>
               </a:ext>
             </a:extLst>
           </p:cNvPr>
@@ -5314,8 +5674,8 @@
         </p:nvSpPr>
         <p:spPr>
           <a:xfrm>
-            <a:off x="212035" y="1353532"/>
-            <a:ext cx="11742277" cy="4351338"/>
+            <a:off x="1242346" y="1532585"/>
+            <a:ext cx="10245610" cy="5148377"/>
           </a:xfrm>
         </p:spPr>
         <p:txBody>
@@ -5517,7 +5877,7 @@
           <p:cNvPr id="2" name="Título 1">
             <a:extLst>
               <a:ext uri="{FF2B5EF4-FFF2-40B4-BE49-F238E27FC236}">
-                <a16:creationId xmlns="" xmlns:a16="http://schemas.microsoft.com/office/drawing/2014/main" id="{F194AB6A-55E1-4B44-A983-8BC6AA65E29D}"/>
+                <a16:creationId xmlns:a16="http://schemas.microsoft.com/office/drawing/2014/main" xmlns="" id="{F194AB6A-55E1-4B44-A983-8BC6AA65E29D}"/>
               </a:ext>
             </a:extLst>
           </p:cNvPr>
@@ -5555,7 +5915,7 @@
           <p:cNvPr id="3" name="Marcador de contenido 2">
             <a:extLst>
               <a:ext uri="{FF2B5EF4-FFF2-40B4-BE49-F238E27FC236}">
-                <a16:creationId xmlns="" xmlns:a16="http://schemas.microsoft.com/office/drawing/2014/main" id="{B24358F4-4131-4E84-B740-F17730F29968}"/>
+                <a16:creationId xmlns:a16="http://schemas.microsoft.com/office/drawing/2014/main" xmlns="" id="{B24358F4-4131-4E84-B740-F17730F29968}"/>
               </a:ext>
             </a:extLst>
           </p:cNvPr>
@@ -5576,7 +5936,7 @@
           <a:bodyPr/>
           <a:lstStyle/>
           <a:p>
-            <a:pPr marL="0" indent="0" algn="just">
+            <a:pPr marL="0" indent="0" algn="ctr">
               <a:buNone/>
             </a:pPr>
             <a:r>
@@ -5663,7 +6023,7 @@
           <p:cNvPr id="2" name="Título 1">
             <a:extLst>
               <a:ext uri="{FF2B5EF4-FFF2-40B4-BE49-F238E27FC236}">
-                <a16:creationId xmlns="" xmlns:a16="http://schemas.microsoft.com/office/drawing/2014/main" id="{EA6489E5-FCF6-4E30-B2D3-75F086E8BE81}"/>
+                <a16:creationId xmlns:a16="http://schemas.microsoft.com/office/drawing/2014/main" xmlns="" id="{EA6489E5-FCF6-4E30-B2D3-75F086E8BE81}"/>
               </a:ext>
             </a:extLst>
           </p:cNvPr>
@@ -5701,7 +6061,7 @@
           <p:cNvPr id="3" name="Marcador de contenido 2">
             <a:extLst>
               <a:ext uri="{FF2B5EF4-FFF2-40B4-BE49-F238E27FC236}">
-                <a16:creationId xmlns="" xmlns:a16="http://schemas.microsoft.com/office/drawing/2014/main" id="{E0439019-967A-48CB-99F3-103D64E7D9BA}"/>
+                <a16:creationId xmlns:a16="http://schemas.microsoft.com/office/drawing/2014/main" xmlns="" id="{E0439019-967A-48CB-99F3-103D64E7D9BA}"/>
               </a:ext>
             </a:extLst>
           </p:cNvPr>
@@ -5724,7 +6084,7 @@
           </a:bodyPr>
           <a:lstStyle/>
           <a:p>
-            <a:pPr marL="0" indent="0" algn="just">
+            <a:pPr marL="0" indent="0" algn="ctr">
               <a:lnSpc>
                 <a:spcPct val="100000"/>
               </a:lnSpc>
@@ -5874,7 +6234,7 @@
           <p:cNvPr id="2" name="Título 1">
             <a:extLst>
               <a:ext uri="{FF2B5EF4-FFF2-40B4-BE49-F238E27FC236}">
-                <a16:creationId xmlns="" xmlns:a16="http://schemas.microsoft.com/office/drawing/2014/main" id="{07AE7516-1AE4-45BE-98BE-4B95F4DA1742}"/>
+                <a16:creationId xmlns:a16="http://schemas.microsoft.com/office/drawing/2014/main" xmlns="" id="{07AE7516-1AE4-45BE-98BE-4B95F4DA1742}"/>
               </a:ext>
             </a:extLst>
           </p:cNvPr>
@@ -5912,7 +6272,7 @@
           <p:cNvPr id="3" name="Marcador de contenido 2">
             <a:extLst>
               <a:ext uri="{FF2B5EF4-FFF2-40B4-BE49-F238E27FC236}">
-                <a16:creationId xmlns="" xmlns:a16="http://schemas.microsoft.com/office/drawing/2014/main" id="{607AE930-5E81-4976-884A-E79FEB8EAB31}"/>
+                <a16:creationId xmlns:a16="http://schemas.microsoft.com/office/drawing/2014/main" xmlns="" id="{607AE930-5E81-4976-884A-E79FEB8EAB31}"/>
               </a:ext>
             </a:extLst>
           </p:cNvPr>
@@ -5925,15 +6285,15 @@
         </p:nvSpPr>
         <p:spPr>
           <a:xfrm>
-            <a:off x="2386326" y="1957589"/>
-            <a:ext cx="7028132" cy="4520484"/>
+            <a:off x="2112135" y="1957589"/>
+            <a:ext cx="7302323" cy="4520484"/>
           </a:xfrm>
         </p:spPr>
         <p:txBody>
           <a:bodyPr/>
           <a:lstStyle/>
           <a:p>
-            <a:pPr marL="0" indent="0" algn="just">
+            <a:pPr marL="0" indent="0" algn="ctr">
               <a:lnSpc>
                 <a:spcPct val="100000"/>
               </a:lnSpc>
@@ -5943,8 +6303,12 @@
               <a:buNone/>
             </a:pPr>
             <a:r>
+              <a:rPr lang="es-MX" b="1" dirty="0"/>
+              <a:t>¿</a:t>
+            </a:r>
+            <a:r>
               <a:rPr lang="es-MX" b="1" dirty="0" smtClean="0"/>
-              <a:t>Algunas razones:</a:t>
+              <a:t>Para qué desarrollar esta solución informática?</a:t>
             </a:r>
           </a:p>
           <a:p>
@@ -6045,15 +6409,7 @@
             </a:pPr>
             <a:r>
               <a:rPr lang="es-MX" dirty="0" smtClean="0"/>
-              <a:t>Dar </a:t>
-            </a:r>
-            <a:r>
-              <a:rPr lang="es-MX" dirty="0" smtClean="0"/>
-              <a:t>cumplimiento</a:t>
-            </a:r>
-            <a:r>
-              <a:rPr lang="es-MX" dirty="0" smtClean="0"/>
-              <a:t> a la legislación</a:t>
+              <a:t>Dar cumplimiento a la legislación</a:t>
             </a:r>
             <a:endParaRPr lang="es-MX" dirty="0"/>
           </a:p>
@@ -6101,7 +6457,7 @@
           <p:cNvPr id="2" name="Título 1">
             <a:extLst>
               <a:ext uri="{FF2B5EF4-FFF2-40B4-BE49-F238E27FC236}">
-                <a16:creationId xmlns="" xmlns:a16="http://schemas.microsoft.com/office/drawing/2014/main" id="{4D3AF533-AD0F-43F7-AC8D-8A056BA291A3}"/>
+                <a16:creationId xmlns:a16="http://schemas.microsoft.com/office/drawing/2014/main" xmlns="" id="{4D3AF533-AD0F-43F7-AC8D-8A056BA291A3}"/>
               </a:ext>
             </a:extLst>
           </p:cNvPr>
@@ -6139,7 +6495,7 @@
           <p:cNvPr id="3" name="Marcador de contenido 2">
             <a:extLst>
               <a:ext uri="{FF2B5EF4-FFF2-40B4-BE49-F238E27FC236}">
-                <a16:creationId xmlns="" xmlns:a16="http://schemas.microsoft.com/office/drawing/2014/main" id="{9044A195-81E2-4535-8AF2-A32F3CBDD8E6}"/>
+                <a16:creationId xmlns:a16="http://schemas.microsoft.com/office/drawing/2014/main" xmlns="" id="{9044A195-81E2-4535-8AF2-A32F3CBDD8E6}"/>
               </a:ext>
             </a:extLst>
           </p:cNvPr>
@@ -6152,15 +6508,15 @@
         </p:nvSpPr>
         <p:spPr>
           <a:xfrm>
-            <a:off x="184406" y="2336800"/>
-            <a:ext cx="5423266" cy="3709527"/>
+            <a:off x="184406" y="2240929"/>
+            <a:ext cx="6152000" cy="4256164"/>
           </a:xfrm>
         </p:spPr>
         <p:txBody>
           <a:bodyPr/>
           <a:lstStyle/>
           <a:p>
-            <a:pPr marL="0" indent="0" algn="just">
+            <a:pPr marL="0" indent="0" algn="ctr">
               <a:buNone/>
             </a:pPr>
             <a:r>
@@ -6188,15 +6544,42 @@
             </a:r>
             <a:r>
               <a:rPr lang="es-MX" dirty="0" smtClean="0"/>
-              <a:t>SCRUM porque es un enfoque ágil que permite un ritmo de trabajo sostenible</a:t>
-            </a:r>
-            <a:endParaRPr lang="es-MX" dirty="0"/>
+              <a:t>SCRUM por 4 razones:</a:t>
+            </a:r>
+          </a:p>
+          <a:p>
+            <a:pPr algn="just"/>
+            <a:r>
+              <a:rPr lang="es-MX" dirty="0" smtClean="0"/>
+              <a:t>Ser un enfoque ágil.</a:t>
+            </a:r>
+          </a:p>
+          <a:p>
+            <a:pPr algn="just"/>
+            <a:r>
+              <a:rPr lang="es-MX" dirty="0" smtClean="0"/>
+              <a:t>Permitir un ritmo de trabajo sostenible.</a:t>
+            </a:r>
+          </a:p>
+          <a:p>
+            <a:pPr algn="just"/>
+            <a:r>
+              <a:rPr lang="es-MX" dirty="0" smtClean="0"/>
+              <a:t>Minimizar los riesgos.</a:t>
+            </a:r>
+          </a:p>
+          <a:p>
+            <a:pPr algn="just"/>
+            <a:r>
+              <a:rPr lang="es-MX" dirty="0" smtClean="0"/>
+              <a:t>KANBAN</a:t>
+            </a:r>
           </a:p>
         </p:txBody>
       </p:sp>
       <p:pic>
         <p:nvPicPr>
-          <p:cNvPr id="5" name="Imagen 4"/>
+          <p:cNvPr id="6" name="Imagen 5"/>
           <p:cNvPicPr>
             <a:picLocks noChangeAspect="1"/>
           </p:cNvPicPr>
@@ -6216,14 +6599,64 @@
         </p:blipFill>
         <p:spPr>
           <a:xfrm>
-            <a:off x="6104586" y="1970066"/>
-            <a:ext cx="5755246" cy="4316434"/>
+            <a:off x="6387922" y="1990622"/>
+            <a:ext cx="5594830" cy="4204115"/>
           </a:xfrm>
           <a:prstGeom prst="rect">
             <a:avLst/>
           </a:prstGeom>
         </p:spPr>
       </p:pic>
+      <p:sp>
+        <p:nvSpPr>
+          <p:cNvPr id="7" name="CuadroTexto 6">
+            <a:extLst>
+              <a:ext uri="{FF2B5EF4-FFF2-40B4-BE49-F238E27FC236}">
+                <a16:creationId xmlns:a16="http://schemas.microsoft.com/office/drawing/2014/main" xmlns="" id="{BC049DBC-6933-4F01-99CD-12D18B825504}"/>
+              </a:ext>
+            </a:extLst>
+          </p:cNvPr>
+          <p:cNvSpPr txBox="1"/>
+          <p:nvPr/>
+        </p:nvSpPr>
+        <p:spPr>
+          <a:xfrm>
+            <a:off x="6903104" y="6182641"/>
+            <a:ext cx="4224233" cy="461665"/>
+          </a:xfrm>
+          <a:prstGeom prst="rect">
+            <a:avLst/>
+          </a:prstGeom>
+          <a:noFill/>
+        </p:spPr>
+        <p:txBody>
+          <a:bodyPr wrap="none" rtlCol="0">
+            <a:spAutoFit/>
+          </a:bodyPr>
+          <a:lstStyle/>
+          <a:p>
+            <a:pPr algn="just"/>
+            <a:r>
+              <a:rPr lang="es-MX" sz="2400" i="1" dirty="0">
+                <a:latin typeface="Times New Roman" panose="02020603050405020304" pitchFamily="18" charset="0"/>
+                <a:cs typeface="Times New Roman" panose="02020603050405020304" pitchFamily="18" charset="0"/>
+              </a:rPr>
+              <a:t>Ilustración </a:t>
+            </a:r>
+            <a:r>
+              <a:rPr lang="es-MX" sz="2400" i="1" dirty="0" smtClean="0">
+                <a:latin typeface="Times New Roman" panose="02020603050405020304" pitchFamily="18" charset="0"/>
+                <a:cs typeface="Times New Roman" panose="02020603050405020304" pitchFamily="18" charset="0"/>
+              </a:rPr>
+              <a:t>2: Ejemplo KANBAN</a:t>
+            </a:r>
+            <a:endParaRPr lang="es-MX" sz="2400" i="1" dirty="0">
+              <a:latin typeface="Times New Roman" panose="02020603050405020304" pitchFamily="18" charset="0"/>
+              <a:cs typeface="Times New Roman" panose="02020603050405020304" pitchFamily="18" charset="0"/>
+            </a:endParaRPr>
+          </a:p>
+        </p:txBody>
+      </p:sp>
     </p:spTree>
     <p:extLst>
       <p:ext uri="{BB962C8B-B14F-4D97-AF65-F5344CB8AC3E}">
@@ -6266,7 +6699,7 @@
           <p:cNvPr id="2" name="Título 1">
             <a:extLst>
               <a:ext uri="{FF2B5EF4-FFF2-40B4-BE49-F238E27FC236}">
-                <a16:creationId xmlns="" xmlns:a16="http://schemas.microsoft.com/office/drawing/2014/main" id="{43471DF1-E266-45C9-99D0-121F6BFCD9D4}"/>
+                <a16:creationId xmlns:a16="http://schemas.microsoft.com/office/drawing/2014/main" xmlns="" id="{43471DF1-E266-45C9-99D0-121F6BFCD9D4}"/>
               </a:ext>
             </a:extLst>
           </p:cNvPr>
@@ -6304,7 +6737,7 @@
           <p:cNvPr id="14" name="CuadroTexto 13">
             <a:extLst>
               <a:ext uri="{FF2B5EF4-FFF2-40B4-BE49-F238E27FC236}">
-                <a16:creationId xmlns="" xmlns:a16="http://schemas.microsoft.com/office/drawing/2014/main" id="{46EA4DCA-5CF5-445C-A682-F68F57AE84CF}"/>
+                <a16:creationId xmlns:a16="http://schemas.microsoft.com/office/drawing/2014/main" xmlns="" id="{46EA4DCA-5CF5-445C-A682-F68F57AE84CF}"/>
               </a:ext>
             </a:extLst>
           </p:cNvPr>
@@ -6327,7 +6760,7 @@
           </a:bodyPr>
           <a:lstStyle/>
           <a:p>
-            <a:pPr algn="just"/>
+            <a:pPr algn="ctr"/>
             <a:r>
               <a:rPr lang="es-MX" sz="2800" b="1" dirty="0" smtClean="0"/>
               <a:t>Etapa </a:t>
@@ -6372,14 +6805,14 @@
             <p:ph idx="1"/>
             <p:extLst>
               <p:ext uri="{D42A27DB-BD31-4B8C-83A1-F6EECF244321}">
-                <p14:modId xmlns:p14="http://schemas.microsoft.com/office/powerpoint/2010/main" val="3508260515"/>
+                <p14:modId xmlns:p14="http://schemas.microsoft.com/office/powerpoint/2010/main" val="4111857973"/>
               </p:ext>
             </p:extLst>
           </p:nvPr>
         </p:nvGraphicFramePr>
         <p:xfrm>
-          <a:off x="5281424" y="1444194"/>
-          <a:ext cx="6800235" cy="5188424"/>
+          <a:off x="5720296" y="1444194"/>
+          <a:ext cx="6361363" cy="4853574"/>
         </p:xfrm>
         <a:graphic>
           <a:graphicData uri="http://schemas.openxmlformats.org/drawingml/2006/table">
@@ -6388,11 +6821,11 @@
                 <a:tableStyleId>{5C22544A-7EE6-4342-B048-85BDC9FD1C3A}</a:tableStyleId>
               </a:tblPr>
               <a:tblGrid>
-                <a:gridCol w="2240936"/>
-                <a:gridCol w="284823"/>
-                <a:gridCol w="4274476"/>
+                <a:gridCol w="2096311"/>
+                <a:gridCol w="266441"/>
+                <a:gridCol w="3998611"/>
               </a:tblGrid>
-              <a:tr h="442914">
+              <a:tr h="414329">
                 <a:tc gridSpan="3">
                   <a:txBody>
                     <a:bodyPr/>
@@ -6404,12 +6837,12 @@
                         </a:spcAft>
                       </a:pPr>
                       <a:r>
-                        <a:rPr lang="es-CO" sz="1500" b="1" kern="50" dirty="0">
+                        <a:rPr lang="es-CO" sz="1400" b="1" kern="50" dirty="0">
                           <a:effectLst/>
                         </a:rPr>
                         <a:t>Historia de Usuario 1</a:t>
                       </a:r>
-                      <a:endParaRPr lang="es-CO" sz="1500" b="1" kern="50" dirty="0">
+                      <a:endParaRPr lang="es-CO" sz="1400" b="1" kern="50" dirty="0">
                         <a:effectLst/>
                         <a:latin typeface="Times New Roman" panose="02020603050405020304" pitchFamily="18" charset="0"/>
                         <a:ea typeface="Droid Sans Fallback"/>
@@ -6417,7 +6850,7 @@
                       </a:endParaRPr>
                     </a:p>
                   </a:txBody>
-                  <a:tcPr marL="94910" marR="94910" marT="94910" marB="94910" anchor="ctr"/>
+                  <a:tcPr marL="88785" marR="88785" marT="88785" marB="88785" anchor="ctr"/>
                 </a:tc>
                 <a:tc hMerge="1">
                   <a:txBody>
@@ -6440,7 +6873,7 @@
                   <a:tcPr/>
                 </a:tc>
               </a:tr>
-              <a:tr h="442914">
+              <a:tr h="414329">
                 <a:tc>
                   <a:txBody>
                     <a:bodyPr/>
@@ -6452,18 +6885,18 @@
                         </a:spcAft>
                       </a:pPr>
                       <a:r>
-                        <a:rPr lang="es-CO" sz="1500" b="1" kern="50" dirty="0">
+                        <a:rPr lang="es-CO" sz="1400" b="1" kern="50" dirty="0">
                           <a:effectLst/>
                         </a:rPr>
                         <a:t>Número:</a:t>
                       </a:r>
                       <a:r>
-                        <a:rPr lang="es-CO" sz="1500" kern="50" dirty="0">
+                        <a:rPr lang="es-CO" sz="1400" kern="50" dirty="0">
                           <a:effectLst/>
                         </a:rPr>
                         <a:t> 1</a:t>
                       </a:r>
-                      <a:endParaRPr lang="es-CO" sz="1500" kern="50" dirty="0">
+                      <a:endParaRPr lang="es-CO" sz="1400" kern="50" dirty="0">
                         <a:effectLst/>
                         <a:latin typeface="Times New Roman" panose="02020603050405020304" pitchFamily="18" charset="0"/>
                         <a:ea typeface="Droid Sans Fallback"/>
@@ -6471,7 +6904,7 @@
                       </a:endParaRPr>
                     </a:p>
                   </a:txBody>
-                  <a:tcPr marL="94910" marR="94910" marT="94910" marB="94910" anchor="ctr"/>
+                  <a:tcPr marL="88785" marR="88785" marT="88785" marB="88785" anchor="ctr"/>
                 </a:tc>
                 <a:tc gridSpan="2">
                   <a:txBody>
@@ -6484,12 +6917,12 @@
                         </a:spcAft>
                       </a:pPr>
                       <a:r>
-                        <a:rPr lang="es-CO" sz="1500" kern="50">
+                        <a:rPr lang="es-CO" sz="1400" kern="50">
                           <a:effectLst/>
                         </a:rPr>
                         <a:t>Usuario: Administrador</a:t>
                       </a:r>
-                      <a:endParaRPr lang="es-CO" sz="1500" kern="50">
+                      <a:endParaRPr lang="es-CO" sz="1400" kern="50">
                         <a:effectLst/>
                         <a:latin typeface="Times New Roman" panose="02020603050405020304" pitchFamily="18" charset="0"/>
                         <a:ea typeface="Droid Sans Fallback"/>
@@ -6497,7 +6930,7 @@
                       </a:endParaRPr>
                     </a:p>
                   </a:txBody>
-                  <a:tcPr marL="94910" marR="94910" marT="94910" marB="94910" anchor="ctr"/>
+                  <a:tcPr marL="88785" marR="88785" marT="88785" marB="88785" anchor="ctr"/>
                 </a:tc>
                 <a:tc hMerge="1">
                   <a:txBody>
@@ -6510,7 +6943,7 @@
                   <a:tcPr/>
                 </a:tc>
               </a:tr>
-              <a:tr h="653826">
+              <a:tr h="611630">
                 <a:tc gridSpan="3">
                   <a:txBody>
                     <a:bodyPr/>
@@ -6522,18 +6955,18 @@
                         </a:spcAft>
                       </a:pPr>
                       <a:r>
-                        <a:rPr lang="es-CO" sz="1500" b="1" kern="50" dirty="0">
+                        <a:rPr lang="es-CO" sz="1400" b="1" kern="50" dirty="0">
                           <a:effectLst/>
                         </a:rPr>
                         <a:t>Nombre historia</a:t>
                       </a:r>
                       <a:r>
-                        <a:rPr lang="es-CO" sz="1500" kern="50" dirty="0">
+                        <a:rPr lang="es-CO" sz="1400" kern="50" dirty="0">
                           <a:effectLst/>
                         </a:rPr>
                         <a:t>: Inicio de sesión al sistema administrativo de caracterización estudiantil</a:t>
                       </a:r>
-                      <a:endParaRPr lang="es-CO" sz="1500" kern="50" dirty="0">
+                      <a:endParaRPr lang="es-CO" sz="1400" kern="50" dirty="0">
                         <a:effectLst/>
                         <a:latin typeface="Times New Roman" panose="02020603050405020304" pitchFamily="18" charset="0"/>
                         <a:ea typeface="Droid Sans Fallback"/>
@@ -6541,7 +6974,7 @@
                       </a:endParaRPr>
                     </a:p>
                   </a:txBody>
-                  <a:tcPr marL="94910" marR="94910" marT="94910" marB="94910" anchor="ctr"/>
+                  <a:tcPr marL="88785" marR="88785" marT="88785" marB="88785" anchor="ctr"/>
                 </a:tc>
                 <a:tc hMerge="1">
                   <a:txBody>
@@ -6564,7 +6997,7 @@
                   <a:tcPr/>
                 </a:tc>
               </a:tr>
-              <a:tr h="421823">
+              <a:tr h="394599">
                 <a:tc gridSpan="2">
                   <a:txBody>
                     <a:bodyPr/>
@@ -6576,18 +7009,18 @@
                         </a:spcAft>
                       </a:pPr>
                       <a:r>
-                        <a:rPr lang="es-CO" sz="1500" b="1" kern="50" dirty="0">
+                        <a:rPr lang="es-CO" sz="1400" b="1" kern="50" dirty="0">
                           <a:effectLst/>
                         </a:rPr>
                         <a:t>Prioridad</a:t>
                       </a:r>
                       <a:r>
-                        <a:rPr lang="es-CO" sz="1500" kern="50" dirty="0">
+                        <a:rPr lang="es-CO" sz="1400" kern="50" dirty="0">
                           <a:effectLst/>
                         </a:rPr>
                         <a:t>:  Alta </a:t>
                       </a:r>
-                      <a:endParaRPr lang="es-CO" sz="1500" kern="50" dirty="0">
+                      <a:endParaRPr lang="es-CO" sz="1400" kern="50" dirty="0">
                         <a:effectLst/>
                         <a:latin typeface="Times New Roman" panose="02020603050405020304" pitchFamily="18" charset="0"/>
                         <a:ea typeface="Droid Sans Fallback"/>
@@ -6595,7 +7028,7 @@
                       </a:endParaRPr>
                     </a:p>
                   </a:txBody>
-                  <a:tcPr marL="94910" marR="94910" marT="94910" marB="94910" anchor="ctr"/>
+                  <a:tcPr marL="88785" marR="88785" marT="88785" marB="88785" anchor="ctr"/>
                 </a:tc>
                 <a:tc hMerge="1">
                   <a:txBody>
@@ -6618,18 +7051,18 @@
                         </a:spcAft>
                       </a:pPr>
                       <a:r>
-                        <a:rPr lang="es-CO" sz="1500" b="1" kern="50" dirty="0">
+                        <a:rPr lang="es-CO" sz="1400" b="1" kern="50" dirty="0">
                           <a:effectLst/>
                         </a:rPr>
                         <a:t>Riesgo en desarrollo</a:t>
                       </a:r>
                       <a:r>
-                        <a:rPr lang="es-CO" sz="1500" kern="50" dirty="0">
+                        <a:rPr lang="es-CO" sz="1400" kern="50" dirty="0">
                           <a:effectLst/>
                         </a:rPr>
                         <a:t>: Alta</a:t>
                       </a:r>
-                      <a:endParaRPr lang="es-CO" sz="1500" kern="50" dirty="0">
+                      <a:endParaRPr lang="es-CO" sz="1400" kern="50" dirty="0">
                         <a:effectLst/>
                         <a:latin typeface="Times New Roman" panose="02020603050405020304" pitchFamily="18" charset="0"/>
                         <a:ea typeface="Droid Sans Fallback"/>
@@ -6637,10 +7070,10 @@
                       </a:endParaRPr>
                     </a:p>
                   </a:txBody>
-                  <a:tcPr marL="94910" marR="94910" marT="94910" marB="94910" anchor="ctr"/>
+                  <a:tcPr marL="88785" marR="88785" marT="88785" marB="88785" anchor="ctr"/>
                 </a:tc>
               </a:tr>
-              <a:tr h="442914">
+              <a:tr h="414329">
                 <a:tc gridSpan="2">
                   <a:txBody>
                     <a:bodyPr/>
@@ -6652,18 +7085,18 @@
                         </a:spcAft>
                       </a:pPr>
                       <a:r>
-                        <a:rPr lang="es-CO" sz="1500" b="1" kern="50" dirty="0">
+                        <a:rPr lang="es-CO" sz="1400" b="1" kern="50" dirty="0">
                           <a:effectLst/>
                         </a:rPr>
                         <a:t>Puntos estimados</a:t>
                       </a:r>
                       <a:r>
-                        <a:rPr lang="es-CO" sz="1500" kern="50" dirty="0">
+                        <a:rPr lang="es-CO" sz="1400" kern="50" dirty="0">
                           <a:effectLst/>
                         </a:rPr>
                         <a:t>: 12</a:t>
                       </a:r>
-                      <a:endParaRPr lang="es-CO" sz="1500" kern="50" dirty="0">
+                      <a:endParaRPr lang="es-CO" sz="1400" kern="50" dirty="0">
                         <a:effectLst/>
                         <a:latin typeface="Times New Roman" panose="02020603050405020304" pitchFamily="18" charset="0"/>
                         <a:ea typeface="Droid Sans Fallback"/>
@@ -6671,7 +7104,7 @@
                       </a:endParaRPr>
                     </a:p>
                   </a:txBody>
-                  <a:tcPr marL="94910" marR="94910" marT="94910" marB="94910" anchor="ctr"/>
+                  <a:tcPr marL="88785" marR="88785" marT="88785" marB="88785" anchor="ctr"/>
                 </a:tc>
                 <a:tc hMerge="1">
                   <a:txBody>
@@ -6694,18 +7127,18 @@
                         </a:spcAft>
                       </a:pPr>
                       <a:r>
-                        <a:rPr lang="es-CO" sz="1500" b="1" kern="50" dirty="0">
+                        <a:rPr lang="es-CO" sz="1400" b="1" kern="50" dirty="0">
                           <a:effectLst/>
                         </a:rPr>
                         <a:t>Fase de asignación</a:t>
                       </a:r>
                       <a:r>
-                        <a:rPr lang="es-CO" sz="1500" kern="50" dirty="0">
+                        <a:rPr lang="es-CO" sz="1400" kern="50" dirty="0">
                           <a:effectLst/>
                         </a:rPr>
                         <a:t>: 3</a:t>
                       </a:r>
-                      <a:endParaRPr lang="es-CO" sz="1500" kern="50" dirty="0">
+                      <a:endParaRPr lang="es-CO" sz="1400" kern="50" dirty="0">
                         <a:effectLst/>
                         <a:latin typeface="Times New Roman" panose="02020603050405020304" pitchFamily="18" charset="0"/>
                         <a:ea typeface="Droid Sans Fallback"/>
@@ -6713,10 +7146,10 @@
                       </a:endParaRPr>
                     </a:p>
                   </a:txBody>
-                  <a:tcPr marL="94910" marR="94910" marT="94910" marB="94910" anchor="ctr"/>
+                  <a:tcPr marL="88785" marR="88785" marT="88785" marB="88785" anchor="ctr"/>
                 </a:tc>
               </a:tr>
-              <a:tr h="421823">
+              <a:tr h="394599">
                 <a:tc gridSpan="3">
                   <a:txBody>
                     <a:bodyPr/>
@@ -6728,18 +7161,18 @@
                         </a:spcAft>
                       </a:pPr>
                       <a:r>
-                        <a:rPr lang="es-CO" sz="1500" b="1" kern="50" dirty="0">
+                        <a:rPr lang="es-CO" sz="1400" b="1" kern="50" dirty="0">
                           <a:effectLst/>
                         </a:rPr>
                         <a:t>Programador responsable</a:t>
                       </a:r>
                       <a:r>
-                        <a:rPr lang="es-CO" sz="1500" kern="50" dirty="0">
+                        <a:rPr lang="es-CO" sz="1400" kern="50" dirty="0">
                           <a:effectLst/>
                         </a:rPr>
                         <a:t>: Brayan Mauricio Novoa Salazar</a:t>
                       </a:r>
-                      <a:endParaRPr lang="es-CO" sz="1500" kern="50" dirty="0">
+                      <a:endParaRPr lang="es-CO" sz="1400" kern="50" dirty="0">
                         <a:effectLst/>
                         <a:latin typeface="Times New Roman" panose="02020603050405020304" pitchFamily="18" charset="0"/>
                         <a:ea typeface="Droid Sans Fallback"/>
@@ -6747,7 +7180,7 @@
                       </a:endParaRPr>
                     </a:p>
                   </a:txBody>
-                  <a:tcPr marL="94910" marR="94910" marT="94910" marB="94910" anchor="ctr"/>
+                  <a:tcPr marL="88785" marR="88785" marT="88785" marB="88785" anchor="ctr"/>
                 </a:tc>
                 <a:tc hMerge="1">
                   <a:txBody>
@@ -6770,7 +7203,7 @@
                   <a:tcPr/>
                 </a:tc>
               </a:tr>
-              <a:tr h="653826">
+              <a:tr h="611630">
                 <a:tc gridSpan="3">
                   <a:txBody>
                     <a:bodyPr/>
@@ -6782,18 +7215,18 @@
                         </a:spcAft>
                       </a:pPr>
                       <a:r>
-                        <a:rPr lang="es-CO" sz="1500" b="1" kern="50" dirty="0">
+                        <a:rPr lang="es-CO" sz="1400" b="1" kern="50" dirty="0">
                           <a:effectLst/>
                         </a:rPr>
                         <a:t>Descripción</a:t>
                       </a:r>
                       <a:r>
-                        <a:rPr lang="es-CO" sz="1500" kern="50" dirty="0">
+                        <a:rPr lang="es-CO" sz="1400" kern="50" dirty="0">
                           <a:effectLst/>
                         </a:rPr>
                         <a:t>: El usuario, podrá iniciar al sistema administrativo de caracterización estudiantil usando sus credenciales de acceso.</a:t>
                       </a:r>
-                      <a:endParaRPr lang="es-CO" sz="1500" kern="50" dirty="0">
+                      <a:endParaRPr lang="es-CO" sz="1400" kern="50" dirty="0">
                         <a:effectLst/>
                         <a:latin typeface="Times New Roman" panose="02020603050405020304" pitchFamily="18" charset="0"/>
                         <a:ea typeface="Droid Sans Fallback"/>
@@ -6801,7 +7234,7 @@
                       </a:endParaRPr>
                     </a:p>
                   </a:txBody>
-                  <a:tcPr marL="94910" marR="94910" marT="94910" marB="94910" anchor="ctr"/>
+                  <a:tcPr marL="88785" marR="88785" marT="88785" marB="88785" anchor="ctr"/>
                 </a:tc>
                 <a:tc hMerge="1">
                   <a:txBody>
@@ -6824,7 +7257,7 @@
                   <a:tcPr/>
                 </a:tc>
               </a:tr>
-              <a:tr h="1708384">
+              <a:tr h="1598129">
                 <a:tc gridSpan="3">
                   <a:txBody>
                     <a:bodyPr/>
@@ -6836,13 +7269,13 @@
                         </a:spcAft>
                       </a:pPr>
                       <a:r>
-                        <a:rPr lang="es-CO" sz="1500" b="1" kern="50" dirty="0">
+                        <a:rPr lang="es-CO" sz="1400" b="1" kern="50" dirty="0">
                           <a:effectLst/>
                         </a:rPr>
                         <a:t>Entradas</a:t>
                       </a:r>
                       <a:r>
-                        <a:rPr lang="es-CO" sz="1500" kern="50" dirty="0">
+                        <a:rPr lang="es-CO" sz="1400" kern="50" dirty="0">
                           <a:effectLst/>
                         </a:rPr>
                         <a:t>: Universidad, Rectoría, Sede, Usuario y Contraseña.</a:t>
@@ -6855,7 +7288,7 @@
                         </a:spcAft>
                       </a:pPr>
                       <a:r>
-                        <a:rPr lang="es-CO" sz="1500" kern="50" dirty="0">
+                        <a:rPr lang="es-CO" sz="1400" kern="50" dirty="0">
                           <a:effectLst/>
                         </a:rPr>
                         <a:t> </a:t>
@@ -6868,13 +7301,13 @@
                         </a:spcAft>
                       </a:pPr>
                       <a:r>
-                        <a:rPr lang="es-CO" sz="1500" b="1" kern="50" dirty="0">
+                        <a:rPr lang="es-CO" sz="1400" b="1" kern="50" dirty="0">
                           <a:effectLst/>
                         </a:rPr>
                         <a:t>Salidas</a:t>
                       </a:r>
                       <a:r>
-                        <a:rPr lang="es-CO" sz="1500" kern="50" dirty="0">
+                        <a:rPr lang="es-CO" sz="1400" kern="50" dirty="0">
                           <a:effectLst/>
                         </a:rPr>
                         <a:t>: En caso de que los datos proporcionados por el usuario sean correctos, el sistema debe conceder el inicio de sesión.</a:t>
@@ -6887,12 +7320,12 @@
                         </a:spcAft>
                       </a:pPr>
                       <a:r>
-                        <a:rPr lang="es-CO" sz="1500" kern="50" dirty="0">
+                        <a:rPr lang="es-CO" sz="1400" kern="50" dirty="0">
                           <a:effectLst/>
                         </a:rPr>
                         <a:t>En caso contrario el sistema debe solicitar al usuario verificar sus credenciales de acceso.</a:t>
                       </a:r>
-                      <a:endParaRPr lang="es-CO" sz="1500" kern="50" dirty="0">
+                      <a:endParaRPr lang="es-CO" sz="1400" kern="50" dirty="0">
                         <a:effectLst/>
                         <a:latin typeface="Times New Roman" panose="02020603050405020304" pitchFamily="18" charset="0"/>
                         <a:ea typeface="Droid Sans Fallback"/>
@@ -6900,7 +7333,7 @@
                       </a:endParaRPr>
                     </a:p>
                   </a:txBody>
-                  <a:tcPr marL="94910" marR="94910" marT="94910" marB="94910" anchor="ctr"/>
+                  <a:tcPr marL="88785" marR="88785" marT="88785" marB="88785" anchor="ctr"/>
                 </a:tc>
                 <a:tc hMerge="1">
                   <a:txBody>
@@ -6927,6 +7360,63 @@
           </a:graphicData>
         </a:graphic>
       </p:graphicFrame>
+      <p:sp>
+        <p:nvSpPr>
+          <p:cNvPr id="6" name="CuadroTexto 5">
+            <a:extLst>
+              <a:ext uri="{FF2B5EF4-FFF2-40B4-BE49-F238E27FC236}">
+                <a16:creationId xmlns:a16="http://schemas.microsoft.com/office/drawing/2014/main" xmlns="" id="{BC049DBC-6933-4F01-99CD-12D18B825504}"/>
+              </a:ext>
+            </a:extLst>
+          </p:cNvPr>
+          <p:cNvSpPr txBox="1"/>
+          <p:nvPr/>
+        </p:nvSpPr>
+        <p:spPr>
+          <a:xfrm>
+            <a:off x="6158510" y="6272793"/>
+            <a:ext cx="5095241" cy="461665"/>
+          </a:xfrm>
+          <a:prstGeom prst="rect">
+            <a:avLst/>
+          </a:prstGeom>
+          <a:noFill/>
+        </p:spPr>
+        <p:txBody>
+          <a:bodyPr wrap="none" rtlCol="0">
+            <a:spAutoFit/>
+          </a:bodyPr>
+          <a:lstStyle/>
+          <a:p>
+            <a:pPr algn="just"/>
+            <a:r>
+              <a:rPr lang="es-MX" sz="2400" i="1" dirty="0" smtClean="0">
+                <a:latin typeface="Times New Roman" panose="02020603050405020304" pitchFamily="18" charset="0"/>
+                <a:cs typeface="Times New Roman" panose="02020603050405020304" pitchFamily="18" charset="0"/>
+              </a:rPr>
+              <a:t>Tabla </a:t>
+            </a:r>
+            <a:r>
+              <a:rPr lang="es-MX" sz="2400" i="1" dirty="0">
+                <a:latin typeface="Times New Roman" panose="02020603050405020304" pitchFamily="18" charset="0"/>
+                <a:cs typeface="Times New Roman" panose="02020603050405020304" pitchFamily="18" charset="0"/>
+              </a:rPr>
+              <a:t>1: </a:t>
+            </a:r>
+            <a:r>
+              <a:rPr lang="es-MX" sz="2400" i="1" dirty="0" smtClean="0">
+                <a:latin typeface="Times New Roman" panose="02020603050405020304" pitchFamily="18" charset="0"/>
+                <a:cs typeface="Times New Roman" panose="02020603050405020304" pitchFamily="18" charset="0"/>
+              </a:rPr>
+              <a:t>Ejemplo de historia de usuario</a:t>
+            </a:r>
+            <a:endParaRPr lang="es-MX" sz="2400" i="1" dirty="0">
+              <a:latin typeface="Times New Roman" panose="02020603050405020304" pitchFamily="18" charset="0"/>
+              <a:cs typeface="Times New Roman" panose="02020603050405020304" pitchFamily="18" charset="0"/>
+            </a:endParaRPr>
+          </a:p>
+        </p:txBody>
+      </p:sp>
     </p:spTree>
     <p:extLst>
       <p:ext uri="{BB962C8B-B14F-4D97-AF65-F5344CB8AC3E}">
@@ -6969,7 +7459,7 @@
           <p:cNvPr id="2" name="Título 1">
             <a:extLst>
               <a:ext uri="{FF2B5EF4-FFF2-40B4-BE49-F238E27FC236}">
-                <a16:creationId xmlns="" xmlns:a16="http://schemas.microsoft.com/office/drawing/2014/main" id="{DB8C63D6-C210-40D1-AC01-78DC49BB1182}"/>
+                <a16:creationId xmlns:a16="http://schemas.microsoft.com/office/drawing/2014/main" xmlns="" id="{DB8C63D6-C210-40D1-AC01-78DC49BB1182}"/>
               </a:ext>
             </a:extLst>
           </p:cNvPr>
@@ -7007,7 +7497,7 @@
           <p:cNvPr id="6" name="CuadroTexto 5">
             <a:extLst>
               <a:ext uri="{FF2B5EF4-FFF2-40B4-BE49-F238E27FC236}">
-                <a16:creationId xmlns="" xmlns:a16="http://schemas.microsoft.com/office/drawing/2014/main" id="{BC049DBC-6933-4F01-99CD-12D18B825504}"/>
+                <a16:creationId xmlns:a16="http://schemas.microsoft.com/office/drawing/2014/main" xmlns="" id="{BC049DBC-6933-4F01-99CD-12D18B825504}"/>
               </a:ext>
             </a:extLst>
           </p:cNvPr>
@@ -7016,8 +7506,8 @@
         </p:nvSpPr>
         <p:spPr>
           <a:xfrm>
-            <a:off x="164660" y="6334780"/>
-            <a:ext cx="5460854" cy="523220"/>
+            <a:off x="472790" y="6334780"/>
+            <a:ext cx="4844596" cy="461665"/>
           </a:xfrm>
           <a:prstGeom prst="rect">
             <a:avLst/>
@@ -7032,18 +7522,23 @@
           <a:p>
             <a:pPr algn="just"/>
             <a:r>
-              <a:rPr lang="es-MX" sz="2800" dirty="0"/>
-              <a:t>Ilustración 1: </a:t>
-            </a:r>
-            <a:r>
-              <a:rPr lang="es-MX" sz="2800" dirty="0"/>
-              <a:t>Diagrama casos de </a:t>
-            </a:r>
-            <a:r>
-              <a:rPr lang="es-MX" sz="2800" dirty="0" smtClean="0"/>
+              <a:rPr lang="es-MX" sz="2400" i="1" dirty="0">
+                <a:latin typeface="Times New Roman" panose="02020603050405020304" pitchFamily="18" charset="0"/>
+                <a:cs typeface="Times New Roman" panose="02020603050405020304" pitchFamily="18" charset="0"/>
+              </a:rPr>
+              <a:t>Ilustración 1: Diagrama casos de </a:t>
+            </a:r>
+            <a:r>
+              <a:rPr lang="es-MX" sz="2400" i="1" dirty="0" smtClean="0">
+                <a:latin typeface="Times New Roman" panose="02020603050405020304" pitchFamily="18" charset="0"/>
+                <a:cs typeface="Times New Roman" panose="02020603050405020304" pitchFamily="18" charset="0"/>
+              </a:rPr>
               <a:t>uso</a:t>
             </a:r>
-            <a:endParaRPr lang="es-MX" sz="2800" dirty="0"/>
+            <a:endParaRPr lang="es-MX" sz="2400" i="1" dirty="0">
+              <a:latin typeface="Times New Roman" panose="02020603050405020304" pitchFamily="18" charset="0"/>
+              <a:cs typeface="Times New Roman" panose="02020603050405020304" pitchFamily="18" charset="0"/>
+            </a:endParaRPr>
           </a:p>
         </p:txBody>
       </p:sp>
@@ -7106,7 +7601,7 @@
           <p:cNvPr id="8" name="CuadroTexto 7">
             <a:extLst>
               <a:ext uri="{FF2B5EF4-FFF2-40B4-BE49-F238E27FC236}">
-                <a16:creationId xmlns="" xmlns:a16="http://schemas.microsoft.com/office/drawing/2014/main" id="{46EA4DCA-5CF5-445C-A682-F68F57AE84CF}"/>
+                <a16:creationId xmlns:a16="http://schemas.microsoft.com/office/drawing/2014/main" xmlns="" id="{46EA4DCA-5CF5-445C-A682-F68F57AE84CF}"/>
               </a:ext>
             </a:extLst>
           </p:cNvPr>

</xml_diff>

<commit_message>
Actualización de las diapositivas
</commit_message>
<xml_diff>
--- a/expo/expo.pptx
+++ b/expo/expo.pptx
@@ -273,7 +273,7 @@
           <a:p>
             <a:fld id="{D6AEB8E7-BDB9-4384-837D-5E0AF3F2FB20}" type="datetimeFigureOut">
               <a:rPr lang="es-CO" smtClean="0"/>
-              <a:t>25/11/2018</a:t>
+              <a:t>26/11/2018</a:t>
             </a:fld>
             <a:endParaRPr lang="es-CO"/>
           </a:p>
@@ -443,7 +443,7 @@
           <a:p>
             <a:fld id="{D6AEB8E7-BDB9-4384-837D-5E0AF3F2FB20}" type="datetimeFigureOut">
               <a:rPr lang="es-CO" smtClean="0"/>
-              <a:t>25/11/2018</a:t>
+              <a:t>26/11/2018</a:t>
             </a:fld>
             <a:endParaRPr lang="es-CO"/>
           </a:p>
@@ -623,7 +623,7 @@
           <a:p>
             <a:fld id="{D6AEB8E7-BDB9-4384-837D-5E0AF3F2FB20}" type="datetimeFigureOut">
               <a:rPr lang="es-CO" smtClean="0"/>
-              <a:t>25/11/2018</a:t>
+              <a:t>26/11/2018</a:t>
             </a:fld>
             <a:endParaRPr lang="es-CO"/>
           </a:p>
@@ -793,7 +793,7 @@
           <a:p>
             <a:fld id="{D6AEB8E7-BDB9-4384-837D-5E0AF3F2FB20}" type="datetimeFigureOut">
               <a:rPr lang="es-CO" smtClean="0"/>
-              <a:t>25/11/2018</a:t>
+              <a:t>26/11/2018</a:t>
             </a:fld>
             <a:endParaRPr lang="es-CO"/>
           </a:p>
@@ -1039,7 +1039,7 @@
           <a:p>
             <a:fld id="{D6AEB8E7-BDB9-4384-837D-5E0AF3F2FB20}" type="datetimeFigureOut">
               <a:rPr lang="es-CO" smtClean="0"/>
-              <a:t>25/11/2018</a:t>
+              <a:t>26/11/2018</a:t>
             </a:fld>
             <a:endParaRPr lang="es-CO"/>
           </a:p>
@@ -1271,7 +1271,7 @@
           <a:p>
             <a:fld id="{D6AEB8E7-BDB9-4384-837D-5E0AF3F2FB20}" type="datetimeFigureOut">
               <a:rPr lang="es-CO" smtClean="0"/>
-              <a:t>25/11/2018</a:t>
+              <a:t>26/11/2018</a:t>
             </a:fld>
             <a:endParaRPr lang="es-CO"/>
           </a:p>
@@ -1638,7 +1638,7 @@
           <a:p>
             <a:fld id="{D6AEB8E7-BDB9-4384-837D-5E0AF3F2FB20}" type="datetimeFigureOut">
               <a:rPr lang="es-CO" smtClean="0"/>
-              <a:t>25/11/2018</a:t>
+              <a:t>26/11/2018</a:t>
             </a:fld>
             <a:endParaRPr lang="es-CO"/>
           </a:p>
@@ -1756,7 +1756,7 @@
           <a:p>
             <a:fld id="{D6AEB8E7-BDB9-4384-837D-5E0AF3F2FB20}" type="datetimeFigureOut">
               <a:rPr lang="es-CO" smtClean="0"/>
-              <a:t>25/11/2018</a:t>
+              <a:t>26/11/2018</a:t>
             </a:fld>
             <a:endParaRPr lang="es-CO"/>
           </a:p>
@@ -1851,7 +1851,7 @@
           <a:p>
             <a:fld id="{D6AEB8E7-BDB9-4384-837D-5E0AF3F2FB20}" type="datetimeFigureOut">
               <a:rPr lang="es-CO" smtClean="0"/>
-              <a:t>25/11/2018</a:t>
+              <a:t>26/11/2018</a:t>
             </a:fld>
             <a:endParaRPr lang="es-CO"/>
           </a:p>
@@ -2128,7 +2128,7 @@
           <a:p>
             <a:fld id="{D6AEB8E7-BDB9-4384-837D-5E0AF3F2FB20}" type="datetimeFigureOut">
               <a:rPr lang="es-CO" smtClean="0"/>
-              <a:t>25/11/2018</a:t>
+              <a:t>26/11/2018</a:t>
             </a:fld>
             <a:endParaRPr lang="es-CO"/>
           </a:p>
@@ -2381,7 +2381,7 @@
           <a:p>
             <a:fld id="{D6AEB8E7-BDB9-4384-837D-5E0AF3F2FB20}" type="datetimeFigureOut">
               <a:rPr lang="es-CO" smtClean="0"/>
-              <a:t>25/11/2018</a:t>
+              <a:t>26/11/2018</a:t>
             </a:fld>
             <a:endParaRPr lang="es-CO"/>
           </a:p>
@@ -2608,7 +2608,7 @@
           <a:p>
             <a:fld id="{D6AEB8E7-BDB9-4384-837D-5E0AF3F2FB20}" type="datetimeFigureOut">
               <a:rPr lang="es-CO" smtClean="0"/>
-              <a:t>25/11/2018</a:t>
+              <a:t>26/11/2018</a:t>
             </a:fld>
             <a:endParaRPr lang="es-CO"/>
           </a:p>
@@ -3286,11 +3286,7 @@
             </a:r>
             <a:r>
               <a:rPr lang="es-MX" sz="2400" b="1" dirty="0" smtClean="0"/>
-              <a:t>oftware </a:t>
-            </a:r>
-            <a:r>
-              <a:rPr lang="es-MX" sz="2400" b="1" dirty="0" smtClean="0"/>
-              <a:t>libre</a:t>
+              <a:t>oftware libre</a:t>
             </a:r>
             <a:endParaRPr lang="es-MX" b="1" dirty="0"/>
           </a:p>
@@ -4097,7 +4093,7 @@
           <p:cNvPr id="95" name="Título 1">
             <a:extLst>
               <a:ext uri="{FF2B5EF4-FFF2-40B4-BE49-F238E27FC236}">
-                <a16:creationId xmlns:a16="http://schemas.microsoft.com/office/drawing/2014/main" xmlns="" id="{C970F256-3488-4F4A-A764-07DD68032D5B}"/>
+                <a16:creationId xmlns="" xmlns:a16="http://schemas.microsoft.com/office/drawing/2014/main" id="{C970F256-3488-4F4A-A764-07DD68032D5B}"/>
               </a:ext>
             </a:extLst>
           </p:cNvPr>
@@ -4128,11 +4124,6 @@
               </a:rPr>
               <a:t>Referentes teóricos</a:t>
             </a:r>
-            <a:endParaRPr lang="es-MX" b="1" dirty="0">
-              <a:solidFill>
-                <a:schemeClr val="bg1"/>
-              </a:solidFill>
-            </a:endParaRPr>
           </a:p>
         </p:txBody>
       </p:sp>
@@ -4439,7 +4430,7 @@
           <p:cNvPr id="17" name="Título 1">
             <a:extLst>
               <a:ext uri="{FF2B5EF4-FFF2-40B4-BE49-F238E27FC236}">
-                <a16:creationId xmlns:a16="http://schemas.microsoft.com/office/drawing/2014/main" xmlns="" id="{C970F256-3488-4F4A-A764-07DD68032D5B}"/>
+                <a16:creationId xmlns="" xmlns:a16="http://schemas.microsoft.com/office/drawing/2014/main" id="{C970F256-3488-4F4A-A764-07DD68032D5B}"/>
               </a:ext>
             </a:extLst>
           </p:cNvPr>
@@ -4470,11 +4461,6 @@
               </a:rPr>
               <a:t>Referentes teóricos</a:t>
             </a:r>
-            <a:endParaRPr lang="es-MX" b="1" dirty="0">
-              <a:solidFill>
-                <a:schemeClr val="bg1"/>
-              </a:solidFill>
-            </a:endParaRPr>
           </a:p>
         </p:txBody>
       </p:sp>
@@ -4636,7 +4622,7 @@
           <p:cNvPr id="9" name="Título 1">
             <a:extLst>
               <a:ext uri="{FF2B5EF4-FFF2-40B4-BE49-F238E27FC236}">
-                <a16:creationId xmlns:a16="http://schemas.microsoft.com/office/drawing/2014/main" xmlns="" id="{C970F256-3488-4F4A-A764-07DD68032D5B}"/>
+                <a16:creationId xmlns="" xmlns:a16="http://schemas.microsoft.com/office/drawing/2014/main" id="{C970F256-3488-4F4A-A764-07DD68032D5B}"/>
               </a:ext>
             </a:extLst>
           </p:cNvPr>
@@ -4667,11 +4653,6 @@
               </a:rPr>
               <a:t>Referentes teóricos</a:t>
             </a:r>
-            <a:endParaRPr lang="es-MX" b="1" dirty="0">
-              <a:solidFill>
-                <a:schemeClr val="bg1"/>
-              </a:solidFill>
-            </a:endParaRPr>
           </a:p>
         </p:txBody>
       </p:sp>
@@ -4813,11 +4794,7 @@
             <a:pPr algn="ctr"/>
             <a:r>
               <a:rPr lang="es-MX" sz="2400" b="1" dirty="0" smtClean="0"/>
-              <a:t>Creador de </a:t>
-            </a:r>
-            <a:r>
-              <a:rPr lang="es-MX" sz="2400" b="1" dirty="0" smtClean="0"/>
-              <a:t>Java</a:t>
+              <a:t>Creador de Java</a:t>
             </a:r>
             <a:endParaRPr lang="es-MX" b="1" dirty="0"/>
           </a:p>
@@ -4931,11 +4908,7 @@
             <a:pPr algn="ctr"/>
             <a:r>
               <a:rPr lang="es-MX" sz="2400" b="1" dirty="0" smtClean="0"/>
-              <a:t>Creador </a:t>
-            </a:r>
-            <a:r>
-              <a:rPr lang="es-MX" sz="2400" b="1" dirty="0" smtClean="0"/>
-              <a:t>del compilador de Java</a:t>
+              <a:t>Creador del compilador de Java</a:t>
             </a:r>
             <a:endParaRPr lang="es-MX" b="1" dirty="0"/>
           </a:p>
@@ -5008,11 +4981,7 @@
             <a:pPr algn="ctr"/>
             <a:r>
               <a:rPr lang="es-MX" sz="2400" b="1" dirty="0" smtClean="0"/>
-              <a:t>Creador </a:t>
-            </a:r>
-            <a:r>
-              <a:rPr lang="es-MX" sz="2400" b="1" dirty="0" smtClean="0"/>
-              <a:t>de la JVM</a:t>
+              <a:t>Creador de la JVM</a:t>
             </a:r>
             <a:endParaRPr lang="es-MX" b="1" dirty="0"/>
           </a:p>
@@ -5085,15 +5054,7 @@
             <a:pPr algn="ctr"/>
             <a:r>
               <a:rPr lang="es-MX" sz="2400" b="1" dirty="0" smtClean="0"/>
-              <a:t>Miembro </a:t>
-            </a:r>
-            <a:r>
-              <a:rPr lang="es-MX" sz="2400" b="1" dirty="0" smtClean="0"/>
-              <a:t>Academia Nacional de Ingeniería en </a:t>
-            </a:r>
-            <a:r>
-              <a:rPr lang="es-MX" sz="2400" b="1" dirty="0" smtClean="0"/>
-              <a:t>Estados Unidos</a:t>
+              <a:t>Miembro Academia Nacional de Ingeniería en Estados Unidos</a:t>
             </a:r>
             <a:endParaRPr lang="es-MX" b="1" dirty="0"/>
           </a:p>
@@ -5166,15 +5127,7 @@
             <a:pPr algn="ctr"/>
             <a:r>
               <a:rPr lang="es-MX" sz="2400" b="1" dirty="0" smtClean="0"/>
-              <a:t>Medalla </a:t>
-            </a:r>
-            <a:r>
-              <a:rPr lang="es-MX" sz="2400" b="1" dirty="0" smtClean="0"/>
-              <a:t>John von Newmann de la </a:t>
-            </a:r>
-            <a:r>
-              <a:rPr lang="es-MX" sz="2400" b="1" dirty="0" smtClean="0"/>
-              <a:t>IEEE por lo anterior y otras contribuciones a los lenguajes de programación y entornos</a:t>
+              <a:t>Medalla John von Newmann de la IEEE por lo anterior y otras contribuciones a los lenguajes de programación y entornos</a:t>
             </a:r>
             <a:endParaRPr lang="es-MX" b="1" dirty="0"/>
           </a:p>
@@ -5365,7 +5318,7 @@
           <p:cNvPr id="34" name="Título 1">
             <a:extLst>
               <a:ext uri="{FF2B5EF4-FFF2-40B4-BE49-F238E27FC236}">
-                <a16:creationId xmlns:a16="http://schemas.microsoft.com/office/drawing/2014/main" xmlns="" id="{C970F256-3488-4F4A-A764-07DD68032D5B}"/>
+                <a16:creationId xmlns="" xmlns:a16="http://schemas.microsoft.com/office/drawing/2014/main" id="{C970F256-3488-4F4A-A764-07DD68032D5B}"/>
               </a:ext>
             </a:extLst>
           </p:cNvPr>
@@ -5396,11 +5349,6 @@
               </a:rPr>
               <a:t>Referentes teóricos</a:t>
             </a:r>
-            <a:endParaRPr lang="es-MX" b="1" dirty="0">
-              <a:solidFill>
-                <a:schemeClr val="bg1"/>
-              </a:solidFill>
-            </a:endParaRPr>
           </a:p>
         </p:txBody>
       </p:sp>
@@ -5784,7 +5732,7 @@
           <p:cNvPr id="20" name="Título 1">
             <a:extLst>
               <a:ext uri="{FF2B5EF4-FFF2-40B4-BE49-F238E27FC236}">
-                <a16:creationId xmlns:a16="http://schemas.microsoft.com/office/drawing/2014/main" xmlns="" id="{C970F256-3488-4F4A-A764-07DD68032D5B}"/>
+                <a16:creationId xmlns="" xmlns:a16="http://schemas.microsoft.com/office/drawing/2014/main" id="{C970F256-3488-4F4A-A764-07DD68032D5B}"/>
               </a:ext>
             </a:extLst>
           </p:cNvPr>
@@ -5815,11 +5763,6 @@
               </a:rPr>
               <a:t>Referentes teóricos</a:t>
             </a:r>
-            <a:endParaRPr lang="es-MX" sz="4000" b="1" dirty="0">
-              <a:solidFill>
-                <a:schemeClr val="bg1"/>
-              </a:solidFill>
-            </a:endParaRPr>
           </a:p>
         </p:txBody>
       </p:sp>
@@ -6056,7 +5999,7 @@
           <p:cNvPr id="11" name="Título 1">
             <a:extLst>
               <a:ext uri="{FF2B5EF4-FFF2-40B4-BE49-F238E27FC236}">
-                <a16:creationId xmlns:a16="http://schemas.microsoft.com/office/drawing/2014/main" xmlns="" id="{C970F256-3488-4F4A-A764-07DD68032D5B}"/>
+                <a16:creationId xmlns="" xmlns:a16="http://schemas.microsoft.com/office/drawing/2014/main" id="{C970F256-3488-4F4A-A764-07DD68032D5B}"/>
               </a:ext>
             </a:extLst>
           </p:cNvPr>
@@ -6179,7 +6122,7 @@
           <p:cNvPr id="2" name="Título 1">
             <a:extLst>
               <a:ext uri="{FF2B5EF4-FFF2-40B4-BE49-F238E27FC236}">
-                <a16:creationId xmlns:a16="http://schemas.microsoft.com/office/drawing/2014/main" xmlns="" id="{07AE7516-1AE4-45BE-98BE-4B95F4DA1742}"/>
+                <a16:creationId xmlns="" xmlns:a16="http://schemas.microsoft.com/office/drawing/2014/main" id="{07AE7516-1AE4-45BE-98BE-4B95F4DA1742}"/>
               </a:ext>
             </a:extLst>
           </p:cNvPr>
@@ -6207,15 +6150,7 @@
                   <a:schemeClr val="bg1"/>
                 </a:solidFill>
               </a:rPr>
-              <a:t>Marco </a:t>
-            </a:r>
-            <a:r>
-              <a:rPr lang="es-MX" b="1" dirty="0" smtClean="0">
-                <a:solidFill>
-                  <a:schemeClr val="bg1"/>
-                </a:solidFill>
-              </a:rPr>
-              <a:t>legal</a:t>
+              <a:t>Marco legal</a:t>
             </a:r>
             <a:endParaRPr lang="es-MX" b="1" dirty="0">
               <a:solidFill>
@@ -6230,7 +6165,7 @@
           <p:cNvPr id="3" name="Marcador de contenido 2">
             <a:extLst>
               <a:ext uri="{FF2B5EF4-FFF2-40B4-BE49-F238E27FC236}">
-                <a16:creationId xmlns:a16="http://schemas.microsoft.com/office/drawing/2014/main" xmlns="" id="{607AE930-5E81-4976-884A-E79FEB8EAB31}"/>
+                <a16:creationId xmlns="" xmlns:a16="http://schemas.microsoft.com/office/drawing/2014/main" id="{607AE930-5E81-4976-884A-E79FEB8EAB31}"/>
               </a:ext>
             </a:extLst>
           </p:cNvPr>
@@ -6266,7 +6201,6 @@
               <a:rPr lang="es-MX" sz="3600" b="1" dirty="0" smtClean="0"/>
               <a:t>Copyleft</a:t>
             </a:r>
-            <a:endParaRPr lang="es-MX" sz="3600" b="1" dirty="0" smtClean="0"/>
           </a:p>
         </p:txBody>
       </p:sp>
@@ -6275,7 +6209,7 @@
           <p:cNvPr id="4" name="Marcador de contenido 2">
             <a:extLst>
               <a:ext uri="{FF2B5EF4-FFF2-40B4-BE49-F238E27FC236}">
-                <a16:creationId xmlns:a16="http://schemas.microsoft.com/office/drawing/2014/main" xmlns="" id="{607AE930-5E81-4976-884A-E79FEB8EAB31}"/>
+                <a16:creationId xmlns="" xmlns:a16="http://schemas.microsoft.com/office/drawing/2014/main" id="{607AE930-5E81-4976-884A-E79FEB8EAB31}"/>
               </a:ext>
             </a:extLst>
           </p:cNvPr>
@@ -6521,7 +6455,7 @@
           <p:cNvPr id="4" name="Título 1">
             <a:extLst>
               <a:ext uri="{FF2B5EF4-FFF2-40B4-BE49-F238E27FC236}">
-                <a16:creationId xmlns:a16="http://schemas.microsoft.com/office/drawing/2014/main" xmlns="" id="{F194AB6A-55E1-4B44-A983-8BC6AA65E29D}"/>
+                <a16:creationId xmlns="" xmlns:a16="http://schemas.microsoft.com/office/drawing/2014/main" id="{F194AB6A-55E1-4B44-A983-8BC6AA65E29D}"/>
               </a:ext>
             </a:extLst>
           </p:cNvPr>
@@ -6594,7 +6528,7 @@
           <p:cNvPr id="7" name="Marcador de contenido 2">
             <a:extLst>
               <a:ext uri="{FF2B5EF4-FFF2-40B4-BE49-F238E27FC236}">
-                <a16:creationId xmlns:a16="http://schemas.microsoft.com/office/drawing/2014/main" xmlns="" id="{9044A195-81E2-4535-8AF2-A32F3CBDD8E6}"/>
+                <a16:creationId xmlns="" xmlns:a16="http://schemas.microsoft.com/office/drawing/2014/main" id="{9044A195-81E2-4535-8AF2-A32F3CBDD8E6}"/>
               </a:ext>
             </a:extLst>
           </p:cNvPr>
@@ -7005,7 +6939,6 @@
               <a:rPr lang="es-CO" sz="2800" dirty="0"/>
               <a:t>Aplicación administradores</a:t>
             </a:r>
-            <a:endParaRPr lang="es-CO" sz="2800" dirty="0"/>
           </a:p>
         </p:txBody>
       </p:sp>
@@ -7569,7 +7502,7 @@
           <p:cNvPr id="2" name="Título 1">
             <a:extLst>
               <a:ext uri="{FF2B5EF4-FFF2-40B4-BE49-F238E27FC236}">
-                <a16:creationId xmlns:a16="http://schemas.microsoft.com/office/drawing/2014/main" xmlns="" id="{4D3AF533-AD0F-43F7-AC8D-8A056BA291A3}"/>
+                <a16:creationId xmlns="" xmlns:a16="http://schemas.microsoft.com/office/drawing/2014/main" id="{4D3AF533-AD0F-43F7-AC8D-8A056BA291A3}"/>
               </a:ext>
             </a:extLst>
           </p:cNvPr>
@@ -7607,7 +7540,7 @@
           <p:cNvPr id="3" name="Marcador de contenido 2">
             <a:extLst>
               <a:ext uri="{FF2B5EF4-FFF2-40B4-BE49-F238E27FC236}">
-                <a16:creationId xmlns:a16="http://schemas.microsoft.com/office/drawing/2014/main" xmlns="" id="{9044A195-81E2-4535-8AF2-A32F3CBDD8E6}"/>
+                <a16:creationId xmlns="" xmlns:a16="http://schemas.microsoft.com/office/drawing/2014/main" id="{9044A195-81E2-4535-8AF2-A32F3CBDD8E6}"/>
               </a:ext>
             </a:extLst>
           </p:cNvPr>
@@ -7724,7 +7657,7 @@
           <p:cNvPr id="7" name="CuadroTexto 6">
             <a:extLst>
               <a:ext uri="{FF2B5EF4-FFF2-40B4-BE49-F238E27FC236}">
-                <a16:creationId xmlns:a16="http://schemas.microsoft.com/office/drawing/2014/main" xmlns="" id="{BC049DBC-6933-4F01-99CD-12D18B825504}"/>
+                <a16:creationId xmlns="" xmlns:a16="http://schemas.microsoft.com/office/drawing/2014/main" id="{BC049DBC-6933-4F01-99CD-12D18B825504}"/>
               </a:ext>
             </a:extLst>
           </p:cNvPr>
@@ -7871,7 +7804,7 @@
           <p:cNvPr id="5" name="Título 1">
             <a:extLst>
               <a:ext uri="{FF2B5EF4-FFF2-40B4-BE49-F238E27FC236}">
-                <a16:creationId xmlns:a16="http://schemas.microsoft.com/office/drawing/2014/main" xmlns="" id="{F194AB6A-55E1-4B44-A983-8BC6AA65E29D}"/>
+                <a16:creationId xmlns="" xmlns:a16="http://schemas.microsoft.com/office/drawing/2014/main" id="{F194AB6A-55E1-4B44-A983-8BC6AA65E29D}"/>
               </a:ext>
             </a:extLst>
           </p:cNvPr>
@@ -8512,7 +8445,7 @@
           <p:cNvPr id="7" name="Título 1">
             <a:extLst>
               <a:ext uri="{FF2B5EF4-FFF2-40B4-BE49-F238E27FC236}">
-                <a16:creationId xmlns:a16="http://schemas.microsoft.com/office/drawing/2014/main" xmlns="" id="{C970F256-3488-4F4A-A764-07DD68032D5B}"/>
+                <a16:creationId xmlns="" xmlns:a16="http://schemas.microsoft.com/office/drawing/2014/main" id="{C970F256-3488-4F4A-A764-07DD68032D5B}"/>
               </a:ext>
             </a:extLst>
           </p:cNvPr>
@@ -8671,7 +8604,7 @@
           <p:cNvPr id="6" name="CuadroTexto 5">
             <a:extLst>
               <a:ext uri="{FF2B5EF4-FFF2-40B4-BE49-F238E27FC236}">
-                <a16:creationId xmlns:a16="http://schemas.microsoft.com/office/drawing/2014/main" xmlns="" id="{BC049DBC-6933-4F01-99CD-12D18B825504}"/>
+                <a16:creationId xmlns="" xmlns:a16="http://schemas.microsoft.com/office/drawing/2014/main" id="{BC049DBC-6933-4F01-99CD-12D18B825504}"/>
               </a:ext>
             </a:extLst>
           </p:cNvPr>
@@ -8775,7 +8708,7 @@
           <p:cNvPr id="8" name="CuadroTexto 7">
             <a:extLst>
               <a:ext uri="{FF2B5EF4-FFF2-40B4-BE49-F238E27FC236}">
-                <a16:creationId xmlns:a16="http://schemas.microsoft.com/office/drawing/2014/main" xmlns="" id="{46EA4DCA-5CF5-445C-A682-F68F57AE84CF}"/>
+                <a16:creationId xmlns="" xmlns:a16="http://schemas.microsoft.com/office/drawing/2014/main" id="{46EA4DCA-5CF5-445C-A682-F68F57AE84CF}"/>
               </a:ext>
             </a:extLst>
           </p:cNvPr>
@@ -8827,7 +8760,7 @@
           <p:cNvPr id="7" name="Título 1">
             <a:extLst>
               <a:ext uri="{FF2B5EF4-FFF2-40B4-BE49-F238E27FC236}">
-                <a16:creationId xmlns:a16="http://schemas.microsoft.com/office/drawing/2014/main" xmlns="" id="{C970F256-3488-4F4A-A764-07DD68032D5B}"/>
+                <a16:creationId xmlns="" xmlns:a16="http://schemas.microsoft.com/office/drawing/2014/main" id="{C970F256-3488-4F4A-A764-07DD68032D5B}"/>
               </a:ext>
             </a:extLst>
           </p:cNvPr>
@@ -8986,7 +8919,7 @@
           <p:cNvPr id="7" name="CuadroTexto 6">
             <a:extLst>
               <a:ext uri="{FF2B5EF4-FFF2-40B4-BE49-F238E27FC236}">
-                <a16:creationId xmlns:a16="http://schemas.microsoft.com/office/drawing/2014/main" xmlns="" id="{9A9A517C-CD63-4999-91D2-533BFA31F83E}"/>
+                <a16:creationId xmlns="" xmlns:a16="http://schemas.microsoft.com/office/drawing/2014/main" id="{9A9A517C-CD63-4999-91D2-533BFA31F83E}"/>
               </a:ext>
             </a:extLst>
           </p:cNvPr>
@@ -9034,7 +8967,7 @@
           <p:cNvPr id="8" name="CuadroTexto 7">
             <a:extLst>
               <a:ext uri="{FF2B5EF4-FFF2-40B4-BE49-F238E27FC236}">
-                <a16:creationId xmlns:a16="http://schemas.microsoft.com/office/drawing/2014/main" xmlns="" id="{89E46AF4-218E-4E1B-B422-59B657A05EE8}"/>
+                <a16:creationId xmlns="" xmlns:a16="http://schemas.microsoft.com/office/drawing/2014/main" id="{89E46AF4-218E-4E1B-B422-59B657A05EE8}"/>
               </a:ext>
             </a:extLst>
           </p:cNvPr>
@@ -9114,7 +9047,7 @@
           <p:cNvPr id="9" name="Título 1">
             <a:extLst>
               <a:ext uri="{FF2B5EF4-FFF2-40B4-BE49-F238E27FC236}">
-                <a16:creationId xmlns:a16="http://schemas.microsoft.com/office/drawing/2014/main" xmlns="" id="{C970F256-3488-4F4A-A764-07DD68032D5B}"/>
+                <a16:creationId xmlns="" xmlns:a16="http://schemas.microsoft.com/office/drawing/2014/main" id="{C970F256-3488-4F4A-A764-07DD68032D5B}"/>
               </a:ext>
             </a:extLst>
           </p:cNvPr>
@@ -9519,7 +9452,6 @@
               <a:rPr lang="es-CO" sz="2800" dirty="0"/>
               <a:t>Aplicación administradores</a:t>
             </a:r>
-            <a:endParaRPr lang="es-CO" sz="2800" dirty="0"/>
           </a:p>
         </p:txBody>
       </p:sp>
@@ -10046,7 +9978,7 @@
           <p:cNvPr id="23" name="Título 1">
             <a:extLst>
               <a:ext uri="{FF2B5EF4-FFF2-40B4-BE49-F238E27FC236}">
-                <a16:creationId xmlns:a16="http://schemas.microsoft.com/office/drawing/2014/main" xmlns="" id="{C970F256-3488-4F4A-A764-07DD68032D5B}"/>
+                <a16:creationId xmlns="" xmlns:a16="http://schemas.microsoft.com/office/drawing/2014/main" id="{C970F256-3488-4F4A-A764-07DD68032D5B}"/>
               </a:ext>
             </a:extLst>
           </p:cNvPr>
@@ -10195,7 +10127,7 @@
           <p:cNvPr id="2" name="Título 1">
             <a:extLst>
               <a:ext uri="{FF2B5EF4-FFF2-40B4-BE49-F238E27FC236}">
-                <a16:creationId xmlns:a16="http://schemas.microsoft.com/office/drawing/2014/main" xmlns="" id="{C970F256-3488-4F4A-A764-07DD68032D5B}"/>
+                <a16:creationId xmlns="" xmlns:a16="http://schemas.microsoft.com/office/drawing/2014/main" id="{C970F256-3488-4F4A-A764-07DD68032D5B}"/>
               </a:ext>
             </a:extLst>
           </p:cNvPr>
@@ -10501,13 +10433,7 @@
                         <a:rPr lang="es-CO" sz="2400" u="none" strike="noStrike" dirty="0" smtClean="0">
                           <a:effectLst/>
                         </a:rPr>
-                        <a:t>Apache </a:t>
-                      </a:r>
-                      <a:r>
-                        <a:rPr lang="es-CO" sz="2400" u="none" strike="noStrike" dirty="0" smtClean="0">
-                          <a:effectLst/>
-                        </a:rPr>
-                        <a:t>Tomcat</a:t>
+                        <a:t>Apache Tomcat</a:t>
                       </a:r>
                       <a:endParaRPr lang="es-CO" sz="2400" b="0" i="0" u="none" strike="noStrike" dirty="0">
                         <a:solidFill>
@@ -11186,7 +11112,7 @@
           <p:cNvPr id="5" name="CuadroTexto 4">
             <a:extLst>
               <a:ext uri="{FF2B5EF4-FFF2-40B4-BE49-F238E27FC236}">
-                <a16:creationId xmlns:a16="http://schemas.microsoft.com/office/drawing/2014/main" xmlns="" id="{BC049DBC-6933-4F01-99CD-12D18B825504}"/>
+                <a16:creationId xmlns="" xmlns:a16="http://schemas.microsoft.com/office/drawing/2014/main" id="{BC049DBC-6933-4F01-99CD-12D18B825504}"/>
               </a:ext>
             </a:extLst>
           </p:cNvPr>
@@ -11322,7 +11248,7 @@
           <p:cNvPr id="6" name="CuadroTexto 5">
             <a:extLst>
               <a:ext uri="{FF2B5EF4-FFF2-40B4-BE49-F238E27FC236}">
-                <a16:creationId xmlns:a16="http://schemas.microsoft.com/office/drawing/2014/main" xmlns="" id="{9175FBDA-696B-46FE-97CD-48084F55349C}"/>
+                <a16:creationId xmlns="" xmlns:a16="http://schemas.microsoft.com/office/drawing/2014/main" id="{9175FBDA-696B-46FE-97CD-48084F55349C}"/>
               </a:ext>
             </a:extLst>
           </p:cNvPr>
@@ -11370,7 +11296,7 @@
           <p:cNvPr id="5" name="Título 1">
             <a:extLst>
               <a:ext uri="{FF2B5EF4-FFF2-40B4-BE49-F238E27FC236}">
-                <a16:creationId xmlns:a16="http://schemas.microsoft.com/office/drawing/2014/main" xmlns="" id="{C970F256-3488-4F4A-A764-07DD68032D5B}"/>
+                <a16:creationId xmlns="" xmlns:a16="http://schemas.microsoft.com/office/drawing/2014/main" id="{C970F256-3488-4F4A-A764-07DD68032D5B}"/>
               </a:ext>
             </a:extLst>
           </p:cNvPr>
@@ -11529,7 +11455,7 @@
           <p:cNvPr id="2" name="Título 1">
             <a:extLst>
               <a:ext uri="{FF2B5EF4-FFF2-40B4-BE49-F238E27FC236}">
-                <a16:creationId xmlns:a16="http://schemas.microsoft.com/office/drawing/2014/main" xmlns="" id="{66349900-D031-47AB-BEDC-4E081B677983}"/>
+                <a16:creationId xmlns="" xmlns:a16="http://schemas.microsoft.com/office/drawing/2014/main" id="{66349900-D031-47AB-BEDC-4E081B677983}"/>
               </a:ext>
             </a:extLst>
           </p:cNvPr>
@@ -11711,7 +11637,7 @@
           <p:cNvPr id="5" name="Título 1">
             <a:extLst>
               <a:ext uri="{FF2B5EF4-FFF2-40B4-BE49-F238E27FC236}">
-                <a16:creationId xmlns:a16="http://schemas.microsoft.com/office/drawing/2014/main" xmlns="" id="{66349900-D031-47AB-BEDC-4E081B677983}"/>
+                <a16:creationId xmlns="" xmlns:a16="http://schemas.microsoft.com/office/drawing/2014/main" id="{66349900-D031-47AB-BEDC-4E081B677983}"/>
               </a:ext>
             </a:extLst>
           </p:cNvPr>
@@ -11893,7 +11819,7 @@
           <p:cNvPr id="5" name="Título 1">
             <a:extLst>
               <a:ext uri="{FF2B5EF4-FFF2-40B4-BE49-F238E27FC236}">
-                <a16:creationId xmlns:a16="http://schemas.microsoft.com/office/drawing/2014/main" xmlns="" id="{66349900-D031-47AB-BEDC-4E081B677983}"/>
+                <a16:creationId xmlns="" xmlns:a16="http://schemas.microsoft.com/office/drawing/2014/main" id="{66349900-D031-47AB-BEDC-4E081B677983}"/>
               </a:ext>
             </a:extLst>
           </p:cNvPr>
@@ -12068,7 +11994,7 @@
           <p:cNvPr id="9" name="Título 1">
             <a:extLst>
               <a:ext uri="{FF2B5EF4-FFF2-40B4-BE49-F238E27FC236}">
-                <a16:creationId xmlns:a16="http://schemas.microsoft.com/office/drawing/2014/main" xmlns="" id="{66349900-D031-47AB-BEDC-4E081B677983}"/>
+                <a16:creationId xmlns="" xmlns:a16="http://schemas.microsoft.com/office/drawing/2014/main" id="{66349900-D031-47AB-BEDC-4E081B677983}"/>
               </a:ext>
             </a:extLst>
           </p:cNvPr>
@@ -12123,7 +12049,7 @@
           <p:cNvPr id="10" name="Título 1">
             <a:extLst>
               <a:ext uri="{FF2B5EF4-FFF2-40B4-BE49-F238E27FC236}">
-                <a16:creationId xmlns:a16="http://schemas.microsoft.com/office/drawing/2014/main" xmlns="" id="{66349900-D031-47AB-BEDC-4E081B677983}"/>
+                <a16:creationId xmlns="" xmlns:a16="http://schemas.microsoft.com/office/drawing/2014/main" id="{66349900-D031-47AB-BEDC-4E081B677983}"/>
               </a:ext>
             </a:extLst>
           </p:cNvPr>
@@ -12215,7 +12141,7 @@
           <p:cNvPr id="4" name="Título 1">
             <a:extLst>
               <a:ext uri="{FF2B5EF4-FFF2-40B4-BE49-F238E27FC236}">
-                <a16:creationId xmlns:a16="http://schemas.microsoft.com/office/drawing/2014/main" xmlns="" id="{66349900-D031-47AB-BEDC-4E081B677983}"/>
+                <a16:creationId xmlns="" xmlns:a16="http://schemas.microsoft.com/office/drawing/2014/main" id="{66349900-D031-47AB-BEDC-4E081B677983}"/>
               </a:ext>
             </a:extLst>
           </p:cNvPr>
@@ -12245,15 +12171,7 @@
                   <a:schemeClr val="bg1"/>
                 </a:solidFill>
               </a:rPr>
-              <a:t>Aplicación  </a:t>
-            </a:r>
-            <a:r>
-              <a:rPr lang="es-MX" b="1" dirty="0" smtClean="0">
-                <a:solidFill>
-                  <a:schemeClr val="bg1"/>
-                </a:solidFill>
-              </a:rPr>
-              <a:t>estudiantes</a:t>
+              <a:t>Aplicación  estudiantes</a:t>
             </a:r>
             <a:endParaRPr lang="es-MX" b="1" dirty="0">
               <a:solidFill>
@@ -12368,7 +12286,7 @@
           <p:cNvPr id="9" name="Título 1">
             <a:extLst>
               <a:ext uri="{FF2B5EF4-FFF2-40B4-BE49-F238E27FC236}">
-                <a16:creationId xmlns:a16="http://schemas.microsoft.com/office/drawing/2014/main" xmlns="" id="{66349900-D031-47AB-BEDC-4E081B677983}"/>
+                <a16:creationId xmlns="" xmlns:a16="http://schemas.microsoft.com/office/drawing/2014/main" id="{66349900-D031-47AB-BEDC-4E081B677983}"/>
               </a:ext>
             </a:extLst>
           </p:cNvPr>
@@ -12460,7 +12378,7 @@
           <p:cNvPr id="5" name="Título 1">
             <a:extLst>
               <a:ext uri="{FF2B5EF4-FFF2-40B4-BE49-F238E27FC236}">
-                <a16:creationId xmlns:a16="http://schemas.microsoft.com/office/drawing/2014/main" xmlns="" id="{F194AB6A-55E1-4B44-A983-8BC6AA65E29D}"/>
+                <a16:creationId xmlns="" xmlns:a16="http://schemas.microsoft.com/office/drawing/2014/main" id="{F194AB6A-55E1-4B44-A983-8BC6AA65E29D}"/>
               </a:ext>
             </a:extLst>
           </p:cNvPr>
@@ -12687,7 +12605,7 @@
           <p:cNvPr id="2" name="Título 1">
             <a:extLst>
               <a:ext uri="{FF2B5EF4-FFF2-40B4-BE49-F238E27FC236}">
-                <a16:creationId xmlns:a16="http://schemas.microsoft.com/office/drawing/2014/main" xmlns="" id="{F3C1574D-8292-4410-B1E4-1EBE9DF828D1}"/>
+                <a16:creationId xmlns="" xmlns:a16="http://schemas.microsoft.com/office/drawing/2014/main" id="{F3C1574D-8292-4410-B1E4-1EBE9DF828D1}"/>
               </a:ext>
             </a:extLst>
           </p:cNvPr>
@@ -12733,7 +12651,7 @@
           <p:cNvPr id="3" name="Marcador de contenido 2">
             <a:extLst>
               <a:ext uri="{FF2B5EF4-FFF2-40B4-BE49-F238E27FC236}">
-                <a16:creationId xmlns:a16="http://schemas.microsoft.com/office/drawing/2014/main" xmlns="" id="{FF0FB3A2-B486-4D36-B284-27C22DD5AB74}"/>
+                <a16:creationId xmlns="" xmlns:a16="http://schemas.microsoft.com/office/drawing/2014/main" id="{FF0FB3A2-B486-4D36-B284-27C22DD5AB74}"/>
               </a:ext>
             </a:extLst>
           </p:cNvPr>
@@ -12803,7 +12721,7 @@
           <p:cNvPr id="2" name="Título 1">
             <a:extLst>
               <a:ext uri="{FF2B5EF4-FFF2-40B4-BE49-F238E27FC236}">
-                <a16:creationId xmlns:a16="http://schemas.microsoft.com/office/drawing/2014/main" xmlns="" id="{F3C1574D-8292-4410-B1E4-1EBE9DF828D1}"/>
+                <a16:creationId xmlns="" xmlns:a16="http://schemas.microsoft.com/office/drawing/2014/main" id="{F3C1574D-8292-4410-B1E4-1EBE9DF828D1}"/>
               </a:ext>
             </a:extLst>
           </p:cNvPr>
@@ -13459,11 +13377,7 @@
             </a:r>
             <a:r>
               <a:rPr lang="es-CO" sz="4400" dirty="0"/>
-              <a:t>obtienen grandes cantidades de información sobre sus estudiantes mediante </a:t>
-            </a:r>
-            <a:r>
-              <a:rPr lang="es-CO" sz="4400" dirty="0"/>
-              <a:t>e</a:t>
+              <a:t>obtienen grandes cantidades de información sobre sus estudiantes mediante e</a:t>
             </a:r>
             <a:r>
               <a:rPr lang="es-CO" sz="4400" dirty="0" smtClean="0"/>
@@ -13531,7 +13445,7 @@
           <p:cNvPr id="3" name="Marcador de contenido 2">
             <a:extLst>
               <a:ext uri="{FF2B5EF4-FFF2-40B4-BE49-F238E27FC236}">
-                <a16:creationId xmlns:a16="http://schemas.microsoft.com/office/drawing/2014/main" xmlns="" id="{F27ED2C7-5D3D-48D6-995C-A170B4F5C4EE}"/>
+                <a16:creationId xmlns="" xmlns:a16="http://schemas.microsoft.com/office/drawing/2014/main" id="{F27ED2C7-5D3D-48D6-995C-A170B4F5C4EE}"/>
               </a:ext>
             </a:extLst>
           </p:cNvPr>
@@ -13596,23 +13510,8 @@
               <a:rPr lang="es-MX" sz="4000" dirty="0" smtClean="0">
                 <a:cs typeface="Times New Roman" panose="02020603050405020304" pitchFamily="18" charset="0"/>
               </a:rPr>
-              <a:t>Mantener actualizada la información </a:t>
-            </a:r>
-            <a:r>
-              <a:rPr lang="es-MX" sz="4000" dirty="0" smtClean="0">
-                <a:cs typeface="Times New Roman" panose="02020603050405020304" pitchFamily="18" charset="0"/>
-              </a:rPr>
-              <a:t>100</a:t>
-            </a:r>
-            <a:r>
-              <a:rPr lang="es-MX" sz="4000" dirty="0" smtClean="0">
-                <a:cs typeface="Times New Roman" panose="02020603050405020304" pitchFamily="18" charset="0"/>
-              </a:rPr>
-              <a:t>% es una tarea compleja.</a:t>
-            </a:r>
-            <a:endParaRPr lang="es-MX" sz="4000" dirty="0" smtClean="0">
-              <a:cs typeface="Times New Roman" panose="02020603050405020304" pitchFamily="18" charset="0"/>
-            </a:endParaRPr>
+              <a:t>Mantener actualizada la información 100% es una tarea compleja.</a:t>
+            </a:r>
           </a:p>
           <a:p>
             <a:pPr marL="0" indent="0" algn="just">
@@ -13647,19 +13546,7 @@
               <a:rPr lang="es-MX" sz="4000" dirty="0" smtClean="0">
                 <a:cs typeface="Times New Roman" panose="02020603050405020304" pitchFamily="18" charset="0"/>
               </a:rPr>
-              <a:t>esde el marco legal, </a:t>
-            </a:r>
-            <a:r>
-              <a:rPr lang="es-MX" sz="4000" dirty="0" smtClean="0">
-                <a:cs typeface="Times New Roman" panose="02020603050405020304" pitchFamily="18" charset="0"/>
-              </a:rPr>
-              <a:t>es importante dar </a:t>
-            </a:r>
-            <a:r>
-              <a:rPr lang="es-MX" sz="4000" dirty="0" smtClean="0">
-                <a:cs typeface="Times New Roman" panose="02020603050405020304" pitchFamily="18" charset="0"/>
-              </a:rPr>
-              <a:t>el debido manejo de la información de los estudiantes.</a:t>
+              <a:t>esde el marco legal, es importante dar el debido manejo de la información de los estudiantes.</a:t>
             </a:r>
           </a:p>
         </p:txBody>
@@ -13743,7 +13630,7 @@
           <p:cNvPr id="3" name="Marcador de contenido 2">
             <a:extLst>
               <a:ext uri="{FF2B5EF4-FFF2-40B4-BE49-F238E27FC236}">
-                <a16:creationId xmlns:a16="http://schemas.microsoft.com/office/drawing/2014/main" xmlns="" id="{F27ED2C7-5D3D-48D6-995C-A170B4F5C4EE}"/>
+                <a16:creationId xmlns="" xmlns:a16="http://schemas.microsoft.com/office/drawing/2014/main" id="{F27ED2C7-5D3D-48D6-995C-A170B4F5C4EE}"/>
               </a:ext>
             </a:extLst>
           </p:cNvPr>
@@ -13892,7 +13779,7 @@
           <p:cNvPr id="2" name="Título 1">
             <a:extLst>
               <a:ext uri="{FF2B5EF4-FFF2-40B4-BE49-F238E27FC236}">
-                <a16:creationId xmlns:a16="http://schemas.microsoft.com/office/drawing/2014/main" xmlns="" id="{F194AB6A-55E1-4B44-A983-8BC6AA65E29D}"/>
+                <a16:creationId xmlns="" xmlns:a16="http://schemas.microsoft.com/office/drawing/2014/main" id="{F194AB6A-55E1-4B44-A983-8BC6AA65E29D}"/>
               </a:ext>
             </a:extLst>
           </p:cNvPr>
@@ -13935,7 +13822,7 @@
           <p:cNvPr id="3" name="Marcador de contenido 2">
             <a:extLst>
               <a:ext uri="{FF2B5EF4-FFF2-40B4-BE49-F238E27FC236}">
-                <a16:creationId xmlns:a16="http://schemas.microsoft.com/office/drawing/2014/main" xmlns="" id="{B24358F4-4131-4E84-B740-F17730F29968}"/>
+                <a16:creationId xmlns="" xmlns:a16="http://schemas.microsoft.com/office/drawing/2014/main" id="{B24358F4-4131-4E84-B740-F17730F29968}"/>
               </a:ext>
             </a:extLst>
           </p:cNvPr>
@@ -14026,7 +13913,7 @@
           <p:cNvPr id="3" name="Marcador de contenido 2">
             <a:extLst>
               <a:ext uri="{FF2B5EF4-FFF2-40B4-BE49-F238E27FC236}">
-                <a16:creationId xmlns:a16="http://schemas.microsoft.com/office/drawing/2014/main" xmlns="" id="{E0439019-967A-48CB-99F3-103D64E7D9BA}"/>
+                <a16:creationId xmlns="" xmlns:a16="http://schemas.microsoft.com/office/drawing/2014/main" id="{E0439019-967A-48CB-99F3-103D64E7D9BA}"/>
               </a:ext>
             </a:extLst>
           </p:cNvPr>
@@ -14112,7 +13999,6 @@
               <a:rPr lang="es-CO" dirty="0" smtClean="0"/>
               <a:t>.</a:t>
             </a:r>
-            <a:endParaRPr lang="es-CO" dirty="0" smtClean="0"/>
           </a:p>
           <a:p>
             <a:pPr algn="just">
@@ -14136,7 +14022,7 @@
           <p:cNvPr id="5" name="Título 1">
             <a:extLst>
               <a:ext uri="{FF2B5EF4-FFF2-40B4-BE49-F238E27FC236}">
-                <a16:creationId xmlns:a16="http://schemas.microsoft.com/office/drawing/2014/main" xmlns="" id="{F194AB6A-55E1-4B44-A983-8BC6AA65E29D}"/>
+                <a16:creationId xmlns="" xmlns:a16="http://schemas.microsoft.com/office/drawing/2014/main" id="{F194AB6A-55E1-4B44-A983-8BC6AA65E29D}"/>
               </a:ext>
             </a:extLst>
           </p:cNvPr>
@@ -14216,7 +14102,7 @@
           <p:cNvPr id="2" name="Título 1">
             <a:extLst>
               <a:ext uri="{FF2B5EF4-FFF2-40B4-BE49-F238E27FC236}">
-                <a16:creationId xmlns:a16="http://schemas.microsoft.com/office/drawing/2014/main" xmlns="" id="{07AE7516-1AE4-45BE-98BE-4B95F4DA1742}"/>
+                <a16:creationId xmlns="" xmlns:a16="http://schemas.microsoft.com/office/drawing/2014/main" id="{07AE7516-1AE4-45BE-98BE-4B95F4DA1742}"/>
               </a:ext>
             </a:extLst>
           </p:cNvPr>
@@ -14261,7 +14147,7 @@
           <p:cNvPr id="3" name="Marcador de contenido 2">
             <a:extLst>
               <a:ext uri="{FF2B5EF4-FFF2-40B4-BE49-F238E27FC236}">
-                <a16:creationId xmlns:a16="http://schemas.microsoft.com/office/drawing/2014/main" xmlns="" id="{607AE930-5E81-4976-884A-E79FEB8EAB31}"/>
+                <a16:creationId xmlns="" xmlns:a16="http://schemas.microsoft.com/office/drawing/2014/main" id="{607AE930-5E81-4976-884A-E79FEB8EAB31}"/>
               </a:ext>
             </a:extLst>
           </p:cNvPr>
@@ -14299,11 +14185,7 @@
             </a:r>
             <a:r>
               <a:rPr lang="es-MX" sz="3200" b="1" dirty="0" smtClean="0"/>
-              <a:t>Para qué desarrollar esta solución informática</a:t>
-            </a:r>
-            <a:r>
-              <a:rPr lang="es-MX" sz="3200" b="1" dirty="0" smtClean="0"/>
-              <a:t>?</a:t>
+              <a:t>Para qué desarrollar esta solución informática?</a:t>
             </a:r>
             <a:endParaRPr lang="es-MX" sz="3200" dirty="0" smtClean="0"/>
           </a:p>
@@ -14318,11 +14200,7 @@
             </a:pPr>
             <a:r>
               <a:rPr lang="es-MX" sz="3200" dirty="0" smtClean="0"/>
-              <a:t> Sistematizar el proceso</a:t>
-            </a:r>
-            <a:r>
-              <a:rPr lang="es-MX" sz="3200" dirty="0" smtClean="0"/>
-              <a:t>.</a:t>
+              <a:t> Sistematizar el proceso.</a:t>
             </a:r>
             <a:endParaRPr lang="es-MX" sz="3200" dirty="0"/>
           </a:p>
@@ -14343,7 +14221,6 @@
               <a:rPr lang="es-MX" sz="3200" dirty="0" smtClean="0"/>
               <a:t>.</a:t>
             </a:r>
-            <a:endParaRPr lang="es-MX" sz="3200" dirty="0" smtClean="0"/>
           </a:p>
           <a:p>
             <a:pPr algn="just">
@@ -14356,11 +14233,7 @@
             </a:pPr>
             <a:r>
               <a:rPr lang="es-MX" sz="3200" dirty="0" smtClean="0"/>
-              <a:t>Identificar las necesidades de los </a:t>
-            </a:r>
-            <a:r>
-              <a:rPr lang="es-MX" sz="3200" dirty="0" smtClean="0"/>
-              <a:t>estudiantes</a:t>
+              <a:t>Identificar las necesidades de los estudiantes</a:t>
             </a:r>
             <a:endParaRPr lang="es-MX" sz="3200" dirty="0"/>
           </a:p>
@@ -14375,11 +14248,7 @@
             </a:pPr>
             <a:r>
               <a:rPr lang="es-MX" sz="3200" dirty="0" smtClean="0"/>
-              <a:t>Dar cumplimiento a la </a:t>
-            </a:r>
-            <a:r>
-              <a:rPr lang="es-MX" sz="3200" dirty="0" smtClean="0"/>
-              <a:t>legislación</a:t>
+              <a:t>Dar cumplimiento a la legislación</a:t>
             </a:r>
             <a:endParaRPr lang="es-MX" sz="3200" dirty="0"/>
           </a:p>

</xml_diff>

<commit_message>
Actualización de las dapositivas
</commit_message>
<xml_diff>
--- a/expo/expo.pptx
+++ b/expo/expo.pptx
@@ -26,11 +26,12 @@
     <p:sldId id="289" r:id="rId20"/>
     <p:sldId id="290" r:id="rId21"/>
     <p:sldId id="292" r:id="rId22"/>
-    <p:sldId id="297" r:id="rId23"/>
-    <p:sldId id="269" r:id="rId24"/>
-    <p:sldId id="296" r:id="rId25"/>
-    <p:sldId id="273" r:id="rId26"/>
-    <p:sldId id="288" r:id="rId27"/>
+    <p:sldId id="300" r:id="rId23"/>
+    <p:sldId id="297" r:id="rId24"/>
+    <p:sldId id="269" r:id="rId25"/>
+    <p:sldId id="296" r:id="rId26"/>
+    <p:sldId id="273" r:id="rId27"/>
+    <p:sldId id="288" r:id="rId28"/>
   </p:sldIdLst>
   <p:sldSz cx="12192000" cy="6858000"/>
   <p:notesSz cx="6858000" cy="9144000"/>
@@ -268,7 +269,7 @@
           <a:p>
             <a:fld id="{D6AEB8E7-BDB9-4384-837D-5E0AF3F2FB20}" type="datetimeFigureOut">
               <a:rPr lang="es-CO" smtClean="0"/>
-              <a:t>01/12/2018</a:t>
+              <a:t>03/12/2018</a:t>
             </a:fld>
             <a:endParaRPr lang="es-CO"/>
           </a:p>
@@ -438,7 +439,7 @@
           <a:p>
             <a:fld id="{D6AEB8E7-BDB9-4384-837D-5E0AF3F2FB20}" type="datetimeFigureOut">
               <a:rPr lang="es-CO" smtClean="0"/>
-              <a:t>01/12/2018</a:t>
+              <a:t>03/12/2018</a:t>
             </a:fld>
             <a:endParaRPr lang="es-CO"/>
           </a:p>
@@ -618,7 +619,7 @@
           <a:p>
             <a:fld id="{D6AEB8E7-BDB9-4384-837D-5E0AF3F2FB20}" type="datetimeFigureOut">
               <a:rPr lang="es-CO" smtClean="0"/>
-              <a:t>01/12/2018</a:t>
+              <a:t>03/12/2018</a:t>
             </a:fld>
             <a:endParaRPr lang="es-CO"/>
           </a:p>
@@ -788,7 +789,7 @@
           <a:p>
             <a:fld id="{D6AEB8E7-BDB9-4384-837D-5E0AF3F2FB20}" type="datetimeFigureOut">
               <a:rPr lang="es-CO" smtClean="0"/>
-              <a:t>01/12/2018</a:t>
+              <a:t>03/12/2018</a:t>
             </a:fld>
             <a:endParaRPr lang="es-CO"/>
           </a:p>
@@ -1034,7 +1035,7 @@
           <a:p>
             <a:fld id="{D6AEB8E7-BDB9-4384-837D-5E0AF3F2FB20}" type="datetimeFigureOut">
               <a:rPr lang="es-CO" smtClean="0"/>
-              <a:t>01/12/2018</a:t>
+              <a:t>03/12/2018</a:t>
             </a:fld>
             <a:endParaRPr lang="es-CO"/>
           </a:p>
@@ -1266,7 +1267,7 @@
           <a:p>
             <a:fld id="{D6AEB8E7-BDB9-4384-837D-5E0AF3F2FB20}" type="datetimeFigureOut">
               <a:rPr lang="es-CO" smtClean="0"/>
-              <a:t>01/12/2018</a:t>
+              <a:t>03/12/2018</a:t>
             </a:fld>
             <a:endParaRPr lang="es-CO"/>
           </a:p>
@@ -1633,7 +1634,7 @@
           <a:p>
             <a:fld id="{D6AEB8E7-BDB9-4384-837D-5E0AF3F2FB20}" type="datetimeFigureOut">
               <a:rPr lang="es-CO" smtClean="0"/>
-              <a:t>01/12/2018</a:t>
+              <a:t>03/12/2018</a:t>
             </a:fld>
             <a:endParaRPr lang="es-CO"/>
           </a:p>
@@ -1751,7 +1752,7 @@
           <a:p>
             <a:fld id="{D6AEB8E7-BDB9-4384-837D-5E0AF3F2FB20}" type="datetimeFigureOut">
               <a:rPr lang="es-CO" smtClean="0"/>
-              <a:t>01/12/2018</a:t>
+              <a:t>03/12/2018</a:t>
             </a:fld>
             <a:endParaRPr lang="es-CO"/>
           </a:p>
@@ -1846,7 +1847,7 @@
           <a:p>
             <a:fld id="{D6AEB8E7-BDB9-4384-837D-5E0AF3F2FB20}" type="datetimeFigureOut">
               <a:rPr lang="es-CO" smtClean="0"/>
-              <a:t>01/12/2018</a:t>
+              <a:t>03/12/2018</a:t>
             </a:fld>
             <a:endParaRPr lang="es-CO"/>
           </a:p>
@@ -2123,7 +2124,7 @@
           <a:p>
             <a:fld id="{D6AEB8E7-BDB9-4384-837D-5E0AF3F2FB20}" type="datetimeFigureOut">
               <a:rPr lang="es-CO" smtClean="0"/>
-              <a:t>01/12/2018</a:t>
+              <a:t>03/12/2018</a:t>
             </a:fld>
             <a:endParaRPr lang="es-CO"/>
           </a:p>
@@ -2376,7 +2377,7 @@
           <a:p>
             <a:fld id="{D6AEB8E7-BDB9-4384-837D-5E0AF3F2FB20}" type="datetimeFigureOut">
               <a:rPr lang="es-CO" smtClean="0"/>
-              <a:t>01/12/2018</a:t>
+              <a:t>03/12/2018</a:t>
             </a:fld>
             <a:endParaRPr lang="es-CO"/>
           </a:p>
@@ -2603,7 +2604,7 @@
           <a:p>
             <a:fld id="{D6AEB8E7-BDB9-4384-837D-5E0AF3F2FB20}" type="datetimeFigureOut">
               <a:rPr lang="es-CO" smtClean="0"/>
-              <a:t>01/12/2018</a:t>
+              <a:t>03/12/2018</a:t>
             </a:fld>
             <a:endParaRPr lang="es-CO"/>
           </a:p>
@@ -3228,7 +3229,7 @@
           <p:cNvPr id="2" name="Título 1">
             <a:extLst>
               <a:ext uri="{FF2B5EF4-FFF2-40B4-BE49-F238E27FC236}">
-                <a16:creationId xmlns:a16="http://schemas.microsoft.com/office/drawing/2014/main" xmlns="" id="{07AE7516-1AE4-45BE-98BE-4B95F4DA1742}"/>
+                <a16:creationId xmlns="" xmlns:a16="http://schemas.microsoft.com/office/drawing/2014/main" id="{07AE7516-1AE4-45BE-98BE-4B95F4DA1742}"/>
               </a:ext>
             </a:extLst>
           </p:cNvPr>
@@ -3438,7 +3439,7 @@
           <p:cNvPr id="3" name="Marcador de contenido 2">
             <a:extLst>
               <a:ext uri="{FF2B5EF4-FFF2-40B4-BE49-F238E27FC236}">
-                <a16:creationId xmlns:a16="http://schemas.microsoft.com/office/drawing/2014/main" xmlns="" id="{607AE930-5E81-4976-884A-E79FEB8EAB31}"/>
+                <a16:creationId xmlns="" xmlns:a16="http://schemas.microsoft.com/office/drawing/2014/main" id="{607AE930-5E81-4976-884A-E79FEB8EAB31}"/>
               </a:ext>
             </a:extLst>
           </p:cNvPr>
@@ -3529,7 +3530,7 @@
           <p:cNvPr id="15" name="Marcador de contenido 2">
             <a:extLst>
               <a:ext uri="{FF2B5EF4-FFF2-40B4-BE49-F238E27FC236}">
-                <a16:creationId xmlns:a16="http://schemas.microsoft.com/office/drawing/2014/main" xmlns="" id="{607AE930-5E81-4976-884A-E79FEB8EAB31}"/>
+                <a16:creationId xmlns="" xmlns:a16="http://schemas.microsoft.com/office/drawing/2014/main" id="{607AE930-5E81-4976-884A-E79FEB8EAB31}"/>
               </a:ext>
             </a:extLst>
           </p:cNvPr>
@@ -3850,7 +3851,7 @@
           <p:cNvPr id="28" name="Marcador de contenido 2">
             <a:extLst>
               <a:ext uri="{FF2B5EF4-FFF2-40B4-BE49-F238E27FC236}">
-                <a16:creationId xmlns:a16="http://schemas.microsoft.com/office/drawing/2014/main" xmlns="" id="{607AE930-5E81-4976-884A-E79FEB8EAB31}"/>
+                <a16:creationId xmlns="" xmlns:a16="http://schemas.microsoft.com/office/drawing/2014/main" id="{607AE930-5E81-4976-884A-E79FEB8EAB31}"/>
               </a:ext>
             </a:extLst>
           </p:cNvPr>
@@ -4059,7 +4060,7 @@
           <p:cNvPr id="33" name="Marcador de contenido 2">
             <a:extLst>
               <a:ext uri="{FF2B5EF4-FFF2-40B4-BE49-F238E27FC236}">
-                <a16:creationId xmlns:a16="http://schemas.microsoft.com/office/drawing/2014/main" xmlns="" id="{607AE930-5E81-4976-884A-E79FEB8EAB31}"/>
+                <a16:creationId xmlns="" xmlns:a16="http://schemas.microsoft.com/office/drawing/2014/main" id="{607AE930-5E81-4976-884A-E79FEB8EAB31}"/>
               </a:ext>
             </a:extLst>
           </p:cNvPr>
@@ -4499,7 +4500,7 @@
           <p:cNvPr id="56" name="Marcador de contenido 2">
             <a:extLst>
               <a:ext uri="{FF2B5EF4-FFF2-40B4-BE49-F238E27FC236}">
-                <a16:creationId xmlns:a16="http://schemas.microsoft.com/office/drawing/2014/main" xmlns="" id="{607AE930-5E81-4976-884A-E79FEB8EAB31}"/>
+                <a16:creationId xmlns="" xmlns:a16="http://schemas.microsoft.com/office/drawing/2014/main" id="{607AE930-5E81-4976-884A-E79FEB8EAB31}"/>
               </a:ext>
             </a:extLst>
           </p:cNvPr>
@@ -4751,7 +4752,7 @@
           <p:cNvPr id="58" name="Marcador de contenido 2">
             <a:extLst>
               <a:ext uri="{FF2B5EF4-FFF2-40B4-BE49-F238E27FC236}">
-                <a16:creationId xmlns:a16="http://schemas.microsoft.com/office/drawing/2014/main" xmlns="" id="{607AE930-5E81-4976-884A-E79FEB8EAB31}"/>
+                <a16:creationId xmlns="" xmlns:a16="http://schemas.microsoft.com/office/drawing/2014/main" id="{607AE930-5E81-4976-884A-E79FEB8EAB31}"/>
               </a:ext>
             </a:extLst>
           </p:cNvPr>
@@ -4980,7 +4981,11 @@
             <a:pPr algn="ctr"/>
             <a:r>
               <a:rPr lang="es-MX" sz="3200" b="1" dirty="0" smtClean="0"/>
-              <a:t>SNIES, SPADIES, deserción.</a:t>
+              <a:t>SPADIES</a:t>
+            </a:r>
+            <a:r>
+              <a:rPr lang="es-MX" sz="3200" b="1" dirty="0" smtClean="0"/>
+              <a:t>, deserción.</a:t>
             </a:r>
             <a:endParaRPr lang="es-MX" sz="2400" b="1" dirty="0"/>
           </a:p>
@@ -5100,7 +5105,7 @@
           <p:cNvPr id="2" name="Título 1">
             <a:extLst>
               <a:ext uri="{FF2B5EF4-FFF2-40B4-BE49-F238E27FC236}">
-                <a16:creationId xmlns:a16="http://schemas.microsoft.com/office/drawing/2014/main" xmlns="" id="{4D3AF533-AD0F-43F7-AC8D-8A056BA291A3}"/>
+                <a16:creationId xmlns="" xmlns:a16="http://schemas.microsoft.com/office/drawing/2014/main" id="{4D3AF533-AD0F-43F7-AC8D-8A056BA291A3}"/>
               </a:ext>
             </a:extLst>
           </p:cNvPr>
@@ -5181,7 +5186,7 @@
           <p:cNvPr id="7" name="CuadroTexto 6">
             <a:extLst>
               <a:ext uri="{FF2B5EF4-FFF2-40B4-BE49-F238E27FC236}">
-                <a16:creationId xmlns:a16="http://schemas.microsoft.com/office/drawing/2014/main" xmlns="" id="{BC049DBC-6933-4F01-99CD-12D18B825504}"/>
+                <a16:creationId xmlns="" xmlns:a16="http://schemas.microsoft.com/office/drawing/2014/main" id="{BC049DBC-6933-4F01-99CD-12D18B825504}"/>
               </a:ext>
             </a:extLst>
           </p:cNvPr>
@@ -5261,7 +5266,7 @@
           <p:cNvPr id="2" name="Título 1">
             <a:extLst>
               <a:ext uri="{FF2B5EF4-FFF2-40B4-BE49-F238E27FC236}">
-                <a16:creationId xmlns:a16="http://schemas.microsoft.com/office/drawing/2014/main" xmlns="" id="{4D3AF533-AD0F-43F7-AC8D-8A056BA291A3}"/>
+                <a16:creationId xmlns="" xmlns:a16="http://schemas.microsoft.com/office/drawing/2014/main" id="{4D3AF533-AD0F-43F7-AC8D-8A056BA291A3}"/>
               </a:ext>
             </a:extLst>
           </p:cNvPr>
@@ -5401,7 +5406,7 @@
           <p:cNvPr id="8" name="CuadroTexto 7">
             <a:extLst>
               <a:ext uri="{FF2B5EF4-FFF2-40B4-BE49-F238E27FC236}">
-                <a16:creationId xmlns:a16="http://schemas.microsoft.com/office/drawing/2014/main" xmlns="" id="{BC049DBC-6933-4F01-99CD-12D18B825504}"/>
+                <a16:creationId xmlns="" xmlns:a16="http://schemas.microsoft.com/office/drawing/2014/main" id="{BC049DBC-6933-4F01-99CD-12D18B825504}"/>
               </a:ext>
             </a:extLst>
           </p:cNvPr>
@@ -5505,21 +5510,21 @@
                 <a:gridCol w="3856199">
                   <a:extLst>
                     <a:ext uri="{9D8B030D-6E8A-4147-A177-3AD203B41FA5}">
-                      <a16:colId xmlns:a16="http://schemas.microsoft.com/office/drawing/2014/main" xmlns="" val="20000"/>
+                      <a16:colId xmlns="" xmlns:a16="http://schemas.microsoft.com/office/drawing/2014/main" val="20000"/>
                     </a:ext>
                   </a:extLst>
                 </a:gridCol>
                 <a:gridCol w="490123">
                   <a:extLst>
                     <a:ext uri="{9D8B030D-6E8A-4147-A177-3AD203B41FA5}">
-                      <a16:colId xmlns:a16="http://schemas.microsoft.com/office/drawing/2014/main" xmlns="" val="20001"/>
+                      <a16:colId xmlns="" xmlns:a16="http://schemas.microsoft.com/office/drawing/2014/main" val="20001"/>
                     </a:ext>
                   </a:extLst>
                 </a:gridCol>
                 <a:gridCol w="7355510">
                   <a:extLst>
                     <a:ext uri="{9D8B030D-6E8A-4147-A177-3AD203B41FA5}">
-                      <a16:colId xmlns:a16="http://schemas.microsoft.com/office/drawing/2014/main" xmlns="" val="20002"/>
+                      <a16:colId xmlns="" xmlns:a16="http://schemas.microsoft.com/office/drawing/2014/main" val="20002"/>
                     </a:ext>
                   </a:extLst>
                 </a:gridCol>
@@ -5573,7 +5578,7 @@
                 </a:tc>
                 <a:extLst>
                   <a:ext uri="{0D108BD9-81ED-4DB2-BD59-A6C34878D82A}">
-                    <a16:rowId xmlns:a16="http://schemas.microsoft.com/office/drawing/2014/main" xmlns="" val="10000"/>
+                    <a16:rowId xmlns="" xmlns:a16="http://schemas.microsoft.com/office/drawing/2014/main" val="10000"/>
                   </a:ext>
                 </a:extLst>
               </a:tr>
@@ -5654,7 +5659,7 @@
                 </a:tc>
                 <a:extLst>
                   <a:ext uri="{0D108BD9-81ED-4DB2-BD59-A6C34878D82A}">
-                    <a16:rowId xmlns:a16="http://schemas.microsoft.com/office/drawing/2014/main" xmlns="" val="10001"/>
+                    <a16:rowId xmlns="" xmlns:a16="http://schemas.microsoft.com/office/drawing/2014/main" val="10001"/>
                   </a:ext>
                 </a:extLst>
               </a:tr>
@@ -5713,7 +5718,7 @@
                 </a:tc>
                 <a:extLst>
                   <a:ext uri="{0D108BD9-81ED-4DB2-BD59-A6C34878D82A}">
-                    <a16:rowId xmlns:a16="http://schemas.microsoft.com/office/drawing/2014/main" xmlns="" val="10002"/>
+                    <a16:rowId xmlns="" xmlns:a16="http://schemas.microsoft.com/office/drawing/2014/main" val="10002"/>
                   </a:ext>
                 </a:extLst>
               </a:tr>
@@ -5794,7 +5799,7 @@
                 </a:tc>
                 <a:extLst>
                   <a:ext uri="{0D108BD9-81ED-4DB2-BD59-A6C34878D82A}">
-                    <a16:rowId xmlns:a16="http://schemas.microsoft.com/office/drawing/2014/main" xmlns="" val="10003"/>
+                    <a16:rowId xmlns="" xmlns:a16="http://schemas.microsoft.com/office/drawing/2014/main" val="10003"/>
                   </a:ext>
                 </a:extLst>
               </a:tr>
@@ -5875,7 +5880,7 @@
                 </a:tc>
                 <a:extLst>
                   <a:ext uri="{0D108BD9-81ED-4DB2-BD59-A6C34878D82A}">
-                    <a16:rowId xmlns:a16="http://schemas.microsoft.com/office/drawing/2014/main" xmlns="" val="10004"/>
+                    <a16:rowId xmlns="" xmlns:a16="http://schemas.microsoft.com/office/drawing/2014/main" val="10004"/>
                   </a:ext>
                 </a:extLst>
               </a:tr>
@@ -5934,7 +5939,7 @@
                 </a:tc>
                 <a:extLst>
                   <a:ext uri="{0D108BD9-81ED-4DB2-BD59-A6C34878D82A}">
-                    <a16:rowId xmlns:a16="http://schemas.microsoft.com/office/drawing/2014/main" xmlns="" val="10005"/>
+                    <a16:rowId xmlns="" xmlns:a16="http://schemas.microsoft.com/office/drawing/2014/main" val="10005"/>
                   </a:ext>
                 </a:extLst>
               </a:tr>
@@ -5993,7 +5998,7 @@
                 </a:tc>
                 <a:extLst>
                   <a:ext uri="{0D108BD9-81ED-4DB2-BD59-A6C34878D82A}">
-                    <a16:rowId xmlns:a16="http://schemas.microsoft.com/office/drawing/2014/main" xmlns="" val="10006"/>
+                    <a16:rowId xmlns="" xmlns:a16="http://schemas.microsoft.com/office/drawing/2014/main" val="10006"/>
                   </a:ext>
                 </a:extLst>
               </a:tr>
@@ -6093,7 +6098,7 @@
                 </a:tc>
                 <a:extLst>
                   <a:ext uri="{0D108BD9-81ED-4DB2-BD59-A6C34878D82A}">
-                    <a16:rowId xmlns:a16="http://schemas.microsoft.com/office/drawing/2014/main" xmlns="" val="10007"/>
+                    <a16:rowId xmlns="" xmlns:a16="http://schemas.microsoft.com/office/drawing/2014/main" val="10007"/>
                   </a:ext>
                 </a:extLst>
               </a:tr>
@@ -6106,7 +6111,7 @@
           <p:cNvPr id="6" name="Título 1">
             <a:extLst>
               <a:ext uri="{FF2B5EF4-FFF2-40B4-BE49-F238E27FC236}">
-                <a16:creationId xmlns:a16="http://schemas.microsoft.com/office/drawing/2014/main" xmlns="" id="{4D3AF533-AD0F-43F7-AC8D-8A056BA291A3}"/>
+                <a16:creationId xmlns="" xmlns:a16="http://schemas.microsoft.com/office/drawing/2014/main" id="{4D3AF533-AD0F-43F7-AC8D-8A056BA291A3}"/>
               </a:ext>
             </a:extLst>
           </p:cNvPr>
@@ -6230,7 +6235,7 @@
           <p:cNvPr id="6" name="CuadroTexto 5">
             <a:extLst>
               <a:ext uri="{FF2B5EF4-FFF2-40B4-BE49-F238E27FC236}">
-                <a16:creationId xmlns:a16="http://schemas.microsoft.com/office/drawing/2014/main" xmlns="" id="{BC049DBC-6933-4F01-99CD-12D18B825504}"/>
+                <a16:creationId xmlns="" xmlns:a16="http://schemas.microsoft.com/office/drawing/2014/main" id="{BC049DBC-6933-4F01-99CD-12D18B825504}"/>
               </a:ext>
             </a:extLst>
           </p:cNvPr>
@@ -6273,7 +6278,7 @@
           <p:cNvPr id="10" name="Título 1">
             <a:extLst>
               <a:ext uri="{FF2B5EF4-FFF2-40B4-BE49-F238E27FC236}">
-                <a16:creationId xmlns:a16="http://schemas.microsoft.com/office/drawing/2014/main" xmlns="" id="{4D3AF533-AD0F-43F7-AC8D-8A056BA291A3}"/>
+                <a16:creationId xmlns="" xmlns:a16="http://schemas.microsoft.com/office/drawing/2014/main" id="{4D3AF533-AD0F-43F7-AC8D-8A056BA291A3}"/>
               </a:ext>
             </a:extLst>
           </p:cNvPr>
@@ -6422,7 +6427,7 @@
           <p:cNvPr id="6" name="CuadroTexto 5">
             <a:extLst>
               <a:ext uri="{FF2B5EF4-FFF2-40B4-BE49-F238E27FC236}">
-                <a16:creationId xmlns:a16="http://schemas.microsoft.com/office/drawing/2014/main" xmlns="" id="{BC049DBC-6933-4F01-99CD-12D18B825504}"/>
+                <a16:creationId xmlns="" xmlns:a16="http://schemas.microsoft.com/office/drawing/2014/main" id="{BC049DBC-6933-4F01-99CD-12D18B825504}"/>
               </a:ext>
             </a:extLst>
           </p:cNvPr>
@@ -6465,7 +6470,7 @@
           <p:cNvPr id="10" name="Título 1">
             <a:extLst>
               <a:ext uri="{FF2B5EF4-FFF2-40B4-BE49-F238E27FC236}">
-                <a16:creationId xmlns:a16="http://schemas.microsoft.com/office/drawing/2014/main" xmlns="" id="{4D3AF533-AD0F-43F7-AC8D-8A056BA291A3}"/>
+                <a16:creationId xmlns="" xmlns:a16="http://schemas.microsoft.com/office/drawing/2014/main" id="{4D3AF533-AD0F-43F7-AC8D-8A056BA291A3}"/>
               </a:ext>
             </a:extLst>
           </p:cNvPr>
@@ -6614,7 +6619,7 @@
           <p:cNvPr id="11" name="Título 1">
             <a:extLst>
               <a:ext uri="{FF2B5EF4-FFF2-40B4-BE49-F238E27FC236}">
-                <a16:creationId xmlns:a16="http://schemas.microsoft.com/office/drawing/2014/main" xmlns="" id="{4D3AF533-AD0F-43F7-AC8D-8A056BA291A3}"/>
+                <a16:creationId xmlns="" xmlns:a16="http://schemas.microsoft.com/office/drawing/2014/main" id="{4D3AF533-AD0F-43F7-AC8D-8A056BA291A3}"/>
               </a:ext>
             </a:extLst>
           </p:cNvPr>
@@ -6714,7 +6719,7 @@
           <p:cNvPr id="8" name="CuadroTexto 7">
             <a:extLst>
               <a:ext uri="{FF2B5EF4-FFF2-40B4-BE49-F238E27FC236}">
-                <a16:creationId xmlns:a16="http://schemas.microsoft.com/office/drawing/2014/main" xmlns="" id="{89E46AF4-218E-4E1B-B422-59B657A05EE8}"/>
+                <a16:creationId xmlns="" xmlns:a16="http://schemas.microsoft.com/office/drawing/2014/main" id="{89E46AF4-218E-4E1B-B422-59B657A05EE8}"/>
               </a:ext>
             </a:extLst>
           </p:cNvPr>
@@ -6838,7 +6843,7 @@
           <p:cNvPr id="5" name="CuadroTexto 4">
             <a:extLst>
               <a:ext uri="{FF2B5EF4-FFF2-40B4-BE49-F238E27FC236}">
-                <a16:creationId xmlns:a16="http://schemas.microsoft.com/office/drawing/2014/main" xmlns="" id="{BC049DBC-6933-4F01-99CD-12D18B825504}"/>
+                <a16:creationId xmlns="" xmlns:a16="http://schemas.microsoft.com/office/drawing/2014/main" id="{BC049DBC-6933-4F01-99CD-12D18B825504}"/>
               </a:ext>
             </a:extLst>
           </p:cNvPr>
@@ -6891,7 +6896,7 @@
           <p:cNvPr id="7" name="Título 1">
             <a:extLst>
               <a:ext uri="{FF2B5EF4-FFF2-40B4-BE49-F238E27FC236}">
-                <a16:creationId xmlns:a16="http://schemas.microsoft.com/office/drawing/2014/main" xmlns="" id="{4D3AF533-AD0F-43F7-AC8D-8A056BA291A3}"/>
+                <a16:creationId xmlns="" xmlns:a16="http://schemas.microsoft.com/office/drawing/2014/main" id="{4D3AF533-AD0F-43F7-AC8D-8A056BA291A3}"/>
               </a:ext>
             </a:extLst>
           </p:cNvPr>
@@ -7014,21 +7019,21 @@
                 <a:gridCol w="4847574">
                   <a:extLst>
                     <a:ext uri="{9D8B030D-6E8A-4147-A177-3AD203B41FA5}">
-                      <a16:colId xmlns:a16="http://schemas.microsoft.com/office/drawing/2014/main" xmlns="" val="20000"/>
+                      <a16:colId xmlns="" xmlns:a16="http://schemas.microsoft.com/office/drawing/2014/main" val="20000"/>
                     </a:ext>
                   </a:extLst>
                 </a:gridCol>
                 <a:gridCol w="2918564">
                   <a:extLst>
                     <a:ext uri="{9D8B030D-6E8A-4147-A177-3AD203B41FA5}">
-                      <a16:colId xmlns:a16="http://schemas.microsoft.com/office/drawing/2014/main" xmlns="" val="20001"/>
+                      <a16:colId xmlns="" xmlns:a16="http://schemas.microsoft.com/office/drawing/2014/main" val="20001"/>
                     </a:ext>
                   </a:extLst>
                 </a:gridCol>
                 <a:gridCol w="4208745">
                   <a:extLst>
                     <a:ext uri="{9D8B030D-6E8A-4147-A177-3AD203B41FA5}">
-                      <a16:colId xmlns:a16="http://schemas.microsoft.com/office/drawing/2014/main" xmlns="" val="20002"/>
+                      <a16:colId xmlns="" xmlns:a16="http://schemas.microsoft.com/office/drawing/2014/main" val="20002"/>
                     </a:ext>
                   </a:extLst>
                 </a:gridCol>
@@ -7105,7 +7110,7 @@
                 </a:tc>
                 <a:extLst>
                   <a:ext uri="{0D108BD9-81ED-4DB2-BD59-A6C34878D82A}">
-                    <a16:rowId xmlns:a16="http://schemas.microsoft.com/office/drawing/2014/main" xmlns="" val="10000"/>
+                    <a16:rowId xmlns="" xmlns:a16="http://schemas.microsoft.com/office/drawing/2014/main" val="10000"/>
                   </a:ext>
                 </a:extLst>
               </a:tr>
@@ -7187,7 +7192,7 @@
                 </a:tc>
                 <a:extLst>
                   <a:ext uri="{0D108BD9-81ED-4DB2-BD59-A6C34878D82A}">
-                    <a16:rowId xmlns:a16="http://schemas.microsoft.com/office/drawing/2014/main" xmlns="" val="10001"/>
+                    <a16:rowId xmlns="" xmlns:a16="http://schemas.microsoft.com/office/drawing/2014/main" val="10001"/>
                   </a:ext>
                 </a:extLst>
               </a:tr>
@@ -7269,7 +7274,7 @@
                 </a:tc>
                 <a:extLst>
                   <a:ext uri="{0D108BD9-81ED-4DB2-BD59-A6C34878D82A}">
-                    <a16:rowId xmlns:a16="http://schemas.microsoft.com/office/drawing/2014/main" xmlns="" val="10002"/>
+                    <a16:rowId xmlns="" xmlns:a16="http://schemas.microsoft.com/office/drawing/2014/main" val="10002"/>
                   </a:ext>
                 </a:extLst>
               </a:tr>
@@ -7351,7 +7356,7 @@
                 </a:tc>
                 <a:extLst>
                   <a:ext uri="{0D108BD9-81ED-4DB2-BD59-A6C34878D82A}">
-                    <a16:rowId xmlns:a16="http://schemas.microsoft.com/office/drawing/2014/main" xmlns="" val="10003"/>
+                    <a16:rowId xmlns="" xmlns:a16="http://schemas.microsoft.com/office/drawing/2014/main" val="10003"/>
                   </a:ext>
                 </a:extLst>
               </a:tr>
@@ -7445,7 +7450,7 @@
                 </a:tc>
                 <a:extLst>
                   <a:ext uri="{0D108BD9-81ED-4DB2-BD59-A6C34878D82A}">
-                    <a16:rowId xmlns:a16="http://schemas.microsoft.com/office/drawing/2014/main" xmlns="" val="10004"/>
+                    <a16:rowId xmlns="" xmlns:a16="http://schemas.microsoft.com/office/drawing/2014/main" val="10004"/>
                   </a:ext>
                 </a:extLst>
               </a:tr>
@@ -7527,7 +7532,7 @@
                 </a:tc>
                 <a:extLst>
                   <a:ext uri="{0D108BD9-81ED-4DB2-BD59-A6C34878D82A}">
-                    <a16:rowId xmlns:a16="http://schemas.microsoft.com/office/drawing/2014/main" xmlns="" val="10005"/>
+                    <a16:rowId xmlns="" xmlns:a16="http://schemas.microsoft.com/office/drawing/2014/main" val="10005"/>
                   </a:ext>
                 </a:extLst>
               </a:tr>
@@ -7609,7 +7614,7 @@
                 </a:tc>
                 <a:extLst>
                   <a:ext uri="{0D108BD9-81ED-4DB2-BD59-A6C34878D82A}">
-                    <a16:rowId xmlns:a16="http://schemas.microsoft.com/office/drawing/2014/main" xmlns="" val="10006"/>
+                    <a16:rowId xmlns="" xmlns:a16="http://schemas.microsoft.com/office/drawing/2014/main" val="10006"/>
                   </a:ext>
                 </a:extLst>
               </a:tr>
@@ -7679,7 +7684,7 @@
                 </a:tc>
                 <a:extLst>
                   <a:ext uri="{0D108BD9-81ED-4DB2-BD59-A6C34878D82A}">
-                    <a16:rowId xmlns:a16="http://schemas.microsoft.com/office/drawing/2014/main" xmlns="" val="10007"/>
+                    <a16:rowId xmlns="" xmlns:a16="http://schemas.microsoft.com/office/drawing/2014/main" val="10007"/>
                   </a:ext>
                 </a:extLst>
               </a:tr>
@@ -8490,7 +8495,7 @@
           <p:cNvPr id="25" name="Título 1">
             <a:extLst>
               <a:ext uri="{FF2B5EF4-FFF2-40B4-BE49-F238E27FC236}">
-                <a16:creationId xmlns:a16="http://schemas.microsoft.com/office/drawing/2014/main" xmlns="" id="{4D3AF533-AD0F-43F7-AC8D-8A056BA291A3}"/>
+                <a16:creationId xmlns="" xmlns:a16="http://schemas.microsoft.com/office/drawing/2014/main" id="{4D3AF533-AD0F-43F7-AC8D-8A056BA291A3}"/>
               </a:ext>
             </a:extLst>
           </p:cNvPr>
@@ -8627,7 +8632,7 @@
           <p:cNvPr id="2" name="Título 1">
             <a:extLst>
               <a:ext uri="{FF2B5EF4-FFF2-40B4-BE49-F238E27FC236}">
-                <a16:creationId xmlns:a16="http://schemas.microsoft.com/office/drawing/2014/main" xmlns="" id="{66349900-D031-47AB-BEDC-4E081B677983}"/>
+                <a16:creationId xmlns="" xmlns:a16="http://schemas.microsoft.com/office/drawing/2014/main" id="{66349900-D031-47AB-BEDC-4E081B677983}"/>
               </a:ext>
             </a:extLst>
           </p:cNvPr>
@@ -8702,7 +8707,7 @@
           <p:cNvPr id="4" name="CuadroTexto 3">
             <a:extLst>
               <a:ext uri="{FF2B5EF4-FFF2-40B4-BE49-F238E27FC236}">
-                <a16:creationId xmlns:a16="http://schemas.microsoft.com/office/drawing/2014/main" xmlns="" id="{89E46AF4-218E-4E1B-B422-59B657A05EE8}"/>
+                <a16:creationId xmlns="" xmlns:a16="http://schemas.microsoft.com/office/drawing/2014/main" id="{89E46AF4-218E-4E1B-B422-59B657A05EE8}"/>
               </a:ext>
             </a:extLst>
           </p:cNvPr>
@@ -8826,7 +8831,7 @@
           <p:cNvPr id="5" name="Título 1">
             <a:extLst>
               <a:ext uri="{FF2B5EF4-FFF2-40B4-BE49-F238E27FC236}">
-                <a16:creationId xmlns:a16="http://schemas.microsoft.com/office/drawing/2014/main" xmlns="" id="{F194AB6A-55E1-4B44-A983-8BC6AA65E29D}"/>
+                <a16:creationId xmlns="" xmlns:a16="http://schemas.microsoft.com/office/drawing/2014/main" id="{F194AB6A-55E1-4B44-A983-8BC6AA65E29D}"/>
               </a:ext>
             </a:extLst>
           </p:cNvPr>
@@ -8869,7 +8874,7 @@
           <p:cNvPr id="7" name="Título 1">
             <a:extLst>
               <a:ext uri="{FF2B5EF4-FFF2-40B4-BE49-F238E27FC236}">
-                <a16:creationId xmlns:a16="http://schemas.microsoft.com/office/drawing/2014/main" xmlns="" id="{F194AB6A-55E1-4B44-A983-8BC6AA65E29D}"/>
+                <a16:creationId xmlns="" xmlns:a16="http://schemas.microsoft.com/office/drawing/2014/main" id="{F194AB6A-55E1-4B44-A983-8BC6AA65E29D}"/>
               </a:ext>
             </a:extLst>
           </p:cNvPr>
@@ -9059,7 +9064,7 @@
           <p:cNvPr id="9" name="Título 1">
             <a:extLst>
               <a:ext uri="{FF2B5EF4-FFF2-40B4-BE49-F238E27FC236}">
-                <a16:creationId xmlns:a16="http://schemas.microsoft.com/office/drawing/2014/main" xmlns="" id="{66349900-D031-47AB-BEDC-4E081B677983}"/>
+                <a16:creationId xmlns="" xmlns:a16="http://schemas.microsoft.com/office/drawing/2014/main" id="{66349900-D031-47AB-BEDC-4E081B677983}"/>
               </a:ext>
             </a:extLst>
           </p:cNvPr>
@@ -9104,7 +9109,7 @@
           <p:cNvPr id="4" name="CuadroTexto 3">
             <a:extLst>
               <a:ext uri="{FF2B5EF4-FFF2-40B4-BE49-F238E27FC236}">
-                <a16:creationId xmlns:a16="http://schemas.microsoft.com/office/drawing/2014/main" xmlns="" id="{89E46AF4-218E-4E1B-B422-59B657A05EE8}"/>
+                <a16:creationId xmlns="" xmlns:a16="http://schemas.microsoft.com/office/drawing/2014/main" id="{89E46AF4-218E-4E1B-B422-59B657A05EE8}"/>
               </a:ext>
             </a:extLst>
           </p:cNvPr>
@@ -9193,41 +9198,12 @@
           <a:chExt cx="0" cy="0"/>
         </a:xfrm>
       </p:grpSpPr>
-      <p:pic>
-        <p:nvPicPr>
-          <p:cNvPr id="2" name="Imagen 1"/>
-          <p:cNvPicPr>
-            <a:picLocks noChangeAspect="1"/>
-          </p:cNvPicPr>
-          <p:nvPr/>
-        </p:nvPicPr>
-        <p:blipFill rotWithShape="1">
-          <a:blip r:embed="rId2">
-            <a:extLst>
-              <a:ext uri="{28A0092B-C50C-407E-A947-70E740481C1C}">
-                <a14:useLocalDpi xmlns:a14="http://schemas.microsoft.com/office/drawing/2010/main" val="0"/>
-              </a:ext>
-            </a:extLst>
-          </a:blip>
-          <a:srcRect t="-4505" b="4505"/>
-          <a:stretch/>
-        </p:blipFill>
-        <p:spPr>
-          <a:xfrm>
-            <a:off x="0" y="1030513"/>
-            <a:ext cx="10197942" cy="5733542"/>
-          </a:xfrm>
-          <a:prstGeom prst="rect">
-            <a:avLst/>
-          </a:prstGeom>
-        </p:spPr>
-      </p:pic>
       <p:sp>
         <p:nvSpPr>
           <p:cNvPr id="4" name="CuadroTexto 3">
             <a:extLst>
               <a:ext uri="{FF2B5EF4-FFF2-40B4-BE49-F238E27FC236}">
-                <a16:creationId xmlns:a16="http://schemas.microsoft.com/office/drawing/2014/main" xmlns="" id="{89E46AF4-218E-4E1B-B422-59B657A05EE8}"/>
+                <a16:creationId xmlns="" xmlns:a16="http://schemas.microsoft.com/office/drawing/2014/main" id="{89E46AF4-218E-4E1B-B422-59B657A05EE8}"/>
               </a:ext>
             </a:extLst>
           </p:cNvPr>
@@ -9284,7 +9260,7 @@
           <p:cNvPr id="6" name="Título 1">
             <a:extLst>
               <a:ext uri="{FF2B5EF4-FFF2-40B4-BE49-F238E27FC236}">
-                <a16:creationId xmlns:a16="http://schemas.microsoft.com/office/drawing/2014/main" xmlns="" id="{66349900-D031-47AB-BEDC-4E081B677983}"/>
+                <a16:creationId xmlns="" xmlns:a16="http://schemas.microsoft.com/office/drawing/2014/main" id="{66349900-D031-47AB-BEDC-4E081B677983}"/>
               </a:ext>
             </a:extLst>
           </p:cNvPr>
@@ -9324,6 +9300,36 @@
           </a:p>
         </p:txBody>
       </p:sp>
+      <p:pic>
+        <p:nvPicPr>
+          <p:cNvPr id="3" name="Imagen 2"/>
+          <p:cNvPicPr>
+            <a:picLocks noChangeAspect="1"/>
+          </p:cNvPicPr>
+          <p:nvPr/>
+        </p:nvPicPr>
+        <p:blipFill>
+          <a:blip r:embed="rId2">
+            <a:extLst>
+              <a:ext uri="{28A0092B-C50C-407E-A947-70E740481C1C}">
+                <a14:useLocalDpi xmlns:a14="http://schemas.microsoft.com/office/drawing/2010/main" val="0"/>
+              </a:ext>
+            </a:extLst>
+          </a:blip>
+          <a:stretch>
+            <a:fillRect/>
+          </a:stretch>
+        </p:blipFill>
+        <p:spPr>
+          <a:xfrm>
+            <a:off x="-1" y="1289405"/>
+            <a:ext cx="10255841" cy="5449598"/>
+          </a:xfrm>
+          <a:prstGeom prst="rect">
+            <a:avLst/>
+          </a:prstGeom>
+        </p:spPr>
+      </p:pic>
     </p:spTree>
     <p:extLst>
       <p:ext uri="{BB962C8B-B14F-4D97-AF65-F5344CB8AC3E}">
@@ -9361,41 +9367,69 @@
           <a:chExt cx="0" cy="0"/>
         </a:xfrm>
       </p:grpSpPr>
-      <p:pic>
-        <p:nvPicPr>
-          <p:cNvPr id="8" name="Imagen 7"/>
-          <p:cNvPicPr>
-            <a:picLocks noChangeAspect="1"/>
-          </p:cNvPicPr>
-          <p:nvPr/>
-        </p:nvPicPr>
-        <p:blipFill rotWithShape="1">
-          <a:blip r:embed="rId2">
+      <p:sp>
+        <p:nvSpPr>
+          <p:cNvPr id="4" name="CuadroTexto 3">
             <a:extLst>
-              <a:ext uri="{28A0092B-C50C-407E-A947-70E740481C1C}">
-                <a14:useLocalDpi xmlns:a14="http://schemas.microsoft.com/office/drawing/2010/main" val="0"/>
+              <a:ext uri="{FF2B5EF4-FFF2-40B4-BE49-F238E27FC236}">
+                <a16:creationId xmlns="" xmlns:a16="http://schemas.microsoft.com/office/drawing/2014/main" id="{89E46AF4-218E-4E1B-B422-59B657A05EE8}"/>
               </a:ext>
             </a:extLst>
-          </a:blip>
-          <a:srcRect l="14697" t="22165" r="26447" b="4764"/>
-          <a:stretch/>
-        </p:blipFill>
+          </p:cNvPr>
+          <p:cNvSpPr txBox="1"/>
+          <p:nvPr/>
+        </p:nvSpPr>
         <p:spPr>
           <a:xfrm>
-            <a:off x="6475956" y="1345446"/>
-            <a:ext cx="3582444" cy="5512554"/>
+            <a:off x="10044484" y="1565274"/>
+            <a:ext cx="2155606" cy="461665"/>
           </a:xfrm>
           <a:prstGeom prst="rect">
             <a:avLst/>
           </a:prstGeom>
-        </p:spPr>
-      </p:pic>
-      <p:sp>
-        <p:nvSpPr>
-          <p:cNvPr id="13" name="Título 1">
+          <a:noFill/>
+        </p:spPr>
+        <p:txBody>
+          <a:bodyPr wrap="square" rtlCol="0">
+            <a:spAutoFit/>
+          </a:bodyPr>
+          <a:lstStyle/>
+          <a:p>
+            <a:pPr algn="just"/>
+            <a:r>
+              <a:rPr lang="es-MX" sz="2400" b="1" i="1" dirty="0" smtClean="0">
+                <a:latin typeface="Times New Roman" panose="02020603050405020304" pitchFamily="18" charset="0"/>
+                <a:cs typeface="Times New Roman" panose="02020603050405020304" pitchFamily="18" charset="0"/>
+              </a:rPr>
+              <a:t>Fuente</a:t>
+            </a:r>
+            <a:r>
+              <a:rPr lang="es-MX" sz="2400" b="1" i="1" dirty="0">
+                <a:latin typeface="Times New Roman" panose="02020603050405020304" pitchFamily="18" charset="0"/>
+                <a:cs typeface="Times New Roman" panose="02020603050405020304" pitchFamily="18" charset="0"/>
+              </a:rPr>
+              <a:t>:</a:t>
+            </a:r>
+            <a:r>
+              <a:rPr lang="es-MX" sz="2400" b="1" i="1" dirty="0" smtClean="0">
+                <a:latin typeface="Times New Roman" panose="02020603050405020304" pitchFamily="18" charset="0"/>
+                <a:cs typeface="Times New Roman" panose="02020603050405020304" pitchFamily="18" charset="0"/>
+              </a:rPr>
+              <a:t> propia</a:t>
+            </a:r>
+            <a:endParaRPr lang="es-MX" sz="2400" i="1" dirty="0">
+              <a:latin typeface="Times New Roman" panose="02020603050405020304" pitchFamily="18" charset="0"/>
+              <a:cs typeface="Times New Roman" panose="02020603050405020304" pitchFamily="18" charset="0"/>
+            </a:endParaRPr>
+          </a:p>
+        </p:txBody>
+      </p:sp>
+      <p:sp>
+        <p:nvSpPr>
+          <p:cNvPr id="6" name="Título 1">
             <a:extLst>
               <a:ext uri="{FF2B5EF4-FFF2-40B4-BE49-F238E27FC236}">
-                <a16:creationId xmlns:a16="http://schemas.microsoft.com/office/drawing/2014/main" xmlns="" id="{66349900-D031-47AB-BEDC-4E081B677983}"/>
+                <a16:creationId xmlns="" xmlns:a16="http://schemas.microsoft.com/office/drawing/2014/main" id="{66349900-D031-47AB-BEDC-4E081B677983}"/>
               </a:ext>
             </a:extLst>
           </p:cNvPr>
@@ -9408,8 +9442,8 @@
         </p:nvSpPr>
         <p:spPr>
           <a:xfrm>
-            <a:off x="4559474" y="303892"/>
-            <a:ext cx="7632525" cy="726621"/>
+            <a:off x="4496844" y="303892"/>
+            <a:ext cx="7695155" cy="726621"/>
           </a:xfrm>
         </p:spPr>
         <p:txBody>
@@ -9437,14 +9471,14 @@
       </p:sp>
       <p:pic>
         <p:nvPicPr>
-          <p:cNvPr id="2" name="Imagen 1"/>
+          <p:cNvPr id="3" name="Imagen 2"/>
           <p:cNvPicPr>
             <a:picLocks noChangeAspect="1"/>
           </p:cNvPicPr>
           <p:nvPr/>
         </p:nvPicPr>
         <p:blipFill>
-          <a:blip r:embed="rId3">
+          <a:blip r:embed="rId2">
             <a:extLst>
               <a:ext uri="{28A0092B-C50C-407E-A947-70E740481C1C}">
                 <a14:useLocalDpi xmlns:a14="http://schemas.microsoft.com/office/drawing/2010/main" val="0"/>
@@ -9457,8 +9491,8 @@
         </p:blipFill>
         <p:spPr>
           <a:xfrm>
-            <a:off x="1831949" y="1345446"/>
-            <a:ext cx="4205595" cy="5557393"/>
+            <a:off x="876819" y="1299706"/>
+            <a:ext cx="9152879" cy="5558294"/>
           </a:xfrm>
           <a:prstGeom prst="rect">
             <a:avLst/>
@@ -9468,7 +9502,7 @@
     </p:spTree>
     <p:extLst>
       <p:ext uri="{BB962C8B-B14F-4D97-AF65-F5344CB8AC3E}">
-        <p14:creationId xmlns:p14="http://schemas.microsoft.com/office/powerpoint/2010/main" val="3318710930"/>
+        <p14:creationId xmlns:p14="http://schemas.microsoft.com/office/powerpoint/2010/main" val="2378389566"/>
       </p:ext>
     </p:extLst>
   </p:cSld>
@@ -9518,13 +9552,13 @@
               </a:ext>
             </a:extLst>
           </a:blip>
-          <a:srcRect r="235" b="3996"/>
+          <a:srcRect l="14697" t="22165" r="26447" b="4764"/>
           <a:stretch/>
         </p:blipFill>
         <p:spPr>
           <a:xfrm>
-            <a:off x="0" y="1283918"/>
-            <a:ext cx="10059526" cy="5442559"/>
+            <a:off x="6475956" y="1345446"/>
+            <a:ext cx="3582444" cy="5512554"/>
           </a:xfrm>
           <a:prstGeom prst="rect">
             <a:avLst/>
@@ -9533,10 +9567,10 @@
       </p:pic>
       <p:sp>
         <p:nvSpPr>
-          <p:cNvPr id="11" name="Título 1">
+          <p:cNvPr id="13" name="Título 1">
             <a:extLst>
               <a:ext uri="{FF2B5EF4-FFF2-40B4-BE49-F238E27FC236}">
-                <a16:creationId xmlns:a16="http://schemas.microsoft.com/office/drawing/2014/main" xmlns="" id="{66349900-D031-47AB-BEDC-4E081B677983}"/>
+                <a16:creationId xmlns="" xmlns:a16="http://schemas.microsoft.com/office/drawing/2014/main" id="{66349900-D031-47AB-BEDC-4E081B677983}"/>
               </a:ext>
             </a:extLst>
           </p:cNvPr>
@@ -9549,8 +9583,8 @@
         </p:nvSpPr>
         <p:spPr>
           <a:xfrm>
-            <a:off x="4107542" y="303892"/>
-            <a:ext cx="8084457" cy="726621"/>
+            <a:off x="4559474" y="303892"/>
+            <a:ext cx="7632525" cy="726621"/>
           </a:xfrm>
         </p:spPr>
         <p:txBody>
@@ -9566,23 +9600,7 @@
                   <a:schemeClr val="bg1"/>
                 </a:solidFill>
               </a:rPr>
-              <a:t>Etapa </a:t>
-            </a:r>
-            <a:r>
-              <a:rPr lang="es-MX" b="1" dirty="0">
-                <a:solidFill>
-                  <a:schemeClr val="bg1"/>
-                </a:solidFill>
-              </a:rPr>
-              <a:t>4</a:t>
-            </a:r>
-            <a:r>
-              <a:rPr lang="es-MX" b="1" dirty="0" smtClean="0">
-                <a:solidFill>
-                  <a:schemeClr val="bg1"/>
-                </a:solidFill>
-              </a:rPr>
-              <a:t> - Pruebas - Estudiantes</a:t>
+              <a:t>Etapa 4 - Pruebas - Administrador</a:t>
             </a:r>
             <a:endParaRPr lang="es-MX" b="1" dirty="0">
               <a:solidFill>
@@ -9592,12 +9610,169 @@
           </a:p>
         </p:txBody>
       </p:sp>
+      <p:pic>
+        <p:nvPicPr>
+          <p:cNvPr id="2" name="Imagen 1"/>
+          <p:cNvPicPr>
+            <a:picLocks noChangeAspect="1"/>
+          </p:cNvPicPr>
+          <p:nvPr/>
+        </p:nvPicPr>
+        <p:blipFill>
+          <a:blip r:embed="rId3">
+            <a:extLst>
+              <a:ext uri="{28A0092B-C50C-407E-A947-70E740481C1C}">
+                <a14:useLocalDpi xmlns:a14="http://schemas.microsoft.com/office/drawing/2010/main" val="0"/>
+              </a:ext>
+            </a:extLst>
+          </a:blip>
+          <a:stretch>
+            <a:fillRect/>
+          </a:stretch>
+        </p:blipFill>
+        <p:spPr>
+          <a:xfrm>
+            <a:off x="1831949" y="1345446"/>
+            <a:ext cx="4205595" cy="5557393"/>
+          </a:xfrm>
+          <a:prstGeom prst="rect">
+            <a:avLst/>
+          </a:prstGeom>
+        </p:spPr>
+      </p:pic>
+    </p:spTree>
+    <p:extLst>
+      <p:ext uri="{BB962C8B-B14F-4D97-AF65-F5344CB8AC3E}">
+        <p14:creationId xmlns:p14="http://schemas.microsoft.com/office/powerpoint/2010/main" val="3318710930"/>
+      </p:ext>
+    </p:extLst>
+  </p:cSld>
+  <p:clrMapOvr>
+    <a:masterClrMapping/>
+  </p:clrMapOvr>
+  <p:timing>
+    <p:tnLst>
+      <p:par>
+        <p:cTn id="1" dur="indefinite" restart="never" nodeType="tmRoot"/>
+      </p:par>
+    </p:tnLst>
+  </p:timing>
+</p:sld>
+</file>
+
+<file path=ppt/slides/slide24.xml><?xml version="1.0" encoding="utf-8"?>
+<p:sld xmlns:a="http://schemas.openxmlformats.org/drawingml/2006/main" xmlns:r="http://schemas.openxmlformats.org/officeDocument/2006/relationships" xmlns:p="http://schemas.openxmlformats.org/presentationml/2006/main">
+  <p:cSld>
+    <p:spTree>
+      <p:nvGrpSpPr>
+        <p:cNvPr id="1" name=""/>
+        <p:cNvGrpSpPr/>
+        <p:nvPr/>
+      </p:nvGrpSpPr>
+      <p:grpSpPr>
+        <a:xfrm>
+          <a:off x="0" y="0"/>
+          <a:ext cx="0" cy="0"/>
+          <a:chOff x="0" y="0"/>
+          <a:chExt cx="0" cy="0"/>
+        </a:xfrm>
+      </p:grpSpPr>
+      <p:pic>
+        <p:nvPicPr>
+          <p:cNvPr id="8" name="Imagen 7"/>
+          <p:cNvPicPr>
+            <a:picLocks noChangeAspect="1"/>
+          </p:cNvPicPr>
+          <p:nvPr/>
+        </p:nvPicPr>
+        <p:blipFill rotWithShape="1">
+          <a:blip r:embed="rId2">
+            <a:extLst>
+              <a:ext uri="{28A0092B-C50C-407E-A947-70E740481C1C}">
+                <a14:useLocalDpi xmlns:a14="http://schemas.microsoft.com/office/drawing/2010/main" val="0"/>
+              </a:ext>
+            </a:extLst>
+          </a:blip>
+          <a:srcRect r="235" b="3996"/>
+          <a:stretch/>
+        </p:blipFill>
+        <p:spPr>
+          <a:xfrm>
+            <a:off x="0" y="1283918"/>
+            <a:ext cx="10059526" cy="5442559"/>
+          </a:xfrm>
+          <a:prstGeom prst="rect">
+            <a:avLst/>
+          </a:prstGeom>
+        </p:spPr>
+      </p:pic>
+      <p:sp>
+        <p:nvSpPr>
+          <p:cNvPr id="11" name="Título 1">
+            <a:extLst>
+              <a:ext uri="{FF2B5EF4-FFF2-40B4-BE49-F238E27FC236}">
+                <a16:creationId xmlns="" xmlns:a16="http://schemas.microsoft.com/office/drawing/2014/main" id="{66349900-D031-47AB-BEDC-4E081B677983}"/>
+              </a:ext>
+            </a:extLst>
+          </p:cNvPr>
+          <p:cNvSpPr>
+            <a:spLocks noGrp="1"/>
+          </p:cNvSpPr>
+          <p:nvPr>
+            <p:ph type="title"/>
+          </p:nvPr>
+        </p:nvSpPr>
+        <p:spPr>
+          <a:xfrm>
+            <a:off x="4107542" y="303892"/>
+            <a:ext cx="8084457" cy="726621"/>
+          </a:xfrm>
+        </p:spPr>
+        <p:txBody>
+          <a:bodyPr>
+            <a:normAutofit/>
+          </a:bodyPr>
+          <a:lstStyle/>
+          <a:p>
+            <a:pPr algn="r"/>
+            <a:r>
+              <a:rPr lang="es-MX" b="1" dirty="0" smtClean="0">
+                <a:solidFill>
+                  <a:schemeClr val="bg1"/>
+                </a:solidFill>
+              </a:rPr>
+              <a:t>Etapa </a:t>
+            </a:r>
+            <a:r>
+              <a:rPr lang="es-MX" b="1" dirty="0">
+                <a:solidFill>
+                  <a:schemeClr val="bg1"/>
+                </a:solidFill>
+              </a:rPr>
+              <a:t>4</a:t>
+            </a:r>
+            <a:r>
+              <a:rPr lang="es-MX" b="1" dirty="0" smtClean="0">
+                <a:solidFill>
+                  <a:schemeClr val="bg1"/>
+                </a:solidFill>
+              </a:rPr>
+              <a:t> - Pruebas - Estudiantes</a:t>
+            </a:r>
+            <a:endParaRPr lang="es-MX" b="1" dirty="0">
+              <a:solidFill>
+                <a:schemeClr val="bg1"/>
+              </a:solidFill>
+            </a:endParaRPr>
+          </a:p>
+        </p:txBody>
+      </p:sp>
       <p:sp>
         <p:nvSpPr>
           <p:cNvPr id="5" name="CuadroTexto 4">
             <a:extLst>
               <a:ext uri="{FF2B5EF4-FFF2-40B4-BE49-F238E27FC236}">
-                <a16:creationId xmlns:a16="http://schemas.microsoft.com/office/drawing/2014/main" xmlns="" id="{89E46AF4-218E-4E1B-B422-59B657A05EE8}"/>
+                <a16:creationId xmlns="" xmlns:a16="http://schemas.microsoft.com/office/drawing/2014/main" id="{89E46AF4-218E-4E1B-B422-59B657A05EE8}"/>
               </a:ext>
             </a:extLst>
           </p:cNvPr>
@@ -9669,7 +9844,7 @@
 </p:sld>
 </file>
 
-<file path=ppt/slides/slide24.xml><?xml version="1.0" encoding="utf-8"?>
+<file path=ppt/slides/slide25.xml><?xml version="1.0" encoding="utf-8"?>
 <p:sld xmlns:a="http://schemas.openxmlformats.org/drawingml/2006/main" xmlns:r="http://schemas.openxmlformats.org/officeDocument/2006/relationships" xmlns:p="http://schemas.openxmlformats.org/presentationml/2006/main">
   <p:cSld>
     <p:spTree>
@@ -9720,7 +9895,7 @@
           <p:cNvPr id="10" name="Título 1">
             <a:extLst>
               <a:ext uri="{FF2B5EF4-FFF2-40B4-BE49-F238E27FC236}">
-                <a16:creationId xmlns:a16="http://schemas.microsoft.com/office/drawing/2014/main" xmlns="" id="{66349900-D031-47AB-BEDC-4E081B677983}"/>
+                <a16:creationId xmlns="" xmlns:a16="http://schemas.microsoft.com/office/drawing/2014/main" id="{66349900-D031-47AB-BEDC-4E081B677983}"/>
               </a:ext>
             </a:extLst>
           </p:cNvPr>
@@ -9781,7 +9956,7 @@
           <p:cNvPr id="4" name="CuadroTexto 3">
             <a:extLst>
               <a:ext uri="{FF2B5EF4-FFF2-40B4-BE49-F238E27FC236}">
-                <a16:creationId xmlns:a16="http://schemas.microsoft.com/office/drawing/2014/main" xmlns="" id="{89E46AF4-218E-4E1B-B422-59B657A05EE8}"/>
+                <a16:creationId xmlns="" xmlns:a16="http://schemas.microsoft.com/office/drawing/2014/main" id="{89E46AF4-218E-4E1B-B422-59B657A05EE8}"/>
               </a:ext>
             </a:extLst>
           </p:cNvPr>
@@ -9837,174 +10012,6 @@
     <p:extLst>
       <p:ext uri="{BB962C8B-B14F-4D97-AF65-F5344CB8AC3E}">
         <p14:creationId xmlns:p14="http://schemas.microsoft.com/office/powerpoint/2010/main" val="636550106"/>
-      </p:ext>
-    </p:extLst>
-  </p:cSld>
-  <p:clrMapOvr>
-    <a:masterClrMapping/>
-  </p:clrMapOvr>
-  <p:timing>
-    <p:tnLst>
-      <p:par>
-        <p:cTn id="1" dur="indefinite" restart="never" nodeType="tmRoot"/>
-      </p:par>
-    </p:tnLst>
-  </p:timing>
-</p:sld>
-</file>
-
-<file path=ppt/slides/slide25.xml><?xml version="1.0" encoding="utf-8"?>
-<p:sld xmlns:a="http://schemas.openxmlformats.org/drawingml/2006/main" xmlns:r="http://schemas.openxmlformats.org/officeDocument/2006/relationships" xmlns:p="http://schemas.openxmlformats.org/presentationml/2006/main">
-  <p:cSld>
-    <p:spTree>
-      <p:nvGrpSpPr>
-        <p:cNvPr id="1" name=""/>
-        <p:cNvGrpSpPr/>
-        <p:nvPr/>
-      </p:nvGrpSpPr>
-      <p:grpSpPr>
-        <a:xfrm>
-          <a:off x="0" y="0"/>
-          <a:ext cx="0" cy="0"/>
-          <a:chOff x="0" y="0"/>
-          <a:chExt cx="0" cy="0"/>
-        </a:xfrm>
-      </p:grpSpPr>
-      <p:sp>
-        <p:nvSpPr>
-          <p:cNvPr id="2" name="Título 1">
-            <a:extLst>
-              <a:ext uri="{FF2B5EF4-FFF2-40B4-BE49-F238E27FC236}">
-                <a16:creationId xmlns:a16="http://schemas.microsoft.com/office/drawing/2014/main" xmlns="" id="{F3C1574D-8292-4410-B1E4-1EBE9DF828D1}"/>
-              </a:ext>
-            </a:extLst>
-          </p:cNvPr>
-          <p:cNvSpPr>
-            <a:spLocks noGrp="1"/>
-          </p:cNvSpPr>
-          <p:nvPr>
-            <p:ph type="title"/>
-          </p:nvPr>
-        </p:nvSpPr>
-        <p:spPr>
-          <a:xfrm>
-            <a:off x="4893972" y="0"/>
-            <a:ext cx="7298029" cy="1325563"/>
-          </a:xfrm>
-        </p:spPr>
-        <p:txBody>
-          <a:bodyPr/>
-          <a:lstStyle/>
-          <a:p>
-            <a:pPr algn="r"/>
-            <a:r>
-              <a:rPr lang="es-MX" b="1" dirty="0">
-                <a:solidFill>
-                  <a:schemeClr val="bg1"/>
-                </a:solidFill>
-              </a:rPr>
-              <a:t>Conclusiones</a:t>
-            </a:r>
-            <a:r>
-              <a:rPr lang="es-MX" dirty="0">
-                <a:solidFill>
-                  <a:schemeClr val="bg1"/>
-                </a:solidFill>
-              </a:rPr>
-              <a:t> </a:t>
-            </a:r>
-          </a:p>
-        </p:txBody>
-      </p:sp>
-      <p:sp>
-        <p:nvSpPr>
-          <p:cNvPr id="4" name="Marcador de contenido 2">
-            <a:extLst>
-              <a:ext uri="{FF2B5EF4-FFF2-40B4-BE49-F238E27FC236}">
-                <a16:creationId xmlns:a16="http://schemas.microsoft.com/office/drawing/2014/main" xmlns="" id="{E0439019-967A-48CB-99F3-103D64E7D9BA}"/>
-              </a:ext>
-            </a:extLst>
-          </p:cNvPr>
-          <p:cNvSpPr>
-            <a:spLocks noGrp="1"/>
-          </p:cNvSpPr>
-          <p:nvPr>
-            <p:ph idx="1"/>
-          </p:nvPr>
-        </p:nvSpPr>
-        <p:spPr>
-          <a:xfrm>
-            <a:off x="723900" y="1325563"/>
-            <a:ext cx="10934700" cy="4732337"/>
-          </a:xfrm>
-        </p:spPr>
-        <p:txBody>
-          <a:bodyPr>
-            <a:noAutofit/>
-          </a:bodyPr>
-          <a:lstStyle/>
-          <a:p>
-            <a:pPr algn="just">
-              <a:lnSpc>
-                <a:spcPct val="100000"/>
-              </a:lnSpc>
-              <a:spcBef>
-                <a:spcPts val="0"/>
-              </a:spcBef>
-            </a:pPr>
-            <a:r>
-              <a:rPr lang="es-CO" sz="4000" dirty="0" smtClean="0"/>
-              <a:t>El objetivo general se alcanzó con los siguientes productos desarrollados.</a:t>
-            </a:r>
-          </a:p>
-          <a:p>
-            <a:pPr algn="just">
-              <a:lnSpc>
-                <a:spcPct val="100000"/>
-              </a:lnSpc>
-              <a:spcBef>
-                <a:spcPts val="0"/>
-              </a:spcBef>
-            </a:pPr>
-            <a:r>
-              <a:rPr lang="es-CO" sz="4000" dirty="0" smtClean="0"/>
-              <a:t>Se desarrolló una base de datos MySQL.</a:t>
-            </a:r>
-          </a:p>
-          <a:p>
-            <a:pPr algn="just">
-              <a:lnSpc>
-                <a:spcPct val="100000"/>
-              </a:lnSpc>
-              <a:spcBef>
-                <a:spcPts val="0"/>
-              </a:spcBef>
-            </a:pPr>
-            <a:r>
-              <a:rPr lang="es-CO" sz="4000" dirty="0" smtClean="0"/>
-              <a:t>Se desarrolló una aplicación JSE para los administradores.</a:t>
-            </a:r>
-          </a:p>
-          <a:p>
-            <a:pPr algn="just">
-              <a:lnSpc>
-                <a:spcPct val="100000"/>
-              </a:lnSpc>
-              <a:spcBef>
-                <a:spcPts val="0"/>
-              </a:spcBef>
-            </a:pPr>
-            <a:r>
-              <a:rPr lang="es-CO" sz="4000" dirty="0" smtClean="0"/>
-              <a:t>Se desarrolló una aplicación JEE para los estudiantes.</a:t>
-            </a:r>
-          </a:p>
-        </p:txBody>
-      </p:sp>
-    </p:spTree>
-    <p:extLst>
-      <p:ext uri="{BB962C8B-B14F-4D97-AF65-F5344CB8AC3E}">
-        <p14:creationId xmlns:p14="http://schemas.microsoft.com/office/powerpoint/2010/main" val="2862120921"/>
       </p:ext>
     </p:extLst>
   </p:cSld>
@@ -10043,7 +10050,165 @@
           <p:cNvPr id="2" name="Título 1">
             <a:extLst>
               <a:ext uri="{FF2B5EF4-FFF2-40B4-BE49-F238E27FC236}">
-                <a16:creationId xmlns:a16="http://schemas.microsoft.com/office/drawing/2014/main" xmlns="" id="{F3C1574D-8292-4410-B1E4-1EBE9DF828D1}"/>
+                <a16:creationId xmlns="" xmlns:a16="http://schemas.microsoft.com/office/drawing/2014/main" id="{F3C1574D-8292-4410-B1E4-1EBE9DF828D1}"/>
+              </a:ext>
+            </a:extLst>
+          </p:cNvPr>
+          <p:cNvSpPr>
+            <a:spLocks noGrp="1"/>
+          </p:cNvSpPr>
+          <p:nvPr>
+            <p:ph type="title"/>
+          </p:nvPr>
+        </p:nvSpPr>
+        <p:spPr>
+          <a:xfrm>
+            <a:off x="4893972" y="0"/>
+            <a:ext cx="7298029" cy="1325563"/>
+          </a:xfrm>
+        </p:spPr>
+        <p:txBody>
+          <a:bodyPr/>
+          <a:lstStyle/>
+          <a:p>
+            <a:pPr algn="r"/>
+            <a:r>
+              <a:rPr lang="es-MX" b="1" dirty="0">
+                <a:solidFill>
+                  <a:schemeClr val="bg1"/>
+                </a:solidFill>
+              </a:rPr>
+              <a:t>Conclusiones</a:t>
+            </a:r>
+            <a:r>
+              <a:rPr lang="es-MX" dirty="0">
+                <a:solidFill>
+                  <a:schemeClr val="bg1"/>
+                </a:solidFill>
+              </a:rPr>
+              <a:t> </a:t>
+            </a:r>
+          </a:p>
+        </p:txBody>
+      </p:sp>
+      <p:sp>
+        <p:nvSpPr>
+          <p:cNvPr id="4" name="Marcador de contenido 2">
+            <a:extLst>
+              <a:ext uri="{FF2B5EF4-FFF2-40B4-BE49-F238E27FC236}">
+                <a16:creationId xmlns="" xmlns:a16="http://schemas.microsoft.com/office/drawing/2014/main" id="{E0439019-967A-48CB-99F3-103D64E7D9BA}"/>
+              </a:ext>
+            </a:extLst>
+          </p:cNvPr>
+          <p:cNvSpPr>
+            <a:spLocks noGrp="1"/>
+          </p:cNvSpPr>
+          <p:nvPr>
+            <p:ph idx="1"/>
+          </p:nvPr>
+        </p:nvSpPr>
+        <p:spPr>
+          <a:xfrm>
+            <a:off x="723900" y="1325563"/>
+            <a:ext cx="10934700" cy="4732337"/>
+          </a:xfrm>
+        </p:spPr>
+        <p:txBody>
+          <a:bodyPr>
+            <a:noAutofit/>
+          </a:bodyPr>
+          <a:lstStyle/>
+          <a:p>
+            <a:pPr algn="just">
+              <a:lnSpc>
+                <a:spcPct val="100000"/>
+              </a:lnSpc>
+              <a:spcBef>
+                <a:spcPts val="0"/>
+              </a:spcBef>
+            </a:pPr>
+            <a:r>
+              <a:rPr lang="es-CO" sz="4000" dirty="0" smtClean="0"/>
+              <a:t>Se </a:t>
+            </a:r>
+            <a:r>
+              <a:rPr lang="es-CO" sz="4000" dirty="0" smtClean="0"/>
+              <a:t>desarrolló una base de datos MySQL.</a:t>
+            </a:r>
+          </a:p>
+          <a:p>
+            <a:pPr algn="just">
+              <a:lnSpc>
+                <a:spcPct val="100000"/>
+              </a:lnSpc>
+              <a:spcBef>
+                <a:spcPts val="0"/>
+              </a:spcBef>
+            </a:pPr>
+            <a:r>
+              <a:rPr lang="es-CO" sz="4000" dirty="0" smtClean="0"/>
+              <a:t>Se desarrolló una aplicación JSE para los administradores.</a:t>
+            </a:r>
+          </a:p>
+          <a:p>
+            <a:pPr algn="just">
+              <a:lnSpc>
+                <a:spcPct val="100000"/>
+              </a:lnSpc>
+              <a:spcBef>
+                <a:spcPts val="0"/>
+              </a:spcBef>
+            </a:pPr>
+            <a:r>
+              <a:rPr lang="es-CO" sz="4000" dirty="0" smtClean="0"/>
+              <a:t>Se desarrolló una aplicación JEE para los estudiantes.</a:t>
+            </a:r>
+          </a:p>
+        </p:txBody>
+      </p:sp>
+    </p:spTree>
+    <p:extLst>
+      <p:ext uri="{BB962C8B-B14F-4D97-AF65-F5344CB8AC3E}">
+        <p14:creationId xmlns:p14="http://schemas.microsoft.com/office/powerpoint/2010/main" val="2862120921"/>
+      </p:ext>
+    </p:extLst>
+  </p:cSld>
+  <p:clrMapOvr>
+    <a:masterClrMapping/>
+  </p:clrMapOvr>
+  <p:timing>
+    <p:tnLst>
+      <p:par>
+        <p:cTn id="1" dur="indefinite" restart="never" nodeType="tmRoot"/>
+      </p:par>
+    </p:tnLst>
+  </p:timing>
+</p:sld>
+</file>
+
+<file path=ppt/slides/slide27.xml><?xml version="1.0" encoding="utf-8"?>
+<p:sld xmlns:a="http://schemas.openxmlformats.org/drawingml/2006/main" xmlns:r="http://schemas.openxmlformats.org/officeDocument/2006/relationships" xmlns:p="http://schemas.openxmlformats.org/presentationml/2006/main">
+  <p:cSld>
+    <p:spTree>
+      <p:nvGrpSpPr>
+        <p:cNvPr id="1" name=""/>
+        <p:cNvGrpSpPr/>
+        <p:nvPr/>
+      </p:nvGrpSpPr>
+      <p:grpSpPr>
+        <a:xfrm>
+          <a:off x="0" y="0"/>
+          <a:ext cx="0" cy="0"/>
+          <a:chOff x="0" y="0"/>
+          <a:chExt cx="0" cy="0"/>
+        </a:xfrm>
+      </p:grpSpPr>
+      <p:sp>
+        <p:nvSpPr>
+          <p:cNvPr id="2" name="Título 1">
+            <a:extLst>
+              <a:ext uri="{FF2B5EF4-FFF2-40B4-BE49-F238E27FC236}">
+                <a16:creationId xmlns="" xmlns:a16="http://schemas.microsoft.com/office/drawing/2014/main" id="{F3C1574D-8292-4410-B1E4-1EBE9DF828D1}"/>
               </a:ext>
             </a:extLst>
           </p:cNvPr>
@@ -10109,14 +10274,14 @@
                 <a:gridCol w="2192055">
                   <a:extLst>
                     <a:ext uri="{9D8B030D-6E8A-4147-A177-3AD203B41FA5}">
-                      <a16:colId xmlns:a16="http://schemas.microsoft.com/office/drawing/2014/main" xmlns="" val="20000"/>
+                      <a16:colId xmlns="" xmlns:a16="http://schemas.microsoft.com/office/drawing/2014/main" val="20000"/>
                     </a:ext>
                   </a:extLst>
                 </a:gridCol>
                 <a:gridCol w="9657567">
                   <a:extLst>
                     <a:ext uri="{9D8B030D-6E8A-4147-A177-3AD203B41FA5}">
-                      <a16:colId xmlns:a16="http://schemas.microsoft.com/office/drawing/2014/main" xmlns="" val="20001"/>
+                      <a16:colId xmlns="" xmlns:a16="http://schemas.microsoft.com/office/drawing/2014/main" val="20001"/>
                     </a:ext>
                   </a:extLst>
                 </a:gridCol>
@@ -10170,7 +10335,7 @@
                 </a:tc>
                 <a:extLst>
                   <a:ext uri="{0D108BD9-81ED-4DB2-BD59-A6C34878D82A}">
-                    <a16:rowId xmlns:a16="http://schemas.microsoft.com/office/drawing/2014/main" xmlns="" val="10000"/>
+                    <a16:rowId xmlns="" xmlns:a16="http://schemas.microsoft.com/office/drawing/2014/main" val="10000"/>
                   </a:ext>
                 </a:extLst>
               </a:tr>
@@ -10224,7 +10389,7 @@
                 </a:tc>
                 <a:extLst>
                   <a:ext uri="{0D108BD9-81ED-4DB2-BD59-A6C34878D82A}">
-                    <a16:rowId xmlns:a16="http://schemas.microsoft.com/office/drawing/2014/main" xmlns="" val="10001"/>
+                    <a16:rowId xmlns="" xmlns:a16="http://schemas.microsoft.com/office/drawing/2014/main" val="10001"/>
                   </a:ext>
                 </a:extLst>
               </a:tr>
@@ -10278,7 +10443,7 @@
                 </a:tc>
                 <a:extLst>
                   <a:ext uri="{0D108BD9-81ED-4DB2-BD59-A6C34878D82A}">
-                    <a16:rowId xmlns:a16="http://schemas.microsoft.com/office/drawing/2014/main" xmlns="" val="10002"/>
+                    <a16:rowId xmlns="" xmlns:a16="http://schemas.microsoft.com/office/drawing/2014/main" val="10002"/>
                   </a:ext>
                 </a:extLst>
               </a:tr>
@@ -10332,7 +10497,7 @@
                 </a:tc>
                 <a:extLst>
                   <a:ext uri="{0D108BD9-81ED-4DB2-BD59-A6C34878D82A}">
-                    <a16:rowId xmlns:a16="http://schemas.microsoft.com/office/drawing/2014/main" xmlns="" val="10003"/>
+                    <a16:rowId xmlns="" xmlns:a16="http://schemas.microsoft.com/office/drawing/2014/main" val="10003"/>
                   </a:ext>
                 </a:extLst>
               </a:tr>
@@ -10386,7 +10551,7 @@
                 </a:tc>
                 <a:extLst>
                   <a:ext uri="{0D108BD9-81ED-4DB2-BD59-A6C34878D82A}">
-                    <a16:rowId xmlns:a16="http://schemas.microsoft.com/office/drawing/2014/main" xmlns="" val="10004"/>
+                    <a16:rowId xmlns="" xmlns:a16="http://schemas.microsoft.com/office/drawing/2014/main" val="10004"/>
                   </a:ext>
                 </a:extLst>
               </a:tr>
@@ -10440,7 +10605,7 @@
                 </a:tc>
                 <a:extLst>
                   <a:ext uri="{0D108BD9-81ED-4DB2-BD59-A6C34878D82A}">
-                    <a16:rowId xmlns:a16="http://schemas.microsoft.com/office/drawing/2014/main" xmlns="" val="10005"/>
+                    <a16:rowId xmlns="" xmlns:a16="http://schemas.microsoft.com/office/drawing/2014/main" val="10005"/>
                   </a:ext>
                 </a:extLst>
               </a:tr>
@@ -10494,7 +10659,7 @@
                 </a:tc>
                 <a:extLst>
                   <a:ext uri="{0D108BD9-81ED-4DB2-BD59-A6C34878D82A}">
-                    <a16:rowId xmlns:a16="http://schemas.microsoft.com/office/drawing/2014/main" xmlns="" val="10006"/>
+                    <a16:rowId xmlns="" xmlns:a16="http://schemas.microsoft.com/office/drawing/2014/main" val="10006"/>
                   </a:ext>
                 </a:extLst>
               </a:tr>
@@ -10548,7 +10713,7 @@
                 </a:tc>
                 <a:extLst>
                   <a:ext uri="{0D108BD9-81ED-4DB2-BD59-A6C34878D82A}">
-                    <a16:rowId xmlns:a16="http://schemas.microsoft.com/office/drawing/2014/main" xmlns="" val="10007"/>
+                    <a16:rowId xmlns="" xmlns:a16="http://schemas.microsoft.com/office/drawing/2014/main" val="10007"/>
                   </a:ext>
                 </a:extLst>
               </a:tr>
@@ -10602,7 +10767,7 @@
                 </a:tc>
                 <a:extLst>
                   <a:ext uri="{0D108BD9-81ED-4DB2-BD59-A6C34878D82A}">
-                    <a16:rowId xmlns:a16="http://schemas.microsoft.com/office/drawing/2014/main" xmlns="" val="10008"/>
+                    <a16:rowId xmlns="" xmlns:a16="http://schemas.microsoft.com/office/drawing/2014/main" val="10008"/>
                   </a:ext>
                 </a:extLst>
               </a:tr>
@@ -10656,7 +10821,7 @@
                 </a:tc>
                 <a:extLst>
                   <a:ext uri="{0D108BD9-81ED-4DB2-BD59-A6C34878D82A}">
-                    <a16:rowId xmlns:a16="http://schemas.microsoft.com/office/drawing/2014/main" xmlns="" val="10009"/>
+                    <a16:rowId xmlns="" xmlns:a16="http://schemas.microsoft.com/office/drawing/2014/main" val="10009"/>
                   </a:ext>
                 </a:extLst>
               </a:tr>
@@ -10710,7 +10875,7 @@
                 </a:tc>
                 <a:extLst>
                   <a:ext uri="{0D108BD9-81ED-4DB2-BD59-A6C34878D82A}">
-                    <a16:rowId xmlns:a16="http://schemas.microsoft.com/office/drawing/2014/main" xmlns="" val="10010"/>
+                    <a16:rowId xmlns="" xmlns:a16="http://schemas.microsoft.com/office/drawing/2014/main" val="10010"/>
                   </a:ext>
                 </a:extLst>
               </a:tr>
@@ -10764,7 +10929,7 @@
                 </a:tc>
                 <a:extLst>
                   <a:ext uri="{0D108BD9-81ED-4DB2-BD59-A6C34878D82A}">
-                    <a16:rowId xmlns:a16="http://schemas.microsoft.com/office/drawing/2014/main" xmlns="" val="10011"/>
+                    <a16:rowId xmlns="" xmlns:a16="http://schemas.microsoft.com/office/drawing/2014/main" val="10011"/>
                   </a:ext>
                 </a:extLst>
               </a:tr>
@@ -10874,7 +11039,7 @@
           <p:cNvPr id="5" name="Título 1">
             <a:extLst>
               <a:ext uri="{FF2B5EF4-FFF2-40B4-BE49-F238E27FC236}">
-                <a16:creationId xmlns:a16="http://schemas.microsoft.com/office/drawing/2014/main" xmlns="" id="{F194AB6A-55E1-4B44-A983-8BC6AA65E29D}"/>
+                <a16:creationId xmlns="" xmlns:a16="http://schemas.microsoft.com/office/drawing/2014/main" id="{F194AB6A-55E1-4B44-A983-8BC6AA65E29D}"/>
               </a:ext>
             </a:extLst>
           </p:cNvPr>
@@ -11107,7 +11272,7 @@
           <p:cNvPr id="3" name="Marcador de contenido 2">
             <a:extLst>
               <a:ext uri="{FF2B5EF4-FFF2-40B4-BE49-F238E27FC236}">
-                <a16:creationId xmlns:a16="http://schemas.microsoft.com/office/drawing/2014/main" xmlns="" id="{F27ED2C7-5D3D-48D6-995C-A170B4F5C4EE}"/>
+                <a16:creationId xmlns="" xmlns:a16="http://schemas.microsoft.com/office/drawing/2014/main" id="{F27ED2C7-5D3D-48D6-995C-A170B4F5C4EE}"/>
               </a:ext>
             </a:extLst>
           </p:cNvPr>
@@ -11286,7 +11451,7 @@
           <p:cNvPr id="3" name="Marcador de contenido 2">
             <a:extLst>
               <a:ext uri="{FF2B5EF4-FFF2-40B4-BE49-F238E27FC236}">
-                <a16:creationId xmlns:a16="http://schemas.microsoft.com/office/drawing/2014/main" xmlns="" id="{F27ED2C7-5D3D-48D6-995C-A170B4F5C4EE}"/>
+                <a16:creationId xmlns="" xmlns:a16="http://schemas.microsoft.com/office/drawing/2014/main" id="{F27ED2C7-5D3D-48D6-995C-A170B4F5C4EE}"/>
               </a:ext>
             </a:extLst>
           </p:cNvPr>
@@ -11427,7 +11592,7 @@
           <p:cNvPr id="2" name="Título 1">
             <a:extLst>
               <a:ext uri="{FF2B5EF4-FFF2-40B4-BE49-F238E27FC236}">
-                <a16:creationId xmlns:a16="http://schemas.microsoft.com/office/drawing/2014/main" xmlns="" id="{F194AB6A-55E1-4B44-A983-8BC6AA65E29D}"/>
+                <a16:creationId xmlns="" xmlns:a16="http://schemas.microsoft.com/office/drawing/2014/main" id="{F194AB6A-55E1-4B44-A983-8BC6AA65E29D}"/>
               </a:ext>
             </a:extLst>
           </p:cNvPr>
@@ -11470,7 +11635,7 @@
           <p:cNvPr id="3" name="Marcador de contenido 2">
             <a:extLst>
               <a:ext uri="{FF2B5EF4-FFF2-40B4-BE49-F238E27FC236}">
-                <a16:creationId xmlns:a16="http://schemas.microsoft.com/office/drawing/2014/main" xmlns="" id="{B24358F4-4131-4E84-B740-F17730F29968}"/>
+                <a16:creationId xmlns="" xmlns:a16="http://schemas.microsoft.com/office/drawing/2014/main" id="{B24358F4-4131-4E84-B740-F17730F29968}"/>
               </a:ext>
             </a:extLst>
           </p:cNvPr>
@@ -11561,7 +11726,7 @@
           <p:cNvPr id="3" name="Marcador de contenido 2">
             <a:extLst>
               <a:ext uri="{FF2B5EF4-FFF2-40B4-BE49-F238E27FC236}">
-                <a16:creationId xmlns:a16="http://schemas.microsoft.com/office/drawing/2014/main" xmlns="" id="{E0439019-967A-48CB-99F3-103D64E7D9BA}"/>
+                <a16:creationId xmlns="" xmlns:a16="http://schemas.microsoft.com/office/drawing/2014/main" id="{E0439019-967A-48CB-99F3-103D64E7D9BA}"/>
               </a:ext>
             </a:extLst>
           </p:cNvPr>
@@ -11721,7 +11886,7 @@
           <p:cNvPr id="5" name="Título 1">
             <a:extLst>
               <a:ext uri="{FF2B5EF4-FFF2-40B4-BE49-F238E27FC236}">
-                <a16:creationId xmlns:a16="http://schemas.microsoft.com/office/drawing/2014/main" xmlns="" id="{F194AB6A-55E1-4B44-A983-8BC6AA65E29D}"/>
+                <a16:creationId xmlns="" xmlns:a16="http://schemas.microsoft.com/office/drawing/2014/main" id="{F194AB6A-55E1-4B44-A983-8BC6AA65E29D}"/>
               </a:ext>
             </a:extLst>
           </p:cNvPr>
@@ -11801,7 +11966,7 @@
           <p:cNvPr id="2" name="Título 1">
             <a:extLst>
               <a:ext uri="{FF2B5EF4-FFF2-40B4-BE49-F238E27FC236}">
-                <a16:creationId xmlns:a16="http://schemas.microsoft.com/office/drawing/2014/main" xmlns="" id="{07AE7516-1AE4-45BE-98BE-4B95F4DA1742}"/>
+                <a16:creationId xmlns="" xmlns:a16="http://schemas.microsoft.com/office/drawing/2014/main" id="{07AE7516-1AE4-45BE-98BE-4B95F4DA1742}"/>
               </a:ext>
             </a:extLst>
           </p:cNvPr>
@@ -11846,7 +12011,7 @@
           <p:cNvPr id="3" name="Marcador de contenido 2">
             <a:extLst>
               <a:ext uri="{FF2B5EF4-FFF2-40B4-BE49-F238E27FC236}">
-                <a16:creationId xmlns:a16="http://schemas.microsoft.com/office/drawing/2014/main" xmlns="" id="{607AE930-5E81-4976-884A-E79FEB8EAB31}"/>
+                <a16:creationId xmlns="" xmlns:a16="http://schemas.microsoft.com/office/drawing/2014/main" id="{607AE930-5E81-4976-884A-E79FEB8EAB31}"/>
               </a:ext>
             </a:extLst>
           </p:cNvPr>

</xml_diff>